<commit_message>
Edits and updates to slide conversion
</commit_message>
<xml_diff>
--- a/LectureSlides/07_IntroductionToBayesModels.pptx
+++ b/LectureSlides/07_IntroductionToBayesModels.pptx
@@ -254,7 +254,7 @@
           <a:p>
             <a:fld id="{13DDEE00-70AE-47E2-95E5-F1C95ECCE916}" type="datetimeFigureOut">
               <a:rPr lang="en-US" smtClean="0"/>
-              <a:t>9/19/2024</a:t>
+              <a:t>9/20/2024</a:t>
             </a:fld>
             <a:endParaRPr lang="en-US"/>
           </a:p>
@@ -784,7 +784,7 @@
           <a:p>
             <a:fld id="{241EB5C9-1307-BA42-ABA2-0BC069CD8E7F}" type="datetimeFigureOut">
               <a:rPr lang="en-US" smtClean="0"/>
-              <a:t>9/19/2024</a:t>
+              <a:t>9/20/2024</a:t>
             </a:fld>
             <a:endParaRPr lang="en-US"/>
           </a:p>
@@ -952,7 +952,7 @@
           <a:p>
             <a:fld id="{241EB5C9-1307-BA42-ABA2-0BC069CD8E7F}" type="datetimeFigureOut">
               <a:rPr lang="en-US" smtClean="0"/>
-              <a:t>9/19/2024</a:t>
+              <a:t>9/20/2024</a:t>
             </a:fld>
             <a:endParaRPr lang="en-US"/>
           </a:p>
@@ -1130,7 +1130,7 @@
           <a:p>
             <a:fld id="{241EB5C9-1307-BA42-ABA2-0BC069CD8E7F}" type="datetimeFigureOut">
               <a:rPr lang="en-US" smtClean="0"/>
-              <a:t>9/19/2024</a:t>
+              <a:t>9/20/2024</a:t>
             </a:fld>
             <a:endParaRPr lang="en-US"/>
           </a:p>
@@ -1298,7 +1298,7 @@
           <a:p>
             <a:fld id="{241EB5C9-1307-BA42-ABA2-0BC069CD8E7F}" type="datetimeFigureOut">
               <a:rPr lang="en-US" smtClean="0"/>
-              <a:t>9/19/2024</a:t>
+              <a:t>9/20/2024</a:t>
             </a:fld>
             <a:endParaRPr lang="en-US"/>
           </a:p>
@@ -1543,7 +1543,7 @@
           <a:p>
             <a:fld id="{241EB5C9-1307-BA42-ABA2-0BC069CD8E7F}" type="datetimeFigureOut">
               <a:rPr lang="en-US" smtClean="0"/>
-              <a:t>9/19/2024</a:t>
+              <a:t>9/20/2024</a:t>
             </a:fld>
             <a:endParaRPr lang="en-US"/>
           </a:p>
@@ -1828,7 +1828,7 @@
           <a:p>
             <a:fld id="{241EB5C9-1307-BA42-ABA2-0BC069CD8E7F}" type="datetimeFigureOut">
               <a:rPr lang="en-US" smtClean="0"/>
-              <a:t>9/19/2024</a:t>
+              <a:t>9/20/2024</a:t>
             </a:fld>
             <a:endParaRPr lang="en-US"/>
           </a:p>
@@ -2247,7 +2247,7 @@
           <a:p>
             <a:fld id="{241EB5C9-1307-BA42-ABA2-0BC069CD8E7F}" type="datetimeFigureOut">
               <a:rPr lang="en-US" smtClean="0"/>
-              <a:t>9/19/2024</a:t>
+              <a:t>9/20/2024</a:t>
             </a:fld>
             <a:endParaRPr lang="en-US"/>
           </a:p>
@@ -2364,7 +2364,7 @@
           <a:p>
             <a:fld id="{241EB5C9-1307-BA42-ABA2-0BC069CD8E7F}" type="datetimeFigureOut">
               <a:rPr lang="en-US" smtClean="0"/>
-              <a:t>9/19/2024</a:t>
+              <a:t>9/20/2024</a:t>
             </a:fld>
             <a:endParaRPr lang="en-US"/>
           </a:p>
@@ -2459,7 +2459,7 @@
           <a:p>
             <a:fld id="{241EB5C9-1307-BA42-ABA2-0BC069CD8E7F}" type="datetimeFigureOut">
               <a:rPr lang="en-US" smtClean="0"/>
-              <a:t>9/19/2024</a:t>
+              <a:t>9/20/2024</a:t>
             </a:fld>
             <a:endParaRPr lang="en-US"/>
           </a:p>
@@ -2734,7 +2734,7 @@
           <a:p>
             <a:fld id="{241EB5C9-1307-BA42-ABA2-0BC069CD8E7F}" type="datetimeFigureOut">
               <a:rPr lang="en-US" smtClean="0"/>
-              <a:t>9/19/2024</a:t>
+              <a:t>9/20/2024</a:t>
             </a:fld>
             <a:endParaRPr lang="en-US"/>
           </a:p>
@@ -2986,7 +2986,7 @@
           <a:p>
             <a:fld id="{241EB5C9-1307-BA42-ABA2-0BC069CD8E7F}" type="datetimeFigureOut">
               <a:rPr lang="en-US" smtClean="0"/>
-              <a:t>9/19/2024</a:t>
+              <a:t>9/20/2024</a:t>
             </a:fld>
             <a:endParaRPr lang="en-US"/>
           </a:p>
@@ -3197,7 +3197,7 @@
           <a:p>
             <a:fld id="{241EB5C9-1307-BA42-ABA2-0BC069CD8E7F}" type="datetimeFigureOut">
               <a:rPr lang="en-US" smtClean="0"/>
-              <a:t>9/19/2024</a:t>
+              <a:t>9/20/2024</a:t>
             </a:fld>
             <a:endParaRPr lang="en-US"/>
           </a:p>
@@ -4003,8 +4003,8 @@
         </p:blipFill>
         <p:spPr bwMode="auto">
           <a:xfrm>
-            <a:off x="1832429" y="1200121"/>
-            <a:ext cx="5396997" cy="3901650"/>
+            <a:off x="1784097" y="1200120"/>
+            <a:ext cx="5445330" cy="3936591"/>
           </a:xfrm>
           <a:prstGeom prst="rect">
             <a:avLst/>
@@ -5666,13 +5666,7 @@
                         <a:rPr sz="2000">
                           <a:latin typeface="Cambria Math" panose="02040503050406030204" pitchFamily="18" charset="0"/>
                         </a:rPr>
-                        <m:t>2</m:t>
-                      </m:r>
-                      <m:r>
-                        <a:rPr sz="2000">
-                          <a:latin typeface="Cambria Math" panose="02040503050406030204" pitchFamily="18" charset="0"/>
-                        </a:rPr>
-                        <m:t>,…,</m:t>
+                        <m:t>2,…,</m:t>
                       </m:r>
                       <m:r>
                         <a:rPr sz="2000">
@@ -5819,8 +5813,8 @@
           </a:p>
         </p:txBody>
       </p:sp>
-      <mc:AlternateContent xmlns:mc="http://schemas.openxmlformats.org/markup-compatibility/2006">
-        <mc:Choice xmlns:a14="http://schemas.microsoft.com/office/drawing/2010/main" Requires="a14">
+      <mc:AlternateContent xmlns:mc="http://schemas.openxmlformats.org/markup-compatibility/2006" xmlns:a14="http://schemas.microsoft.com/office/drawing/2010/main">
+        <mc:Choice Requires="a14">
           <p:sp>
             <p:nvSpPr>
               <p:cNvPr id="3" name="Content Placeholder 2"/>
@@ -6241,7 +6235,7 @@
             </p:txBody>
           </p:sp>
         </mc:Choice>
-        <mc:Fallback>
+        <mc:Fallback xmlns="">
           <p:sp>
             <p:nvSpPr>
               <p:cNvPr id="3" name="Content Placeholder 2"/>
@@ -9280,7 +9274,21 @@
                           <a:latin typeface="Cambria Math" panose="02040503050406030204" pitchFamily="18" charset="0"/>
                           <a:ea typeface="Cambria Math" panose="02040503050406030204" pitchFamily="18" charset="0"/>
                         </a:rPr>
-                        <m:t>𝑙𝑖𝑘𝑒𝑙𝑖h𝑜𝑜𝑑</m:t>
+                        <m:t>𝑙𝑖𝑘𝑒𝑙𝑖</m:t>
+                      </m:r>
+                      <m:r>
+                        <a:rPr lang="en-US" b="0" i="1" smtClean="0">
+                          <a:latin typeface="Cambria Math" panose="02040503050406030204" pitchFamily="18" charset="0"/>
+                          <a:ea typeface="Cambria Math" panose="02040503050406030204" pitchFamily="18" charset="0"/>
+                        </a:rPr>
+                        <m:t>h</m:t>
+                      </m:r>
+                      <m:r>
+                        <a:rPr lang="en-US" b="0" i="1" smtClean="0">
+                          <a:latin typeface="Cambria Math" panose="02040503050406030204" pitchFamily="18" charset="0"/>
+                          <a:ea typeface="Cambria Math" panose="02040503050406030204" pitchFamily="18" charset="0"/>
+                        </a:rPr>
+                        <m:t>𝑜𝑜𝑑</m:t>
                       </m:r>
                       <m:r>
                         <a:rPr lang="en-US" b="0" i="1" smtClean="0">
@@ -9362,7 +9370,14 @@
                           <m:nor/>
                         </m:rPr>
                         <a:rPr lang="en-US" dirty="0"/>
-                        <m:t> │ </m:t>
+                        <m:t> </m:t>
+                      </m:r>
+                      <m:r>
+                        <m:rPr>
+                          <m:nor/>
+                        </m:rPr>
+                        <a:rPr lang="en-US" dirty="0"/>
+                        <m:t>│ </m:t>
                       </m:r>
                       <m:r>
                         <m:rPr>
@@ -9376,7 +9391,14 @@
                           <m:nor/>
                         </m:rPr>
                         <a:rPr lang="en-US" dirty="0"/>
-                        <m:t> )</m:t>
+                        <m:t> </m:t>
+                      </m:r>
+                      <m:r>
+                        <m:rPr>
+                          <m:nor/>
+                        </m:rPr>
+                        <a:rPr lang="en-US" dirty="0"/>
+                        <m:t>)</m:t>
                       </m:r>
                       <m:r>
                         <a:rPr lang="en-US" i="1">
@@ -9411,7 +9433,14 @@
                           <m:nor/>
                         </m:rPr>
                         <a:rPr lang="en-US" dirty="0"/>
-                        <m:t> | </m:t>
+                        <m:t> </m:t>
+                      </m:r>
+                      <m:r>
+                        <m:rPr>
+                          <m:nor/>
+                        </m:rPr>
+                        <a:rPr lang="en-US" dirty="0"/>
+                        <m:t>| </m:t>
                       </m:r>
                       <m:r>
                         <m:rPr>
@@ -9425,7 +9454,14 @@
                           <m:nor/>
                         </m:rPr>
                         <a:rPr lang="en-US" dirty="0"/>
-                        <m:t> )</m:t>
+                        <m:t> </m:t>
+                      </m:r>
+                      <m:r>
+                        <m:rPr>
+                          <m:nor/>
+                        </m:rPr>
+                        <a:rPr lang="en-US" dirty="0"/>
+                        <m:t>)</m:t>
                       </m:r>
                       <m:r>
                         <m:rPr>
@@ -9453,7 +9489,14 @@
                           <m:nor/>
                         </m:rPr>
                         <a:rPr lang="en-US" dirty="0"/>
-                        <m:t> )</m:t>
+                        <m:t> </m:t>
+                      </m:r>
+                      <m:r>
+                        <m:rPr>
+                          <m:nor/>
+                        </m:rPr>
+                        <a:rPr lang="en-US" dirty="0"/>
+                        <m:t>)</m:t>
                       </m:r>
                     </m:oMath>
                   </m:oMathPara>
@@ -10843,7 +10886,7 @@
               <p:nvPr>
                 <p:extLst>
                   <p:ext uri="{D42A27DB-BD31-4B8C-83A1-F6EECF244321}">
-                    <p14:modId xmlns:p14="http://schemas.microsoft.com/office/powerpoint/2010/main" val="228654929"/>
+                    <p14:modId xmlns:p14="http://schemas.microsoft.com/office/powerpoint/2010/main" val="3701350214"/>
                   </p:ext>
                 </p:extLst>
               </p:nvPr>
@@ -10905,7 +10948,7 @@
                                 <a:schemeClr val="tx1"/>
                               </a:solidFill>
                             </a:rPr>
-                            <a:t>Conjugate</a:t>
+                            <a:t>Conjugate Distribution</a:t>
                           </a:r>
                         </a:p>
                       </a:txBody>
@@ -11297,7 +11340,7 @@
               <p:nvPr>
                 <p:extLst>
                   <p:ext uri="{D42A27DB-BD31-4B8C-83A1-F6EECF244321}">
-                    <p14:modId xmlns:p14="http://schemas.microsoft.com/office/powerpoint/2010/main" val="228654929"/>
+                    <p14:modId xmlns:p14="http://schemas.microsoft.com/office/powerpoint/2010/main" val="3701350214"/>
                   </p:ext>
                 </p:extLst>
               </p:nvPr>
@@ -11359,7 +11402,7 @@
                                 <a:schemeClr val="tx1"/>
                               </a:solidFill>
                             </a:rPr>
-                            <a:t>Conjugate</a:t>
+                            <a:t>Conjugate Distribution</a:t>
                           </a:r>
                         </a:p>
                       </a:txBody>
@@ -11737,10 +11780,15 @@
             <p:ph idx="1"/>
           </p:nvPr>
         </p:nvSpPr>
-        <p:spPr/>
+        <p:spPr>
+          <a:xfrm>
+            <a:off x="457200" y="1200150"/>
+            <a:ext cx="8229600" cy="3631945"/>
+          </a:xfrm>
+        </p:spPr>
         <p:txBody>
           <a:bodyPr>
-            <a:normAutofit fontScale="85000" lnSpcReduction="20000"/>
+            <a:normAutofit fontScale="85000" lnSpcReduction="10000"/>
           </a:bodyPr>
           <a:lstStyle/>
           <a:p>
@@ -11748,55 +11796,77 @@
               <a:buNone/>
             </a:pPr>
             <a:r>
+              <a:rPr dirty="0"/>
               <a:t>Nonparametric bootstrap estimation is widely useful and requires minimal assumption</a:t>
             </a:r>
           </a:p>
           <a:p>
             <a:pPr lvl="0"/>
             <a:r>
+              <a:rPr dirty="0"/>
               <a:t>Bootstrap distribution is comprised of values of the statistic computed from bootstrap resamples of the original observations (data sample)</a:t>
             </a:r>
           </a:p>
           <a:p>
             <a:pPr lvl="0"/>
             <a:r>
-              <a:t>Computing bootstrap distribution requires </a:t>
-            </a:r>
-            <a:r>
-              <a:rPr b="1"/>
+              <a:rPr dirty="0"/>
+              <a:t>Computing</a:t>
+            </a:r>
+            <a:r>
+              <a:rPr lang="en-US" dirty="0"/>
+              <a:t> nonparametric</a:t>
+            </a:r>
+            <a:r>
+              <a:rPr dirty="0"/>
+              <a:t> bootstrap distribution</a:t>
+            </a:r>
+            <a:r>
+              <a:rPr lang="en-US" dirty="0"/>
+              <a:t>s</a:t>
+            </a:r>
+            <a:r>
+              <a:rPr dirty="0"/>
+              <a:t> requires </a:t>
+            </a:r>
+            <a:r>
+              <a:rPr b="1" dirty="0"/>
               <a:t>no assumptions about population distribution!</a:t>
             </a:r>
           </a:p>
           <a:p>
             <a:pPr lvl="1"/>
             <a:r>
+              <a:rPr dirty="0"/>
               <a:t>Bootstrap resampling substitutes computer power for paper and pencil statistician power</a:t>
             </a:r>
           </a:p>
           <a:p>
             <a:pPr lvl="0"/>
             <a:r>
+              <a:rPr dirty="0"/>
               <a:t>Bootstrap resampling estimates the </a:t>
             </a:r>
             <a:r>
-              <a:rPr b="1"/>
+              <a:rPr b="1" dirty="0"/>
               <a:t>bootstrap distribution</a:t>
             </a:r>
             <a:r>
+              <a:rPr dirty="0"/>
               <a:t> of a statistic</a:t>
             </a:r>
           </a:p>
           <a:p>
             <a:pPr lvl="1"/>
             <a:r>
+              <a:rPr dirty="0"/>
               <a:t>Compute mostly likely point estimate of the statistic, or bootstrap estimate</a:t>
             </a:r>
-            <a:br/>
-            <a:endParaRPr/>
           </a:p>
           <a:p>
             <a:pPr lvl="1"/>
             <a:r>
+              <a:rPr dirty="0"/>
               <a:t>The bootstrap confidence interval is computed from the bootstrap distribution</a:t>
             </a:r>
           </a:p>
@@ -11846,13 +11916,23 @@
               <a:buNone/>
             </a:pPr>
             <a:r>
-              <a:t>Example using Conjugate Distribution</a:t>
-            </a:r>
+              <a:rPr lang="en-US" dirty="0"/>
+              <a:t>Working with a </a:t>
+            </a:r>
+            <a:r>
+              <a:rPr dirty="0"/>
+              <a:t>Conjugate </a:t>
+            </a:r>
+            <a:r>
+              <a:rPr lang="en-US" dirty="0"/>
+              <a:t>Prior</a:t>
+            </a:r>
+            <a:endParaRPr dirty="0"/>
           </a:p>
         </p:txBody>
       </p:sp>
-      <mc:AlternateContent xmlns:mc="http://schemas.openxmlformats.org/markup-compatibility/2006">
-        <mc:Choice xmlns:a14="http://schemas.microsoft.com/office/drawing/2010/main" Requires="a14">
+      <mc:AlternateContent xmlns:mc="http://schemas.openxmlformats.org/markup-compatibility/2006" xmlns:a14="http://schemas.microsoft.com/office/drawing/2010/main">
+        <mc:Choice Requires="a14">
           <p:sp>
             <p:nvSpPr>
               <p:cNvPr id="3" name="Content Placeholder 2"/>
@@ -12195,7 +12275,7 @@
             </p:txBody>
           </p:sp>
         </mc:Choice>
-        <mc:Fallback>
+        <mc:Fallback xmlns="">
           <p:sp>
             <p:nvSpPr>
               <p:cNvPr id="3" name="Content Placeholder 2"/>
@@ -12277,13 +12357,27 @@
               <a:buNone/>
             </a:pPr>
             <a:r>
-              <a:t>Working with Conjugate Distribution</a:t>
-            </a:r>
+              <a:rPr dirty="0"/>
+              <a:t>Working with</a:t>
+            </a:r>
+            <a:r>
+              <a:rPr lang="en-US" dirty="0"/>
+              <a:t> a</a:t>
+            </a:r>
+            <a:r>
+              <a:rPr dirty="0"/>
+              <a:t> Conjugate </a:t>
+            </a:r>
+            <a:r>
+              <a:rPr lang="en-US" dirty="0"/>
+              <a:t>Prior</a:t>
+            </a:r>
+            <a:endParaRPr dirty="0"/>
           </a:p>
         </p:txBody>
       </p:sp>
-      <mc:AlternateContent xmlns:mc="http://schemas.openxmlformats.org/markup-compatibility/2006">
-        <mc:Choice xmlns:a14="http://schemas.microsoft.com/office/drawing/2010/main" Requires="a14">
+      <mc:AlternateContent xmlns:mc="http://schemas.openxmlformats.org/markup-compatibility/2006" xmlns:a14="http://schemas.microsoft.com/office/drawing/2010/main">
+        <mc:Choice Requires="a14">
           <p:sp>
             <p:nvSpPr>
               <p:cNvPr id="3" name="Content Placeholder 2"/>
@@ -12415,7 +12509,7 @@
             </p:txBody>
           </p:sp>
         </mc:Choice>
-        <mc:Fallback>
+        <mc:Fallback xmlns="">
           <p:sp>
             <p:nvSpPr>
               <p:cNvPr id="3" name="Content Placeholder 2"/>
@@ -12500,9 +12594,18 @@
               <a:buNone/>
             </a:pPr>
             <a:r>
-              <a:rPr dirty="0"/>
-              <a:t>Example using Conjugate Distribution</a:t>
-            </a:r>
+              <a:rPr lang="en-US" dirty="0"/>
+              <a:t>Working with a</a:t>
+            </a:r>
+            <a:r>
+              <a:rPr dirty="0"/>
+              <a:t> Conjugate </a:t>
+            </a:r>
+            <a:r>
+              <a:rPr lang="en-US" dirty="0"/>
+              <a:t>Prior</a:t>
+            </a:r>
+            <a:endParaRPr dirty="0"/>
           </a:p>
         </p:txBody>
       </p:sp>
@@ -12617,13 +12720,23 @@
               <a:buNone/>
             </a:pPr>
             <a:r>
-              <a:t>Example using Conjugate Distribution</a:t>
-            </a:r>
+              <a:rPr lang="en-US" dirty="0"/>
+              <a:t>Working with a </a:t>
+            </a:r>
+            <a:r>
+              <a:rPr dirty="0"/>
+              <a:t>Conjugate </a:t>
+            </a:r>
+            <a:r>
+              <a:rPr lang="en-US" dirty="0"/>
+              <a:t>Prior</a:t>
+            </a:r>
+            <a:endParaRPr dirty="0"/>
           </a:p>
         </p:txBody>
       </p:sp>
-      <mc:AlternateContent xmlns:mc="http://schemas.openxmlformats.org/markup-compatibility/2006">
-        <mc:Choice xmlns:a14="http://schemas.microsoft.com/office/drawing/2010/main" Requires="a14">
+      <mc:AlternateContent xmlns:mc="http://schemas.openxmlformats.org/markup-compatibility/2006" xmlns:a14="http://schemas.microsoft.com/office/drawing/2010/main">
+        <mc:Choice Requires="a14">
           <p:sp>
             <p:nvSpPr>
               <p:cNvPr id="3" name="Content Placeholder 2"/>
@@ -13131,13 +13244,7 @@
                             <a:rPr lang="en-US" b="0" i="1" smtClean="0">
                               <a:latin typeface="Cambria Math" panose="02040503050406030204" pitchFamily="18" charset="0"/>
                             </a:rPr>
-                            <m:t>𝐵</m:t>
-                          </m:r>
-                          <m:r>
-                            <a:rPr lang="en-US" b="0" i="1" smtClean="0">
-                              <a:latin typeface="Cambria Math" panose="02040503050406030204" pitchFamily="18" charset="0"/>
-                            </a:rPr>
-                            <m:t>𝑖𝑛𝑜𝑚𝑖𝑎𝑙</m:t>
+                            <m:t>𝐵𝑖𝑛𝑜𝑚𝑖𝑎𝑙</m:t>
                           </m:r>
                           <m:d>
                             <m:dPr>
@@ -13402,7 +13509,7 @@
             </p:txBody>
           </p:sp>
         </mc:Choice>
-        <mc:Fallback>
+        <mc:Fallback xmlns="">
           <p:sp>
             <p:nvSpPr>
               <p:cNvPr id="3" name="Content Placeholder 2"/>
@@ -13484,13 +13591,23 @@
               <a:buNone/>
             </a:pPr>
             <a:r>
-              <a:t>Example using Conjugate Distribution</a:t>
-            </a:r>
+              <a:rPr lang="en-US" dirty="0"/>
+              <a:t>Working with a </a:t>
+            </a:r>
+            <a:r>
+              <a:rPr dirty="0"/>
+              <a:t>Conjugate </a:t>
+            </a:r>
+            <a:r>
+              <a:rPr lang="en-US" dirty="0"/>
+              <a:t>Prior</a:t>
+            </a:r>
+            <a:endParaRPr dirty="0"/>
           </a:p>
         </p:txBody>
       </p:sp>
-      <mc:AlternateContent xmlns:mc="http://schemas.openxmlformats.org/markup-compatibility/2006">
-        <mc:Choice xmlns:a14="http://schemas.microsoft.com/office/drawing/2010/main" Requires="a14">
+      <mc:AlternateContent xmlns:mc="http://schemas.openxmlformats.org/markup-compatibility/2006" xmlns:a14="http://schemas.microsoft.com/office/drawing/2010/main">
+        <mc:Choice Requires="a14">
           <p:sp>
             <p:nvSpPr>
               <p:cNvPr id="3" name="Content Placeholder 2"/>
@@ -13907,7 +14024,7 @@
             </p:txBody>
           </p:sp>
         </mc:Choice>
-        <mc:Fallback>
+        <mc:Fallback xmlns="">
           <p:sp>
             <p:nvSpPr>
               <p:cNvPr id="3" name="Content Placeholder 2"/>
@@ -13989,13 +14106,23 @@
               <a:buNone/>
             </a:pPr>
             <a:r>
-              <a:t>Example using Conjugate Distribution</a:t>
-            </a:r>
+              <a:rPr lang="en-US" dirty="0"/>
+              <a:t>Working with a </a:t>
+            </a:r>
+            <a:r>
+              <a:rPr dirty="0"/>
+              <a:t>Conjugate </a:t>
+            </a:r>
+            <a:r>
+              <a:rPr lang="en-US" dirty="0"/>
+              <a:t>Prior</a:t>
+            </a:r>
+            <a:endParaRPr dirty="0"/>
           </a:p>
         </p:txBody>
       </p:sp>
-      <mc:AlternateContent xmlns:mc="http://schemas.openxmlformats.org/markup-compatibility/2006">
-        <mc:Choice xmlns:a14="http://schemas.microsoft.com/office/drawing/2010/main" Requires="a14">
+      <mc:AlternateContent xmlns:mc="http://schemas.openxmlformats.org/markup-compatibility/2006" xmlns:a14="http://schemas.microsoft.com/office/drawing/2010/main">
+        <mc:Choice Requires="a14">
           <p:sp>
             <p:nvSpPr>
               <p:cNvPr id="3" name="Content Placeholder 2"/>
@@ -14212,7 +14339,7 @@
             </p:txBody>
           </p:sp>
         </mc:Choice>
-        <mc:Fallback>
+        <mc:Fallback xmlns="">
           <p:sp>
             <p:nvSpPr>
               <p:cNvPr id="3" name="Content Placeholder 2"/>
@@ -14299,13 +14426,23 @@
               <a:buNone/>
             </a:pPr>
             <a:r>
-              <a:t>Example using Conjugate Distribution</a:t>
-            </a:r>
+              <a:rPr lang="en-US" dirty="0"/>
+              <a:t>Working with a </a:t>
+            </a:r>
+            <a:r>
+              <a:rPr dirty="0"/>
+              <a:t>Conjugate </a:t>
+            </a:r>
+            <a:r>
+              <a:rPr lang="en-US" dirty="0"/>
+              <a:t>Prior</a:t>
+            </a:r>
+            <a:endParaRPr dirty="0"/>
           </a:p>
         </p:txBody>
       </p:sp>
-      <mc:AlternateContent xmlns:mc="http://schemas.openxmlformats.org/markup-compatibility/2006" xmlns:a14="http://schemas.microsoft.com/office/drawing/2010/main">
-        <mc:Choice Requires="a14">
+      <mc:AlternateContent xmlns:mc="http://schemas.openxmlformats.org/markup-compatibility/2006">
+        <mc:Choice xmlns:a14="http://schemas.microsoft.com/office/drawing/2010/main" Requires="a14">
           <p:sp>
             <p:nvSpPr>
               <p:cNvPr id="3" name="Content Placeholder 2"/>
@@ -14316,20 +14453,28 @@
                 <p:ph idx="1"/>
               </p:nvPr>
             </p:nvSpPr>
-            <p:spPr/>
+            <p:spPr>
+              <a:xfrm>
+                <a:off x="457200" y="1121664"/>
+                <a:ext cx="4729988" cy="3472959"/>
+              </a:xfrm>
+            </p:spPr>
             <p:txBody>
-              <a:bodyPr/>
+              <a:bodyPr>
+                <a:normAutofit fontScale="92500" lnSpcReduction="10000"/>
+              </a:bodyPr>
               <a:lstStyle/>
               <a:p>
-                <a:pPr marL="0" lvl="0" indent="0">
-                  <a:buNone/>
-                </a:pPr>
-                <a:r>
+                <a:r>
+                  <a:rPr dirty="0"/>
                   <a:t>Consider example with:</a:t>
                 </a:r>
-                <a:br/>
-                <a:r>
-                  <a:t>- Prior pseudo counts </a:t>
+                <a:br>
+                  <a:rPr dirty="0"/>
+                </a:br>
+                <a:r>
+                  <a:rPr b="1" dirty="0"/>
+                  <a:t>Prior pseudo counts </a:t>
                 </a:r>
                 <a14:m>
                   <m:oMath xmlns:m="http://schemas.openxmlformats.org/officeDocument/2006/math">
@@ -14367,6 +14512,7 @@
                   </m:oMath>
                 </a14:m>
                 <a:r>
+                  <a:rPr dirty="0"/>
                   <a:t>, successes </a:t>
                 </a:r>
                 <a14:m>
@@ -14416,6 +14562,7 @@
                   </m:oMath>
                 </a14:m>
                 <a:r>
+                  <a:rPr dirty="0"/>
                   <a:t> and failures, </a:t>
                 </a:r>
                 <a14:m>
@@ -14464,9 +14611,12 @@
                     </m:r>
                   </m:oMath>
                 </a14:m>
-                <a:br/>
-                <a:r>
-                  <a:t>- Evidence, successes </a:t>
+                <a:endParaRPr lang="en-US" dirty="0"/>
+              </a:p>
+              <a:p>
+                <a:r>
+                  <a:rPr dirty="0"/>
+                  <a:t>Evidence, successes </a:t>
                 </a:r>
                 <a14:m>
                   <m:oMath xmlns:m="http://schemas.openxmlformats.org/officeDocument/2006/math">
@@ -14485,6 +14635,7 @@
                   </m:oMath>
                 </a14:m>
                 <a:r>
+                  <a:rPr dirty="0"/>
                   <a:t> and failures, </a:t>
                 </a:r>
                 <a14:m>
@@ -14503,8 +14654,11 @@
                     </m:r>
                   </m:oMath>
                 </a14:m>
-                <a:br/>
-                <a:r>
+                <a:br>
+                  <a:rPr dirty="0"/>
+                </a:br>
+                <a:r>
+                  <a:rPr dirty="0"/>
                   <a:t>- Posterior is </a:t>
                 </a:r>
                 <a14:m>
@@ -14611,12 +14765,29 @@
                     </m:d>
                   </m:oMath>
                 </a14:m>
-                <a:endParaRPr/>
+                <a:endParaRPr lang="en-US" dirty="0"/>
+              </a:p>
+              <a:p>
+                <a:r>
+                  <a:rPr lang="en-US" dirty="0"/>
+                  <a:t>Evidence is stronger than the prior, 40:12 </a:t>
+                </a:r>
+                <a:r>
+                  <a:rPr lang="en-US" dirty="0" err="1"/>
+                  <a:t>counts:pseudo</a:t>
+                </a:r>
+                <a:r>
+                  <a:rPr lang="en-US" dirty="0"/>
+                  <a:t> counts</a:t>
+                </a:r>
+              </a:p>
+              <a:p>
+                <a:endParaRPr dirty="0"/>
               </a:p>
             </p:txBody>
           </p:sp>
         </mc:Choice>
-        <mc:Fallback xmlns="">
+        <mc:Fallback>
           <p:sp>
             <p:nvSpPr>
               <p:cNvPr id="3" name="Content Placeholder 2"/>
@@ -14628,10 +14799,14 @@
               </p:nvPr>
             </p:nvSpPr>
             <p:spPr>
+              <a:xfrm>
+                <a:off x="457200" y="1121664"/>
+                <a:ext cx="4729988" cy="3472959"/>
+              </a:xfrm>
               <a:blipFill>
                 <a:blip r:embed="rId2"/>
                 <a:stretch>
-                  <a:fillRect l="-1111" t="-1436"/>
+                  <a:fillRect l="-1418" t="-2281" r="-2320"/>
                 </a:stretch>
               </a:blipFill>
             </p:spPr>
@@ -14666,8 +14841,8 @@
         </p:blipFill>
         <p:spPr bwMode="auto">
           <a:xfrm>
-            <a:off x="3111500" y="1193800"/>
-            <a:ext cx="2921000" cy="2882900"/>
+            <a:off x="5291328" y="872744"/>
+            <a:ext cx="3748532" cy="3699638"/>
           </a:xfrm>
           <a:prstGeom prst="rect">
             <a:avLst/>
@@ -14688,8 +14863,8 @@
         </p:nvSpPr>
         <p:spPr>
           <a:xfrm>
-            <a:off x="457200" y="4076700"/>
-            <a:ext cx="8229600" cy="508000"/>
+            <a:off x="5395468" y="4529088"/>
+            <a:ext cx="3748532" cy="575295"/>
           </a:xfrm>
           <a:prstGeom prst="rect">
             <a:avLst/>
@@ -14704,6 +14879,7 @@
               <a:buNone/>
             </a:pPr>
             <a:r>
+              <a:rPr dirty="0"/>
               <a:t>Prior, likelihood and posterior for distracted driving</a:t>
             </a:r>
           </a:p>
@@ -14777,7 +14953,16 @@
               <a:buNone/>
             </a:pPr>
             <a:r>
-              <a:t>How can we find an estimate of the poster distribution?</a:t>
+              <a:rPr dirty="0"/>
+              <a:t>How can we find an </a:t>
+            </a:r>
+            <a:r>
+              <a:rPr lang="en-US" dirty="0"/>
+              <a:t>empirical </a:t>
+            </a:r>
+            <a:r>
+              <a:rPr dirty="0"/>
+              <a:t>estimate of the poster distribution?</a:t>
             </a:r>
           </a:p>
           <a:p>
@@ -14785,24 +14970,71 @@
               <a:buAutoNum type="arabicPeriod"/>
             </a:pPr>
             <a:r>
-              <a:t>We can sample from the analytic solution - if we have a conjugate</a:t>
-            </a:r>
+              <a:rPr dirty="0"/>
+              <a:t>We can sample from the </a:t>
+            </a:r>
+            <a:r>
+              <a:rPr lang="en-US" dirty="0"/>
+              <a:t>likelihood distribution </a:t>
+            </a:r>
+          </a:p>
+          <a:p>
+            <a:pPr lvl="1"/>
+            <a:r>
+              <a:rPr lang="en-US" dirty="0"/>
+              <a:t>Sample the analytic </a:t>
+            </a:r>
+            <a:r>
+              <a:rPr dirty="0"/>
+              <a:t>conjugate</a:t>
+            </a:r>
+            <a:r>
+              <a:rPr lang="en-US" dirty="0"/>
+              <a:t> prior if it exists</a:t>
+            </a:r>
+          </a:p>
+          <a:p>
+            <a:pPr marL="457200" indent="-457200">
+              <a:buFont typeface="+mj-lt"/>
+              <a:buAutoNum type="arabicPeriod"/>
+            </a:pPr>
+            <a:r>
+              <a:rPr lang="en-US" dirty="0"/>
+              <a:t>Grid sample or Markov chain Monte Carlo (MCMC) sample</a:t>
+            </a:r>
+            <a:endParaRPr dirty="0"/>
           </a:p>
           <a:p>
             <a:pPr marL="342900" lvl="0" indent="-342900">
               <a:buAutoNum type="arabicPeriod"/>
             </a:pPr>
             <a:r>
-              <a:t>We can sample the likelihood and prior, take the product and normalize - for any posterior</a:t>
-            </a:r>
+              <a:rPr lang="en-US" dirty="0"/>
+              <a:t>Take </a:t>
+            </a:r>
+            <a:r>
+              <a:rPr dirty="0"/>
+              <a:t>the product</a:t>
+            </a:r>
+            <a:r>
+              <a:rPr lang="en-US" dirty="0"/>
+              <a:t> of likelihood and prior</a:t>
+            </a:r>
+            <a:r>
+              <a:rPr dirty="0"/>
+              <a:t> </a:t>
+            </a:r>
+            <a:endParaRPr lang="en-US" dirty="0"/>
           </a:p>
           <a:p>
             <a:pPr marL="342900" lvl="0" indent="-342900">
               <a:buAutoNum type="arabicPeriod"/>
             </a:pPr>
             <a:r>
-              <a:t>Grid sample or Markov chain Monte Carlo (MCMC) sample</a:t>
-            </a:r>
+              <a:rPr lang="en-US" dirty="0"/>
+              <a:t>Normalize to compute proper posterior distribution </a:t>
+            </a:r>
+            <a:endParaRPr dirty="0"/>
           </a:p>
         </p:txBody>
       </p:sp>
@@ -14850,6 +15082,7 @@
               <a:buNone/>
             </a:pPr>
             <a:r>
+              <a:rPr dirty="0"/>
               <a:t>Sampling the Posterior</a:t>
             </a:r>
           </a:p>
@@ -14865,10 +15098,15 @@
             <p:ph idx="1"/>
           </p:nvPr>
         </p:nvSpPr>
-        <p:spPr/>
+        <p:spPr>
+          <a:xfrm>
+            <a:off x="457200" y="1200150"/>
+            <a:ext cx="5833872" cy="3827017"/>
+          </a:xfrm>
+        </p:spPr>
         <p:txBody>
           <a:bodyPr>
-            <a:normAutofit fontScale="92500" lnSpcReduction="10000"/>
+            <a:normAutofit lnSpcReduction="10000"/>
           </a:bodyPr>
           <a:lstStyle/>
           <a:p>
@@ -14876,60 +15114,66 @@
               <a:buNone/>
             </a:pPr>
             <a:r>
-              <a:rPr b="1"/>
+              <a:rPr b="1" dirty="0"/>
               <a:t>Grid sampling</a:t>
             </a:r>
             <a:r>
+              <a:rPr dirty="0"/>
               <a:t> is a naive approach</a:t>
             </a:r>
           </a:p>
           <a:p>
             <a:pPr lvl="0"/>
             <a:r>
+              <a:rPr dirty="0"/>
               <a:t>Compute the probability at each point on a regular gird</a:t>
             </a:r>
           </a:p>
           <a:p>
             <a:pPr lvl="1"/>
             <a:r>
-              <a:t>Sample over range of interesting values for variables</a:t>
-            </a:r>
+              <a:rPr dirty="0"/>
+              <a:t>Sample over range of values </a:t>
+            </a:r>
+            <a:r>
+              <a:rPr lang="en-US" dirty="0"/>
+              <a:t>of interest</a:t>
+            </a:r>
+            <a:endParaRPr dirty="0"/>
           </a:p>
           <a:p>
             <a:pPr lvl="1"/>
             <a:r>
-              <a:t>Posterior if conjugate prior</a:t>
-            </a:r>
-            <a:br/>
-            <a:endParaRPr/>
+              <a:rPr lang="en-US" dirty="0"/>
+              <a:t>Take the product of the p</a:t>
+            </a:r>
+            <a:r>
+              <a:rPr dirty="0"/>
+              <a:t>rior and likelihood</a:t>
+            </a:r>
+          </a:p>
+          <a:p>
+            <a:pPr lvl="0"/>
+            <a:r>
+              <a:rPr i="1" dirty="0"/>
+              <a:t>In principle</a:t>
+            </a:r>
+            <a:r>
+              <a:rPr dirty="0"/>
+              <a:t> can work for any number of dimensions</a:t>
+            </a:r>
           </a:p>
           <a:p>
             <a:pPr lvl="1"/>
             <a:r>
-              <a:t>Prior and likelihood</a:t>
-            </a:r>
-          </a:p>
-          <a:p>
-            <a:pPr lvl="0"/>
-            <a:r>
-              <a:rPr i="1"/>
-              <a:t>In principle</a:t>
-            </a:r>
-            <a:r>
-              <a:t> can work for any number of dimensions</a:t>
+              <a:rPr dirty="0"/>
+              <a:t>In 1-dimension is just regularly spaced points on a line</a:t>
             </a:r>
           </a:p>
           <a:p>
             <a:pPr lvl="1"/>
             <a:r>
-              <a:t>In 1-dimension is just regularly spaced points on a line</a:t>
-            </a:r>
-            <a:br/>
-            <a:endParaRPr/>
-          </a:p>
-          <a:p>
-            <a:pPr lvl="1"/>
-            <a:r>
+              <a:rPr dirty="0"/>
               <a:t>Poor scaling to higher dimensions</a:t>
             </a:r>
           </a:p>
@@ -14951,7 +15195,7 @@
         </p:blipFill>
         <p:spPr bwMode="auto">
           <a:xfrm>
-            <a:off x="3175000" y="1193800"/>
+            <a:off x="6315456" y="1628648"/>
             <a:ext cx="2794000" cy="2882900"/>
           </a:xfrm>
           <a:prstGeom prst="rect">
@@ -14973,8 +15217,8 @@
         </p:nvSpPr>
         <p:spPr>
           <a:xfrm>
-            <a:off x="457200" y="4076700"/>
-            <a:ext cx="8229600" cy="508000"/>
+            <a:off x="6350000" y="4477545"/>
+            <a:ext cx="2759456" cy="508000"/>
           </a:xfrm>
           <a:prstGeom prst="rect">
             <a:avLst/>
@@ -14989,6 +15233,7 @@
               <a:buNone/>
             </a:pPr>
             <a:r>
+              <a:rPr dirty="0"/>
               <a:t>Sampling grid for bivariate distribution</a:t>
             </a:r>
           </a:p>
@@ -15053,10 +15298,15 @@
             <p:ph idx="1"/>
           </p:nvPr>
         </p:nvSpPr>
-        <p:spPr/>
+        <p:spPr>
+          <a:xfrm>
+            <a:off x="457200" y="975360"/>
+            <a:ext cx="8229600" cy="4055872"/>
+          </a:xfrm>
+        </p:spPr>
         <p:txBody>
           <a:bodyPr>
-            <a:normAutofit fontScale="32500" lnSpcReduction="20000"/>
+            <a:normAutofit fontScale="47500" lnSpcReduction="20000"/>
           </a:bodyPr>
           <a:lstStyle/>
           <a:p>
@@ -15064,6 +15314,7 @@
               <a:buNone/>
             </a:pPr>
             <a:r>
+              <a:rPr dirty="0"/>
               <a:t>Algorithm for grid sampling to compute posterior from likelihood and prior</a:t>
             </a:r>
           </a:p>
@@ -15072,20 +15323,58 @@
               <a:buNone/>
             </a:pPr>
             <a:r>
-              <a:rPr>
+              <a:rPr dirty="0">
                 <a:latin typeface="Courier"/>
               </a:rPr>
-              <a:t>Procedure CreateGrid(variables, lower_limits, upper_limits): </a:t>
-            </a:r>
-            <a:br/>
-            <a:r>
-              <a:rPr>
+              <a:t>Procedure </a:t>
+            </a:r>
+            <a:r>
+              <a:rPr dirty="0" err="1">
+                <a:latin typeface="Courier"/>
+              </a:rPr>
+              <a:t>CreateGrid</a:t>
+            </a:r>
+            <a:r>
+              <a:rPr dirty="0">
+                <a:latin typeface="Courier"/>
+              </a:rPr>
+              <a:t>(variables, </a:t>
+            </a:r>
+            <a:r>
+              <a:rPr dirty="0" err="1">
+                <a:latin typeface="Courier"/>
+              </a:rPr>
+              <a:t>lower_limits</a:t>
+            </a:r>
+            <a:r>
+              <a:rPr dirty="0">
+                <a:latin typeface="Courier"/>
+              </a:rPr>
+              <a:t>, </a:t>
+            </a:r>
+            <a:r>
+              <a:rPr dirty="0" err="1">
+                <a:latin typeface="Courier"/>
+              </a:rPr>
+              <a:t>upper_limits</a:t>
+            </a:r>
+            <a:r>
+              <a:rPr dirty="0">
+                <a:latin typeface="Courier"/>
+              </a:rPr>
+              <a:t>): </a:t>
+            </a:r>
+            <a:br>
+              <a:rPr dirty="0"/>
+            </a:br>
+            <a:r>
+              <a:rPr dirty="0">
                 <a:latin typeface="Courier"/>
               </a:rPr>
               <a:t>    </a:t>
             </a:r>
             <a:r>
-              <a:rPr i="1">
+              <a:rPr i="1" dirty="0">
                 <a:solidFill>
                   <a:srgbClr val="60A0B0"/>
                 </a:solidFill>
@@ -15093,15 +15382,17 @@
               </a:rPr>
               <a:t># Build the sampling grid </a:t>
             </a:r>
-            <a:br/>
-            <a:r>
-              <a:rPr>
+            <a:br>
+              <a:rPr dirty="0"/>
+            </a:br>
+            <a:r>
+              <a:rPr dirty="0">
                 <a:latin typeface="Courier"/>
               </a:rPr>
               <a:t>    </a:t>
             </a:r>
             <a:r>
-              <a:rPr b="1">
+              <a:rPr b="1" dirty="0">
                 <a:solidFill>
                   <a:srgbClr val="007020"/>
                 </a:solidFill>
@@ -15110,34 +15401,88 @@
               <a:t>return</a:t>
             </a:r>
             <a:r>
-              <a:rPr>
+              <a:rPr dirty="0">
                 <a:latin typeface="Courier"/>
               </a:rPr>
-              <a:t> sampling_grid   </a:t>
-            </a:r>
-            <a:br/>
-            <a:r>
-              <a:rPr>
+              <a:t> </a:t>
+            </a:r>
+            <a:r>
+              <a:rPr dirty="0" err="1">
+                <a:latin typeface="Courier"/>
+              </a:rPr>
+              <a:t>sampling_grid</a:t>
+            </a:r>
+            <a:r>
+              <a:rPr dirty="0">
+                <a:latin typeface="Courier"/>
+              </a:rPr>
+              <a:t>   </a:t>
+            </a:r>
+            <a:br>
+              <a:rPr dirty="0"/>
+            </a:br>
+            <a:r>
+              <a:rPr dirty="0">
                 <a:latin typeface="Courier"/>
               </a:rPr>
               <a:t>    </a:t>
             </a:r>
-            <a:br/>
-            <a:r>
-              <a:rPr>
+            <a:br>
+              <a:rPr dirty="0"/>
+            </a:br>
+            <a:r>
+              <a:rPr dirty="0">
                 <a:latin typeface="Courier"/>
               </a:rPr>
-              <a:t>Procedure SampleLikelihood(sampling_value, observation_values):    </a:t>
-            </a:r>
-            <a:br/>
-            <a:r>
-              <a:rPr>
+              <a:t>Procedure </a:t>
+            </a:r>
+            <a:r>
+              <a:rPr dirty="0" err="1">
+                <a:latin typeface="Courier"/>
+              </a:rPr>
+              <a:t>SampleLikelihood</a:t>
+            </a:r>
+            <a:r>
+              <a:rPr dirty="0">
+                <a:latin typeface="Courier"/>
+              </a:rPr>
+              <a:t>(</a:t>
+            </a:r>
+            <a:r>
+              <a:rPr dirty="0" err="1">
+                <a:latin typeface="Courier"/>
+              </a:rPr>
+              <a:t>sampling_value</a:t>
+            </a:r>
+            <a:r>
+              <a:rPr dirty="0">
+                <a:latin typeface="Courier"/>
+              </a:rPr>
+              <a:t>, </a:t>
+            </a:r>
+            <a:r>
+              <a:rPr dirty="0" err="1">
+                <a:latin typeface="Courier"/>
+              </a:rPr>
+              <a:t>observation_values</a:t>
+            </a:r>
+            <a:r>
+              <a:rPr dirty="0">
+                <a:latin typeface="Courier"/>
+              </a:rPr>
+              <a:t>):    </a:t>
+            </a:r>
+            <a:br>
+              <a:rPr dirty="0"/>
+            </a:br>
+            <a:r>
+              <a:rPr dirty="0">
                 <a:latin typeface="Courier"/>
               </a:rPr>
               <a:t>    </a:t>
             </a:r>
             <a:r>
-              <a:rPr b="1">
+              <a:rPr b="1" dirty="0">
                 <a:solidFill>
                   <a:srgbClr val="007020"/>
                 </a:solidFill>
@@ -15146,34 +15491,100 @@
               <a:t>return</a:t>
             </a:r>
             <a:r>
-              <a:rPr>
+              <a:rPr dirty="0">
                 <a:latin typeface="Courier"/>
               </a:rPr>
-              <a:t> likelihood_function(observation_values, sampling_value)</a:t>
-            </a:r>
-            <a:br/>
-            <a:r>
-              <a:rPr>
+              <a:t> </a:t>
+            </a:r>
+            <a:r>
+              <a:rPr dirty="0" err="1">
+                <a:latin typeface="Courier"/>
+              </a:rPr>
+              <a:t>likelihood_function</a:t>
+            </a:r>
+            <a:r>
+              <a:rPr dirty="0">
+                <a:latin typeface="Courier"/>
+              </a:rPr>
+              <a:t>(</a:t>
+            </a:r>
+            <a:r>
+              <a:rPr dirty="0" err="1">
+                <a:latin typeface="Courier"/>
+              </a:rPr>
+              <a:t>observation_values</a:t>
+            </a:r>
+            <a:r>
+              <a:rPr dirty="0">
+                <a:latin typeface="Courier"/>
+              </a:rPr>
+              <a:t>, </a:t>
+            </a:r>
+            <a:r>
+              <a:rPr dirty="0" err="1">
+                <a:latin typeface="Courier"/>
+              </a:rPr>
+              <a:t>sampling_value</a:t>
+            </a:r>
+            <a:r>
+              <a:rPr dirty="0">
+                <a:latin typeface="Courier"/>
+              </a:rPr>
+              <a:t>)</a:t>
+            </a:r>
+            <a:br>
+              <a:rPr dirty="0"/>
+            </a:br>
+            <a:r>
+              <a:rPr dirty="0">
                 <a:latin typeface="Courier"/>
               </a:rPr>
               <a:t>    </a:t>
             </a:r>
-            <a:br/>
-            <a:r>
-              <a:rPr>
+            <a:br>
+              <a:rPr dirty="0"/>
+            </a:br>
+            <a:r>
+              <a:rPr dirty="0">
                 <a:latin typeface="Courier"/>
               </a:rPr>
-              <a:t>Procedure Prior(sampling_values, prior_parameter_value):    </a:t>
-            </a:r>
-            <a:br/>
-            <a:r>
-              <a:rPr>
+              <a:t>Procedure Prior(</a:t>
+            </a:r>
+            <a:r>
+              <a:rPr dirty="0" err="1">
+                <a:latin typeface="Courier"/>
+              </a:rPr>
+              <a:t>sampling_values</a:t>
+            </a:r>
+            <a:r>
+              <a:rPr dirty="0">
+                <a:latin typeface="Courier"/>
+              </a:rPr>
+              <a:t>, </a:t>
+            </a:r>
+            <a:r>
+              <a:rPr dirty="0" err="1">
+                <a:latin typeface="Courier"/>
+              </a:rPr>
+              <a:t>prior_parameter_value</a:t>
+            </a:r>
+            <a:r>
+              <a:rPr dirty="0">
+                <a:latin typeface="Courier"/>
+              </a:rPr>
+              <a:t>):    </a:t>
+            </a:r>
+            <a:br>
+              <a:rPr dirty="0"/>
+            </a:br>
+            <a:r>
+              <a:rPr dirty="0">
                 <a:latin typeface="Courier"/>
               </a:rPr>
               <a:t>    </a:t>
             </a:r>
             <a:r>
-              <a:rPr b="1">
+              <a:rPr b="1" dirty="0">
                 <a:solidFill>
                   <a:srgbClr val="007020"/>
                 </a:solidFill>
@@ -15182,34 +15593,106 @@
               <a:t>return</a:t>
             </a:r>
             <a:r>
-              <a:rPr>
+              <a:rPr dirty="0">
                 <a:latin typeface="Courier"/>
               </a:rPr>
-              <a:t> prior_density_function(sampling_value, prior_parameter_values)    </a:t>
-            </a:r>
-            <a:br/>
-            <a:r>
-              <a:rPr>
+              <a:t> </a:t>
+            </a:r>
+            <a:r>
+              <a:rPr dirty="0" err="1">
+                <a:latin typeface="Courier"/>
+              </a:rPr>
+              <a:t>prior_density_function</a:t>
+            </a:r>
+            <a:r>
+              <a:rPr dirty="0">
+                <a:latin typeface="Courier"/>
+              </a:rPr>
+              <a:t>(</a:t>
+            </a:r>
+            <a:r>
+              <a:rPr dirty="0" err="1">
+                <a:latin typeface="Courier"/>
+              </a:rPr>
+              <a:t>sampling_value</a:t>
+            </a:r>
+            <a:r>
+              <a:rPr dirty="0">
+                <a:latin typeface="Courier"/>
+              </a:rPr>
+              <a:t>, </a:t>
+            </a:r>
+            <a:r>
+              <a:rPr dirty="0" err="1">
+                <a:latin typeface="Courier"/>
+              </a:rPr>
+              <a:t>prior_parameter_values</a:t>
+            </a:r>
+            <a:r>
+              <a:rPr dirty="0">
+                <a:latin typeface="Courier"/>
+              </a:rPr>
+              <a:t>)    </a:t>
+            </a:r>
+            <a:br>
+              <a:rPr dirty="0"/>
+            </a:br>
+            <a:r>
+              <a:rPr dirty="0">
                 <a:latin typeface="Courier"/>
               </a:rPr>
               <a:t>    </a:t>
             </a:r>
-            <a:br/>
-            <a:r>
-              <a:rPr>
+            <a:br>
+              <a:rPr dirty="0"/>
+            </a:br>
+            <a:r>
+              <a:rPr dirty="0" err="1">
                 <a:latin typeface="Courier"/>
               </a:rPr>
-              <a:t>ComputePosterior(variables, lower_limits, upper_limits):    </a:t>
-            </a:r>
-            <a:br/>
-            <a:r>
-              <a:rPr>
+              <a:t>ComputePosterior</a:t>
+            </a:r>
+            <a:r>
+              <a:rPr dirty="0">
+                <a:latin typeface="Courier"/>
+              </a:rPr>
+              <a:t>(variables, </a:t>
+            </a:r>
+            <a:r>
+              <a:rPr dirty="0" err="1">
+                <a:latin typeface="Courier"/>
+              </a:rPr>
+              <a:t>lower_limits</a:t>
+            </a:r>
+            <a:r>
+              <a:rPr dirty="0">
+                <a:latin typeface="Courier"/>
+              </a:rPr>
+              <a:t>, </a:t>
+            </a:r>
+            <a:r>
+              <a:rPr dirty="0" err="1">
+                <a:latin typeface="Courier"/>
+              </a:rPr>
+              <a:t>upper_limits</a:t>
+            </a:r>
+            <a:r>
+              <a:rPr dirty="0">
+                <a:latin typeface="Courier"/>
+              </a:rPr>
+              <a:t>):    </a:t>
+            </a:r>
+            <a:br>
+              <a:rPr dirty="0"/>
+            </a:br>
+            <a:r>
+              <a:rPr dirty="0">
                 <a:latin typeface="Courier"/>
               </a:rPr>
               <a:t>    </a:t>
             </a:r>
             <a:r>
-              <a:rPr i="1">
+              <a:rPr i="1" dirty="0">
                 <a:solidFill>
                   <a:srgbClr val="60A0B0"/>
                 </a:solidFill>
@@ -15217,15 +15700,29 @@
               </a:rPr>
               <a:t># Initialize the sampling grid</a:t>
             </a:r>
-            <a:br/>
-            <a:r>
-              <a:rPr>
+            <a:br>
+              <a:rPr dirty="0"/>
+            </a:br>
+            <a:r>
+              <a:rPr dirty="0">
                 <a:latin typeface="Courier"/>
               </a:rPr>
-              <a:t>    Grid </a:t>
-            </a:r>
-            <a:r>
-              <a:rPr>
+              <a:t>    </a:t>
+            </a:r>
+            <a:r>
+              <a:rPr dirty="0" err="1">
+                <a:latin typeface="Courier"/>
+              </a:rPr>
+              <a:t>Grid</a:t>
+            </a:r>
+            <a:r>
+              <a:rPr dirty="0">
+                <a:latin typeface="Courier"/>
+              </a:rPr>
+              <a:t> </a:t>
+            </a:r>
+            <a:r>
+              <a:rPr dirty="0">
                 <a:solidFill>
                   <a:srgbClr val="666666"/>
                 </a:solidFill>
@@ -15234,27 +15731,67 @@
               <a:t>=</a:t>
             </a:r>
             <a:r>
-              <a:rPr>
+              <a:rPr dirty="0">
                 <a:latin typeface="Courier"/>
               </a:rPr>
-              <a:t> CreateGrid(variables, lower_limits, upper_limits)</a:t>
-            </a:r>
-            <a:br/>
-            <a:r>
-              <a:rPr>
+              <a:t> </a:t>
+            </a:r>
+            <a:r>
+              <a:rPr dirty="0" err="1">
+                <a:latin typeface="Courier"/>
+              </a:rPr>
+              <a:t>CreateGrid</a:t>
+            </a:r>
+            <a:r>
+              <a:rPr dirty="0">
+                <a:latin typeface="Courier"/>
+              </a:rPr>
+              <a:t>(variables, </a:t>
+            </a:r>
+            <a:r>
+              <a:rPr dirty="0" err="1">
+                <a:latin typeface="Courier"/>
+              </a:rPr>
+              <a:t>lower_limits</a:t>
+            </a:r>
+            <a:r>
+              <a:rPr dirty="0">
+                <a:latin typeface="Courier"/>
+              </a:rPr>
+              <a:t>, </a:t>
+            </a:r>
+            <a:r>
+              <a:rPr dirty="0" err="1">
+                <a:latin typeface="Courier"/>
+              </a:rPr>
+              <a:t>upper_limits</a:t>
+            </a:r>
+            <a:r>
+              <a:rPr dirty="0">
+                <a:latin typeface="Courier"/>
+              </a:rPr>
+              <a:t>)</a:t>
+            </a:r>
+            <a:br>
+              <a:rPr dirty="0"/>
+            </a:br>
+            <a:r>
+              <a:rPr dirty="0">
                 <a:latin typeface="Courier"/>
               </a:rPr>
               <a:t>    </a:t>
             </a:r>
-            <a:br/>
-            <a:r>
-              <a:rPr>
+            <a:br>
+              <a:rPr dirty="0"/>
+            </a:br>
+            <a:r>
+              <a:rPr dirty="0">
                 <a:latin typeface="Courier"/>
               </a:rPr>
               <a:t>    </a:t>
             </a:r>
             <a:r>
-              <a:rPr i="1">
+              <a:rPr i="1" dirty="0">
                 <a:solidFill>
                   <a:srgbClr val="60A0B0"/>
                 </a:solidFill>
@@ -15262,15 +15799,17 @@
               </a:rPr>
               <a:t># Initialize array to hold sampled posterior values       </a:t>
             </a:r>
-            <a:br/>
-            <a:r>
-              <a:rPr>
+            <a:br>
+              <a:rPr dirty="0"/>
+            </a:br>
+            <a:r>
+              <a:rPr dirty="0">
                 <a:latin typeface="Courier"/>
               </a:rPr>
               <a:t>    array posterior[</a:t>
             </a:r>
             <a:r>
-              <a:rPr>
+              <a:rPr dirty="0">
                 <a:solidFill>
                   <a:srgbClr val="008000"/>
                 </a:solidFill>
@@ -15279,21 +15818,25 @@
               <a:t>range</a:t>
             </a:r>
             <a:r>
-              <a:rPr>
+              <a:rPr dirty="0">
                 <a:latin typeface="Courier"/>
               </a:rPr>
               <a:t>(Grid)]</a:t>
             </a:r>
-            <a:br/>
-            <a:br/>
-            <a:r>
-              <a:rPr>
+            <a:br>
+              <a:rPr dirty="0"/>
+            </a:br>
+            <a:br>
+              <a:rPr dirty="0"/>
+            </a:br>
+            <a:r>
+              <a:rPr dirty="0">
                 <a:latin typeface="Courier"/>
               </a:rPr>
               <a:t>    </a:t>
             </a:r>
             <a:r>
-              <a:rPr i="1">
+              <a:rPr i="1" dirty="0">
                 <a:solidFill>
                   <a:srgbClr val="60A0B0"/>
                 </a:solidFill>
@@ -15301,15 +15844,17 @@
               </a:rPr>
               <a:t># Compute posterior at each sampling value in the grid  </a:t>
             </a:r>
-            <a:br/>
-            <a:r>
-              <a:rPr>
+            <a:br>
+              <a:rPr dirty="0"/>
+            </a:br>
+            <a:r>
+              <a:rPr dirty="0">
                 <a:latin typeface="Courier"/>
               </a:rPr>
               <a:t>    </a:t>
             </a:r>
             <a:r>
-              <a:rPr b="1">
+              <a:rPr b="1" dirty="0">
                 <a:solidFill>
                   <a:srgbClr val="007020"/>
                 </a:solidFill>
@@ -15318,13 +15863,25 @@
               <a:t>for</a:t>
             </a:r>
             <a:r>
-              <a:rPr>
+              <a:rPr dirty="0">
                 <a:latin typeface="Courier"/>
               </a:rPr>
-              <a:t> sampling_value </a:t>
-            </a:r>
-            <a:r>
-              <a:rPr b="1">
+              <a:t> </a:t>
+            </a:r>
+            <a:r>
+              <a:rPr dirty="0" err="1">
+                <a:latin typeface="Courier"/>
+              </a:rPr>
+              <a:t>sampling_value</a:t>
+            </a:r>
+            <a:r>
+              <a:rPr dirty="0">
+                <a:latin typeface="Courier"/>
+              </a:rPr>
+              <a:t> </a:t>
+            </a:r>
+            <a:r>
+              <a:rPr b="1" dirty="0">
                 <a:solidFill>
                   <a:srgbClr val="007020"/>
                 </a:solidFill>
@@ -15333,13 +15890,13 @@
               <a:t>in</a:t>
             </a:r>
             <a:r>
-              <a:rPr>
+              <a:rPr dirty="0">
                 <a:latin typeface="Courier"/>
               </a:rPr>
               <a:t> </a:t>
             </a:r>
             <a:r>
-              <a:rPr>
+              <a:rPr dirty="0">
                 <a:solidFill>
                   <a:srgbClr val="008000"/>
                 </a:solidFill>
@@ -15348,20 +15905,46 @@
               <a:t>range</a:t>
             </a:r>
             <a:r>
-              <a:rPr>
+              <a:rPr dirty="0">
                 <a:latin typeface="Courier"/>
               </a:rPr>
-              <a:t>(lower_limits, upper_limits):   </a:t>
-            </a:r>
-            <a:br/>
-            <a:r>
-              <a:rPr>
+              <a:t>(</a:t>
+            </a:r>
+            <a:r>
+              <a:rPr dirty="0" err="1">
+                <a:latin typeface="Courier"/>
+              </a:rPr>
+              <a:t>lower_limits</a:t>
+            </a:r>
+            <a:r>
+              <a:rPr dirty="0">
+                <a:latin typeface="Courier"/>
+              </a:rPr>
+              <a:t>, </a:t>
+            </a:r>
+            <a:r>
+              <a:rPr dirty="0" err="1">
+                <a:latin typeface="Courier"/>
+              </a:rPr>
+              <a:t>upper_limits</a:t>
+            </a:r>
+            <a:r>
+              <a:rPr dirty="0">
+                <a:latin typeface="Courier"/>
+              </a:rPr>
+              <a:t>):   </a:t>
+            </a:r>
+            <a:br>
+              <a:rPr dirty="0"/>
+            </a:br>
+            <a:r>
+              <a:rPr dirty="0">
                 <a:latin typeface="Courier"/>
               </a:rPr>
               <a:t>        likelihood </a:t>
             </a:r>
             <a:r>
-              <a:rPr>
+              <a:rPr dirty="0">
                 <a:solidFill>
                   <a:srgbClr val="666666"/>
                 </a:solidFill>
@@ -15370,20 +15953,58 @@
               <a:t>=</a:t>
             </a:r>
             <a:r>
-              <a:rPr>
+              <a:rPr dirty="0">
                 <a:latin typeface="Courier"/>
               </a:rPr>
-              <a:t> SampleLikelihood(sampling_value, observation_values)</a:t>
-            </a:r>
-            <a:br/>
-            <a:r>
-              <a:rPr>
+              <a:t> </a:t>
+            </a:r>
+            <a:r>
+              <a:rPr dirty="0" err="1">
+                <a:latin typeface="Courier"/>
+              </a:rPr>
+              <a:t>SampleLikelihood</a:t>
+            </a:r>
+            <a:r>
+              <a:rPr dirty="0">
+                <a:latin typeface="Courier"/>
+              </a:rPr>
+              <a:t>(</a:t>
+            </a:r>
+            <a:r>
+              <a:rPr dirty="0" err="1">
+                <a:latin typeface="Courier"/>
+              </a:rPr>
+              <a:t>sampling_value</a:t>
+            </a:r>
+            <a:r>
+              <a:rPr dirty="0">
+                <a:latin typeface="Courier"/>
+              </a:rPr>
+              <a:t>, </a:t>
+            </a:r>
+            <a:r>
+              <a:rPr dirty="0" err="1">
+                <a:latin typeface="Courier"/>
+              </a:rPr>
+              <a:t>observation_values</a:t>
+            </a:r>
+            <a:r>
+              <a:rPr dirty="0">
+                <a:latin typeface="Courier"/>
+              </a:rPr>
+              <a:t>)</a:t>
+            </a:r>
+            <a:br>
+              <a:rPr dirty="0"/>
+            </a:br>
+            <a:r>
+              <a:rPr dirty="0">
                 <a:latin typeface="Courier"/>
               </a:rPr>
               <a:t>        prior </a:t>
             </a:r>
             <a:r>
-              <a:rPr>
+              <a:rPr dirty="0">
                 <a:solidFill>
                   <a:srgbClr val="666666"/>
                 </a:solidFill>
@@ -15392,20 +16013,58 @@
               <a:t>=</a:t>
             </a:r>
             <a:r>
-              <a:rPr>
+              <a:rPr dirty="0">
                 <a:latin typeface="Courier"/>
               </a:rPr>
-              <a:t> Prior(sampling_values, prior_parameter_value)   </a:t>
-            </a:r>
-            <a:br/>
-            <a:r>
-              <a:rPr>
+              <a:t> Prior(</a:t>
+            </a:r>
+            <a:r>
+              <a:rPr dirty="0" err="1">
                 <a:latin typeface="Courier"/>
               </a:rPr>
-              <a:t>        posterior[sampling_value] </a:t>
-            </a:r>
-            <a:r>
-              <a:rPr>
+              <a:t>sampling_values</a:t>
+            </a:r>
+            <a:r>
+              <a:rPr dirty="0">
+                <a:latin typeface="Courier"/>
+              </a:rPr>
+              <a:t>, </a:t>
+            </a:r>
+            <a:r>
+              <a:rPr dirty="0" err="1">
+                <a:latin typeface="Courier"/>
+              </a:rPr>
+              <a:t>prior_parameter_value</a:t>
+            </a:r>
+            <a:r>
+              <a:rPr dirty="0">
+                <a:latin typeface="Courier"/>
+              </a:rPr>
+              <a:t>)   </a:t>
+            </a:r>
+            <a:br>
+              <a:rPr dirty="0"/>
+            </a:br>
+            <a:r>
+              <a:rPr dirty="0">
+                <a:latin typeface="Courier"/>
+              </a:rPr>
+              <a:t>        posterior[</a:t>
+            </a:r>
+            <a:r>
+              <a:rPr dirty="0" err="1">
+                <a:latin typeface="Courier"/>
+              </a:rPr>
+              <a:t>sampling_value</a:t>
+            </a:r>
+            <a:r>
+              <a:rPr dirty="0">
+                <a:latin typeface="Courier"/>
+              </a:rPr>
+              <a:t>] </a:t>
+            </a:r>
+            <a:r>
+              <a:rPr dirty="0">
                 <a:solidFill>
                   <a:srgbClr val="666666"/>
                 </a:solidFill>
@@ -15414,13 +16073,13 @@
               <a:t>=</a:t>
             </a:r>
             <a:r>
-              <a:rPr>
+              <a:rPr dirty="0">
                 <a:latin typeface="Courier"/>
               </a:rPr>
               <a:t> likelihood </a:t>
             </a:r>
             <a:r>
-              <a:rPr>
+              <a:rPr dirty="0">
                 <a:solidFill>
                   <a:srgbClr val="666666"/>
                 </a:solidFill>
@@ -15429,21 +16088,25 @@
               <a:t>*</a:t>
             </a:r>
             <a:r>
-              <a:rPr>
+              <a:rPr dirty="0">
                 <a:latin typeface="Courier"/>
               </a:rPr>
               <a:t> prior</a:t>
             </a:r>
-            <a:br/>
-            <a:br/>
-            <a:r>
-              <a:rPr>
+            <a:br>
+              <a:rPr dirty="0"/>
+            </a:br>
+            <a:br>
+              <a:rPr dirty="0"/>
+            </a:br>
+            <a:r>
+              <a:rPr dirty="0">
                 <a:latin typeface="Courier"/>
               </a:rPr>
               <a:t>    </a:t>
             </a:r>
             <a:r>
-              <a:rPr i="1">
+              <a:rPr i="1" dirty="0">
                 <a:solidFill>
                   <a:srgbClr val="60A0B0"/>
                 </a:solidFill>
@@ -15451,15 +16114,29 @@
               </a:rPr>
               <a:t># Normalize the posterior       </a:t>
             </a:r>
-            <a:br/>
-            <a:r>
-              <a:rPr>
+            <a:br>
+              <a:rPr dirty="0"/>
+            </a:br>
+            <a:r>
+              <a:rPr dirty="0">
                 <a:latin typeface="Courier"/>
               </a:rPr>
-              <a:t>    probability_data </a:t>
-            </a:r>
-            <a:r>
-              <a:rPr>
+              <a:t>    </a:t>
+            </a:r>
+            <a:r>
+              <a:rPr dirty="0" err="1">
+                <a:latin typeface="Courier"/>
+              </a:rPr>
+              <a:t>probability_data</a:t>
+            </a:r>
+            <a:r>
+              <a:rPr dirty="0">
+                <a:latin typeface="Courier"/>
+              </a:rPr>
+              <a:t> </a:t>
+            </a:r>
+            <a:r>
+              <a:rPr dirty="0">
                 <a:solidFill>
                   <a:srgbClr val="666666"/>
                 </a:solidFill>
@@ -15468,13 +16145,13 @@
               <a:t>=</a:t>
             </a:r>
             <a:r>
-              <a:rPr>
+              <a:rPr dirty="0">
                 <a:latin typeface="Courier"/>
               </a:rPr>
               <a:t> </a:t>
             </a:r>
             <a:r>
-              <a:rPr>
+              <a:rPr dirty="0">
                 <a:solidFill>
                   <a:srgbClr val="008000"/>
                 </a:solidFill>
@@ -15483,13 +16160,13 @@
               <a:t>sum</a:t>
             </a:r>
             <a:r>
-              <a:rPr>
+              <a:rPr dirty="0">
                 <a:latin typeface="Courier"/>
               </a:rPr>
               <a:t>(posterior[</a:t>
             </a:r>
             <a:r>
-              <a:rPr>
+              <a:rPr dirty="0">
                 <a:solidFill>
                   <a:srgbClr val="008000"/>
                 </a:solidFill>
@@ -15498,20 +16175,22 @@
               <a:t>range</a:t>
             </a:r>
             <a:r>
-              <a:rPr>
+              <a:rPr dirty="0">
                 <a:latin typeface="Courier"/>
               </a:rPr>
               <a:t>(Grid)])</a:t>
             </a:r>
-            <a:br/>
-            <a:r>
-              <a:rPr>
+            <a:br>
+              <a:rPr dirty="0"/>
+            </a:br>
+            <a:r>
+              <a:rPr dirty="0">
                 <a:latin typeface="Courier"/>
               </a:rPr>
               <a:t>    posterior </a:t>
             </a:r>
             <a:r>
-              <a:rPr>
+              <a:rPr dirty="0">
                 <a:solidFill>
                   <a:srgbClr val="666666"/>
                 </a:solidFill>
@@ -15520,13 +16199,13 @@
               <a:t>=</a:t>
             </a:r>
             <a:r>
-              <a:rPr>
+              <a:rPr dirty="0">
                 <a:latin typeface="Courier"/>
               </a:rPr>
               <a:t> posterior[</a:t>
             </a:r>
             <a:r>
-              <a:rPr>
+              <a:rPr dirty="0">
                 <a:solidFill>
                   <a:srgbClr val="008000"/>
                 </a:solidFill>
@@ -15535,13 +16214,13 @@
               <a:t>range</a:t>
             </a:r>
             <a:r>
-              <a:rPr>
+              <a:rPr dirty="0">
                 <a:latin typeface="Courier"/>
               </a:rPr>
               <a:t>(Grid)]</a:t>
             </a:r>
             <a:r>
-              <a:rPr>
+              <a:rPr dirty="0">
                 <a:solidFill>
                   <a:srgbClr val="666666"/>
                 </a:solidFill>
@@ -15550,20 +16229,28 @@
               <a:t>/</a:t>
             </a:r>
             <a:r>
-              <a:rPr>
+              <a:rPr dirty="0" err="1">
                 <a:latin typeface="Courier"/>
               </a:rPr>
-              <a:t>probability_data </a:t>
-            </a:r>
-            <a:br/>
-            <a:r>
-              <a:rPr>
+              <a:t>probability_data</a:t>
+            </a:r>
+            <a:r>
+              <a:rPr dirty="0">
+                <a:latin typeface="Courier"/>
+              </a:rPr>
+              <a:t> </a:t>
+            </a:r>
+            <a:br>
+              <a:rPr dirty="0"/>
+            </a:br>
+            <a:r>
+              <a:rPr dirty="0">
                 <a:latin typeface="Courier"/>
               </a:rPr>
               <a:t>    </a:t>
             </a:r>
             <a:r>
-              <a:rPr b="1">
+              <a:rPr b="1" dirty="0">
                 <a:solidFill>
                   <a:srgbClr val="007020"/>
                 </a:solidFill>
@@ -15572,7 +16259,7 @@
               <a:t>return</a:t>
             </a:r>
             <a:r>
-              <a:rPr>
+              <a:rPr dirty="0">
                 <a:latin typeface="Courier"/>
               </a:rPr>
               <a:t> posterior    </a:t>
@@ -15642,7 +16329,7 @@
         <p:spPr/>
         <p:txBody>
           <a:bodyPr>
-            <a:normAutofit fontScale="92500" lnSpcReduction="20000"/>
+            <a:normAutofit fontScale="92500" lnSpcReduction="10000"/>
           </a:bodyPr>
           <a:lstStyle/>
           <a:p>
@@ -15650,56 +16337,63 @@
               <a:buNone/>
             </a:pPr>
             <a:r>
+              <a:rPr dirty="0"/>
               <a:t>There are several variations of the basic nonparametric bootstrap algorithm</a:t>
             </a:r>
           </a:p>
           <a:p>
             <a:pPr lvl="0"/>
             <a:r>
+              <a:rPr dirty="0"/>
               <a:t>One sample bootstrap</a:t>
             </a:r>
           </a:p>
           <a:p>
             <a:pPr lvl="1"/>
             <a:r>
+              <a:rPr dirty="0"/>
               <a:t>Inference on single statistic,</a:t>
             </a:r>
           </a:p>
           <a:p>
             <a:pPr lvl="1"/>
             <a:r>
+              <a:rPr dirty="0"/>
               <a:t>e.g. inference on mean or variance</a:t>
             </a:r>
           </a:p>
           <a:p>
             <a:pPr lvl="0"/>
             <a:r>
+              <a:rPr dirty="0"/>
               <a:t>Two sample bootstrap</a:t>
             </a:r>
           </a:p>
           <a:p>
             <a:pPr lvl="1"/>
             <a:r>
+              <a:rPr dirty="0"/>
               <a:t>Inference two sample statistic</a:t>
             </a:r>
-            <a:br/>
-            <a:endParaRPr/>
           </a:p>
           <a:p>
             <a:pPr lvl="1"/>
             <a:r>
+              <a:rPr dirty="0"/>
               <a:t>e.g. difference of means</a:t>
             </a:r>
           </a:p>
           <a:p>
             <a:pPr lvl="0"/>
             <a:r>
+              <a:rPr dirty="0"/>
               <a:t>Special cases</a:t>
             </a:r>
           </a:p>
           <a:p>
             <a:pPr lvl="1"/>
             <a:r>
+              <a:rPr dirty="0"/>
               <a:t>Correlation coefficients - part of your assignment</a:t>
             </a:r>
           </a:p>
@@ -15754,8 +16448,8 @@
           </a:p>
         </p:txBody>
       </p:sp>
-      <mc:AlternateContent xmlns:mc="http://schemas.openxmlformats.org/markup-compatibility/2006" xmlns:a14="http://schemas.microsoft.com/office/drawing/2010/main">
-        <mc:Choice Requires="a14">
+      <mc:AlternateContent xmlns:mc="http://schemas.openxmlformats.org/markup-compatibility/2006">
+        <mc:Choice xmlns:a14="http://schemas.microsoft.com/office/drawing/2010/main" Requires="a14">
           <p:sp>
             <p:nvSpPr>
               <p:cNvPr id="3" name="Content Placeholder 2"/>
@@ -15766,10 +16460,15 @@
                 <p:ph idx="1"/>
               </p:nvPr>
             </p:nvSpPr>
-            <p:spPr/>
+            <p:spPr>
+              <a:xfrm>
+                <a:off x="457200" y="1200150"/>
+                <a:ext cx="8229600" cy="3668521"/>
+              </a:xfrm>
+            </p:spPr>
             <p:txBody>
               <a:bodyPr>
-                <a:normAutofit fontScale="77500" lnSpcReduction="20000"/>
+                <a:normAutofit fontScale="85000" lnSpcReduction="10000"/>
               </a:bodyPr>
               <a:lstStyle/>
               <a:p>
@@ -15777,82 +16476,95 @@
                   <a:buNone/>
                 </a:pPr>
                 <a:r>
+                  <a:rPr dirty="0"/>
                   <a:t>How can we specify the uncertainty for a Bayesian parameter estimate?</a:t>
                 </a:r>
               </a:p>
               <a:p>
                 <a:pPr lvl="0"/>
                 <a:r>
+                  <a:rPr dirty="0"/>
                   <a:t>For frequentist analysis we use confidence intervals, but not entirely appropriate</a:t>
                 </a:r>
               </a:p>
               <a:p>
                 <a:pPr lvl="1"/>
                 <a:r>
+                  <a:rPr dirty="0"/>
                   <a:t>Confidence intervals are based on a </a:t>
                 </a:r>
                 <a:r>
-                  <a:rPr b="1"/>
+                  <a:rPr b="1" dirty="0"/>
                   <a:t>sampling distribution</a:t>
                 </a:r>
-                <a:br/>
-                <a:endParaRPr/>
+                <a:endParaRPr dirty="0"/>
               </a:p>
               <a:p>
                 <a:pPr lvl="1"/>
                 <a:r>
+                  <a:rPr dirty="0"/>
                   <a:t>The upper and lower confidence intervals quantiles of the sampling distribution</a:t>
                 </a:r>
-                <a:br/>
-                <a:endParaRPr/>
               </a:p>
               <a:p>
                 <a:pPr lvl="1"/>
                 <a:r>
+                  <a:rPr dirty="0"/>
                   <a:t>Bayesian analysis has no sampling distribution uses a prior distribution and likelihood</a:t>
                 </a:r>
               </a:p>
               <a:p>
                 <a:pPr lvl="0"/>
                 <a:r>
-                  <a:t>For Bayesian analysis inference performed on posterior distribution</a:t>
+                  <a:rPr dirty="0"/>
+                  <a:t>For Bayesian analysis </a:t>
+                </a:r>
+                <a:r>
+                  <a:rPr b="1" dirty="0"/>
+                  <a:t>inference performed on posterior distribution</a:t>
                 </a:r>
               </a:p>
               <a:p>
                 <a:pPr lvl="1"/>
                 <a:r>
+                  <a:rPr dirty="0"/>
                   <a:t>We use a concept known as the </a:t>
                 </a:r>
                 <a:r>
-                  <a:rPr b="1"/>
+                  <a:rPr b="1" dirty="0"/>
                   <a:t>credible interval</a:t>
                 </a:r>
-                <a:br/>
-                <a:endParaRPr/>
+                <a:endParaRPr dirty="0"/>
               </a:p>
               <a:p>
                 <a:pPr lvl="1"/>
                 <a:r>
-                  <a:t>A credible interval is an interval on the Bayesian posterior distribution with the highest </a:t>
+                  <a:rPr dirty="0"/>
+                  <a:t>A credible interval is an interval on the Bayesian posterior distribution with the </a:t>
+                </a:r>
+                <a:r>
+                  <a:rPr b="1" dirty="0"/>
+                  <a:t>highest </a:t>
                 </a:r>
                 <a14:m>
                   <m:oMath xmlns:m="http://schemas.openxmlformats.org/officeDocument/2006/math">
                     <m:r>
-                      <a:rPr>
+                      <a:rPr b="1" i="1">
                         <a:latin typeface="Cambria Math" panose="02040503050406030204" pitchFamily="18" charset="0"/>
                       </a:rPr>
-                      <m:t>𝛼</m:t>
+                      <m:t>𝛂</m:t>
                     </m:r>
                   </m:oMath>
                 </a14:m>
                 <a:r>
+                  <a:rPr b="1" dirty="0"/>
                   <a:t> proportion of posterior probability</a:t>
                 </a:r>
               </a:p>
             </p:txBody>
           </p:sp>
         </mc:Choice>
-        <mc:Fallback xmlns="">
+        <mc:Fallback>
           <p:sp>
             <p:nvSpPr>
               <p:cNvPr id="3" name="Content Placeholder 2"/>
@@ -15864,10 +16576,14 @@
               </p:nvPr>
             </p:nvSpPr>
             <p:spPr>
+              <a:xfrm>
+                <a:off x="457200" y="1200150"/>
+                <a:ext cx="8229600" cy="3668521"/>
+              </a:xfrm>
               <a:blipFill>
                 <a:blip r:embed="rId2"/>
                 <a:stretch>
-                  <a:fillRect l="-667" t="-2334"/>
+                  <a:fillRect l="-741" t="-1827" r="-519"/>
                 </a:stretch>
               </a:blipFill>
             </p:spPr>
@@ -15935,8 +16651,8 @@
           </a:p>
         </p:txBody>
       </p:sp>
-      <mc:AlternateContent xmlns:mc="http://schemas.openxmlformats.org/markup-compatibility/2006" xmlns:a14="http://schemas.microsoft.com/office/drawing/2010/main">
-        <mc:Choice Requires="a14">
+      <mc:AlternateContent xmlns:mc="http://schemas.openxmlformats.org/markup-compatibility/2006">
+        <mc:Choice xmlns:a14="http://schemas.microsoft.com/office/drawing/2010/main" Requires="a14">
           <p:sp>
             <p:nvSpPr>
               <p:cNvPr id="3" name="Content Placeholder 2"/>
@@ -15947,10 +16663,15 @@
                 <p:ph idx="1"/>
               </p:nvPr>
             </p:nvSpPr>
-            <p:spPr/>
+            <p:spPr>
+              <a:xfrm>
+                <a:off x="457200" y="1200151"/>
+                <a:ext cx="8229600" cy="3737370"/>
+              </a:xfrm>
+            </p:spPr>
             <p:txBody>
               <a:bodyPr>
-                <a:normAutofit fontScale="92500" lnSpcReduction="20000"/>
+                <a:normAutofit fontScale="92500" lnSpcReduction="10000"/>
               </a:bodyPr>
               <a:lstStyle/>
               <a:p>
@@ -15958,12 +16679,14 @@
                   <a:buNone/>
                 </a:pPr>
                 <a:r>
+                  <a:rPr dirty="0"/>
                   <a:t>How can we specify the uncertainty for a Bayesian parameter estimate?</a:t>
                 </a:r>
               </a:p>
               <a:p>
                 <a:pPr lvl="0"/>
                 <a:r>
+                  <a:rPr dirty="0"/>
                   <a:t>Example, the </a:t>
                 </a:r>
                 <a14:m>
@@ -15978,58 +16701,64 @@
                       <a:rPr>
                         <a:latin typeface="Cambria Math" panose="02040503050406030204" pitchFamily="18" charset="0"/>
                       </a:rPr>
-                      <m:t>=</m:t>
-                    </m:r>
-                    <m:r>
-                      <a:rPr>
-                        <a:latin typeface="Cambria Math" panose="02040503050406030204" pitchFamily="18" charset="0"/>
-                      </a:rPr>
-                      <m:t>0</m:t>
-                    </m:r>
-                    <m:r>
-                      <a:rPr>
-                        <a:latin typeface="Cambria Math" panose="02040503050406030204" pitchFamily="18" charset="0"/>
-                      </a:rPr>
-                      <m:t>.</m:t>
-                    </m:r>
-                    <m:r>
-                      <a:rPr>
-                        <a:latin typeface="Cambria Math" panose="02040503050406030204" pitchFamily="18" charset="0"/>
-                      </a:rPr>
-                      <m:t>90</m:t>
+                      <m:t>=0.90</m:t>
                     </m:r>
                   </m:oMath>
                 </a14:m>
                 <a:r>
+                  <a:rPr dirty="0"/>
                   <a:t> credible interval encompasses the 90% of the posterior distribution with the highest density</a:t>
                 </a:r>
               </a:p>
               <a:p>
                 <a:pPr lvl="0"/>
                 <a:r>
+                  <a:rPr dirty="0"/>
                   <a:t>The credible interval is sometime called the </a:t>
                 </a:r>
                 <a:r>
-                  <a:rPr b="1"/>
+                  <a:rPr b="1" dirty="0"/>
                   <a:t>highest density interval (HDI)</a:t>
                 </a:r>
                 <a:r>
+                  <a:rPr dirty="0"/>
                   <a:t>, or </a:t>
                 </a:r>
                 <a:r>
-                  <a:rPr b="1"/>
+                  <a:rPr b="1" dirty="0"/>
                   <a:t>highest posterior density interval (HPDI)</a:t>
                 </a:r>
               </a:p>
               <a:p>
                 <a:pPr lvl="1"/>
                 <a:r>
-                  <a:t>These names make sense, since we seek the the densest posterior interval containing </a:t>
+                  <a:rPr dirty="0"/>
+                  <a:t>These names make sense, since we seek the </a:t>
+                </a:r>
+                <a:r>
+                  <a:rPr dirty="0" err="1"/>
+                  <a:t>the</a:t>
+                </a:r>
+                <a:r>
+                  <a:rPr dirty="0"/>
+                  <a:t> densest posterior interval </a:t>
+                </a:r>
+                <a:r>
+                  <a:rPr lang="en-US" dirty="0"/>
+                  <a:t>with</a:t>
+                </a:r>
+                <a:r>
+                  <a:rPr dirty="0"/>
+                  <a:t> probability</a:t>
+                </a:r>
+                <a:r>
+                  <a:rPr lang="en-US" dirty="0"/>
+                  <a:t> </a:t>
                 </a:r>
                 <a14:m>
                   <m:oMath xmlns:m="http://schemas.openxmlformats.org/officeDocument/2006/math">
                     <m:r>
-                      <a:rPr>
+                      <a:rPr lang="en-US" smtClean="0">
                         <a:latin typeface="Cambria Math" panose="02040503050406030204" pitchFamily="18" charset="0"/>
                       </a:rPr>
                       <m:t>𝛼</m:t>
@@ -16037,25 +16766,37 @@
                   </m:oMath>
                 </a14:m>
                 <a:r>
-                  <a:t> probability</a:t>
-                </a:r>
+                  <a:rPr lang="en-US" dirty="0"/>
+                  <a:t> </a:t>
+                </a:r>
+                <a:endParaRPr dirty="0"/>
               </a:p>
               <a:p>
                 <a:pPr lvl="0"/>
                 <a:r>
-                  <a:t>For symmetric distributions the credible interval can be numerically the same as the confidence interval</a:t>
+                  <a:rPr dirty="0"/>
+                  <a:t>For symmetric distributions the credible interval can numerically </a:t>
+                </a:r>
+                <a:r>
+                  <a:rPr lang="en-US" dirty="0"/>
+                  <a:t>be </a:t>
+                </a:r>
+                <a:r>
+                  <a:rPr dirty="0"/>
+                  <a:t>the same as the confidence interval</a:t>
                 </a:r>
               </a:p>
               <a:p>
                 <a:pPr lvl="1"/>
                 <a:r>
+                  <a:rPr dirty="0"/>
                   <a:t>In general, these two quantities can be quite different</a:t>
                 </a:r>
               </a:p>
             </p:txBody>
           </p:sp>
         </mc:Choice>
-        <mc:Fallback xmlns="">
+        <mc:Fallback>
           <p:sp>
             <p:nvSpPr>
               <p:cNvPr id="3" name="Content Placeholder 2"/>
@@ -16067,10 +16808,14 @@
               </p:nvPr>
             </p:nvSpPr>
             <p:spPr>
+              <a:xfrm>
+                <a:off x="457200" y="1200151"/>
+                <a:ext cx="8229600" cy="3737370"/>
+              </a:xfrm>
               <a:blipFill>
                 <a:blip r:embed="rId2"/>
                 <a:stretch>
-                  <a:fillRect l="-963" t="-3052" r="-1556"/>
+                  <a:fillRect l="-963" t="-2121" r="-1556"/>
                 </a:stretch>
               </a:blipFill>
             </p:spPr>
@@ -16245,8 +16990,8 @@
         </p:blipFill>
         <p:spPr bwMode="auto">
           <a:xfrm>
-            <a:off x="1435100" y="1193800"/>
-            <a:ext cx="6286500" cy="2882900"/>
+            <a:off x="1150620" y="1643639"/>
+            <a:ext cx="6733540" cy="3087906"/>
           </a:xfrm>
           <a:prstGeom prst="rect">
             <a:avLst/>
@@ -16267,8 +17012,8 @@
         </p:nvSpPr>
         <p:spPr>
           <a:xfrm>
-            <a:off x="457200" y="4076700"/>
-            <a:ext cx="8229600" cy="508000"/>
+            <a:off x="392176" y="4731545"/>
+            <a:ext cx="8229600" cy="350012"/>
           </a:xfrm>
           <a:prstGeom prst="rect">
             <a:avLst/>
@@ -16283,6 +17028,7 @@
               <a:buNone/>
             </a:pPr>
             <a:r>
+              <a:rPr dirty="0"/>
               <a:t>Probability of distract drivers for next 10 cars</a:t>
             </a:r>
           </a:p>
@@ -16332,13 +17078,14 @@
               <a:buNone/>
             </a:pPr>
             <a:r>
+              <a:rPr dirty="0"/>
               <a:t>Credible Intervals are not Confidence Intervals</a:t>
             </a:r>
           </a:p>
         </p:txBody>
       </p:sp>
-      <mc:AlternateContent xmlns:mc="http://schemas.openxmlformats.org/markup-compatibility/2006" xmlns:a14="http://schemas.microsoft.com/office/drawing/2010/main">
-        <mc:Choice Requires="a14">
+      <mc:AlternateContent xmlns:mc="http://schemas.openxmlformats.org/markup-compatibility/2006">
+        <mc:Choice xmlns:a14="http://schemas.microsoft.com/office/drawing/2010/main" Requires="a14">
           <p:sp>
             <p:nvSpPr>
               <p:cNvPr id="3" name="Content Placeholder 2"/>
@@ -16349,10 +17096,15 @@
                 <p:ph idx="1"/>
               </p:nvPr>
             </p:nvSpPr>
-            <p:spPr/>
+            <p:spPr>
+              <a:xfrm>
+                <a:off x="457200" y="914400"/>
+                <a:ext cx="8229600" cy="4116833"/>
+              </a:xfrm>
+            </p:spPr>
             <p:txBody>
               <a:bodyPr>
-                <a:normAutofit fontScale="70000" lnSpcReduction="20000"/>
+                <a:normAutofit fontScale="85000" lnSpcReduction="20000"/>
               </a:bodyPr>
               <a:lstStyle/>
               <a:p>
@@ -16360,108 +17112,113 @@
                   <a:buNone/>
                 </a:pPr>
                 <a:r>
+                  <a:rPr lang="en-US" dirty="0"/>
                   <a:t>How are credible intervals different from the more familiar confidence intervals?</a:t>
                 </a:r>
               </a:p>
               <a:p>
-                <a:pPr marL="0" lvl="0" indent="0">
-                  <a:buNone/>
-                </a:pPr>
-                <a:r>
-                  <a:t>Confidence intervials and credible intervals are conceptually quite different</a:t>
+                <a:r>
+                  <a:rPr lang="en-US" dirty="0"/>
+                  <a:t>Confidence intervals and credible intervals are conceptually quite different</a:t>
                 </a:r>
               </a:p>
               <a:p>
-                <a:pPr marL="0" lvl="0" indent="0">
-                  <a:buNone/>
-                </a:pPr>
-                <a:r>
-                  <a:t>A confidence interval is a purely frequentest concept</a:t>
-                </a:r>
-                <a:br/>
-                <a:r>
-                  <a:t>- Is an interval on the </a:t>
-                </a:r>
-                <a:r>
-                  <a:rPr b="1"/>
+                <a:r>
+                  <a:rPr lang="en-US" dirty="0"/>
+                  <a:t>A confidence interval is a purely frequentist concept</a:t>
+                </a:r>
+              </a:p>
+              <a:p>
+                <a:pPr lvl="1"/>
+                <a:r>
+                  <a:rPr lang="en-US" dirty="0"/>
+                  <a:t>Is an interval on the </a:t>
+                </a:r>
+                <a:r>
+                  <a:rPr lang="en-US" b="1" dirty="0"/>
                   <a:t>sampling distribution</a:t>
                 </a:r>
                 <a:r>
-                  <a:t> where repeated samples of a statistic are expected with probability </a:t>
+                  <a:rPr lang="en-US" dirty="0"/>
+                  <a:t> with probability </a:t>
                 </a:r>
                 <a14:m>
                   <m:oMath xmlns:m="http://schemas.openxmlformats.org/officeDocument/2006/math">
                     <m:r>
-                      <a:rPr>
+                      <a:rPr lang="en-US">
                         <a:latin typeface="Cambria Math" panose="02040503050406030204" pitchFamily="18" charset="0"/>
                       </a:rPr>
                       <m:t>=</m:t>
                     </m:r>
                     <m:r>
-                      <a:rPr>
+                      <a:rPr lang="en-US">
                         <a:latin typeface="Cambria Math" panose="02040503050406030204" pitchFamily="18" charset="0"/>
                       </a:rPr>
                       <m:t>𝛼</m:t>
                     </m:r>
                   </m:oMath>
                 </a14:m>
-                <a:br/>
-                <a:r>
-                  <a:t>- </a:t>
-                </a:r>
-                <a:r>
-                  <a:rPr b="1"/>
-                  <a:t>Cannot interpret</a:t>
-                </a:r>
-                <a:r>
-                  <a:t> a confidence interval as an interval on a probability distribution of the value of a statistic!</a:t>
-                </a:r>
+                <a:endParaRPr lang="en-US" dirty="0"/>
               </a:p>
               <a:p>
-                <a:pPr marL="0" lvl="0" indent="0">
-                  <a:buNone/>
-                </a:pPr>
-                <a:r>
+                <a:pPr lvl="1"/>
+                <a:r>
+                  <a:rPr lang="en-US" b="1" dirty="0"/>
+                  <a:t>Cannot interpret</a:t>
+                </a:r>
+                <a:r>
+                  <a:rPr lang="en-US" dirty="0"/>
+                  <a:t> a confidence interval as an interval on a population distribution of a statistic!</a:t>
+                </a:r>
+              </a:p>
+              <a:p>
+                <a:r>
+                  <a:rPr lang="en-US" dirty="0"/>
                   <a:t>Credible interval is an interval on a posterior distribution of the statistic</a:t>
                 </a:r>
-                <a:br/>
-                <a:r>
-                  <a:t>- Credible interval is exactly what the misinterpretation of the confidence interval tries to be</a:t>
-                </a:r>
-                <a:br/>
-                <a:r>
-                  <a:t>- Credible interval is the interval with highest </a:t>
+              </a:p>
+              <a:p>
+                <a:pPr lvl="1"/>
+                <a:r>
+                  <a:rPr lang="en-US" b="1" dirty="0"/>
+                  <a:t>Credible interval is the interval with highest </a:t>
                 </a:r>
                 <a14:m>
                   <m:oMath xmlns:m="http://schemas.openxmlformats.org/officeDocument/2006/math">
                     <m:r>
-                      <a:rPr>
+                      <a:rPr lang="en-US" b="1" i="1">
                         <a:latin typeface="Cambria Math" panose="02040503050406030204" pitchFamily="18" charset="0"/>
                       </a:rPr>
-                      <m:t>𝛼</m:t>
+                      <m:t>𝛂</m:t>
                     </m:r>
                   </m:oMath>
                 </a14:m>
                 <a:r>
-                  <a:t> probability for the statistic being estimated</a:t>
+                  <a:rPr lang="en-US" b="1" dirty="0"/>
+                  <a:t> probability</a:t>
+                </a:r>
+                <a:r>
+                  <a:rPr lang="en-US" dirty="0"/>
+                  <a:t> for the statistic being estimated</a:t>
                 </a:r>
               </a:p>
               <a:p>
-                <a:pPr marL="0" lvl="0" indent="0">
-                  <a:buNone/>
-                </a:pPr>
-                <a:r>
-                  <a:t>For symmetric posterior distributions, the credible interval will be numerically the same as the confidence interval</a:t>
-                </a:r>
-                <a:br/>
-                <a:r>
-                  <a:t>- This need not be the case in general</a:t>
+                <a:pPr lvl="1"/>
+                <a:r>
+                  <a:rPr lang="en-US" dirty="0"/>
+                  <a:t>Credible interval is exactly what the misinterpretation of the confidence interval tries to be</a:t>
+                </a:r>
+              </a:p>
+              <a:p>
+                <a:r>
+                  <a:rPr lang="en-US" dirty="0"/>
+                  <a:t>For symmetric distributions the credible interval and confidence interval are identical</a:t>
                 </a:r>
               </a:p>
             </p:txBody>
           </p:sp>
         </mc:Choice>
-        <mc:Fallback xmlns="">
+        <mc:Fallback>
           <p:sp>
             <p:nvSpPr>
               <p:cNvPr id="3" name="Content Placeholder 2"/>
@@ -16473,10 +17230,14 @@
               </p:nvPr>
             </p:nvSpPr>
             <p:spPr>
+              <a:xfrm>
+                <a:off x="457200" y="914400"/>
+                <a:ext cx="8229600" cy="4116833"/>
+              </a:xfrm>
               <a:blipFill>
                 <a:blip r:embed="rId2"/>
                 <a:stretch>
-                  <a:fillRect l="-444" t="-1975"/>
+                  <a:fillRect l="-741" t="-2074" r="-667"/>
                 </a:stretch>
               </a:blipFill>
             </p:spPr>
@@ -16554,27 +17315,37 @@
             <p:ph idx="1"/>
           </p:nvPr>
         </p:nvSpPr>
-        <p:spPr/>
+        <p:spPr>
+          <a:xfrm>
+            <a:off x="489712" y="1017271"/>
+            <a:ext cx="8479536" cy="1270761"/>
+          </a:xfrm>
+        </p:spPr>
         <p:txBody>
-          <a:bodyPr/>
+          <a:bodyPr>
+            <a:normAutofit fontScale="85000" lnSpcReduction="20000"/>
+          </a:bodyPr>
           <a:lstStyle/>
           <a:p>
             <a:pPr marL="0" lvl="0" indent="0">
               <a:buNone/>
             </a:pPr>
             <a:r>
+              <a:rPr dirty="0"/>
               <a:t>Compare confidence interval and credible interval for the case of 10 observations</a:t>
             </a:r>
           </a:p>
           <a:p>
             <a:pPr lvl="0"/>
             <a:r>
+              <a:rPr dirty="0"/>
               <a:t>Credible intervals cross the density function at exactly the same density</a:t>
             </a:r>
           </a:p>
           <a:p>
             <a:pPr lvl="0"/>
             <a:r>
+              <a:rPr dirty="0"/>
               <a:t>Confidence intervals have the same CDF in the tails beyond the interval</a:t>
             </a:r>
           </a:p>
@@ -16596,8 +17367,8 @@
         </p:blipFill>
         <p:spPr bwMode="auto">
           <a:xfrm>
-            <a:off x="1447800" y="1193800"/>
-            <a:ext cx="6261100" cy="2882900"/>
+            <a:off x="1155200" y="2217521"/>
+            <a:ext cx="5704832" cy="2626768"/>
           </a:xfrm>
           <a:prstGeom prst="rect">
             <a:avLst/>
@@ -16618,8 +17389,8 @@
         </p:nvSpPr>
         <p:spPr>
           <a:xfrm>
-            <a:off x="457200" y="4076700"/>
-            <a:ext cx="8229600" cy="508000"/>
+            <a:off x="489712" y="4730816"/>
+            <a:ext cx="7130290" cy="325441"/>
           </a:xfrm>
           <a:prstGeom prst="rect">
             <a:avLst/>
@@ -16634,6 +17405,7 @@
               <a:buNone/>
             </a:pPr>
             <a:r>
+              <a:rPr dirty="0"/>
               <a:t>Difference between credible and confidence intervals</a:t>
             </a:r>
           </a:p>
@@ -16685,6 +17457,7 @@
               <a:buNone/>
             </a:pPr>
             <a:r>
+              <a:rPr dirty="0"/>
               <a:t>Simulating from the posterior distribution: predictions</a:t>
             </a:r>
           </a:p>
@@ -16700,10 +17473,15 @@
             <p:ph idx="1"/>
           </p:nvPr>
         </p:nvSpPr>
-        <p:spPr/>
+        <p:spPr>
+          <a:xfrm>
+            <a:off x="457200" y="1200150"/>
+            <a:ext cx="8229600" cy="3680713"/>
+          </a:xfrm>
+        </p:spPr>
         <p:txBody>
           <a:bodyPr>
-            <a:normAutofit fontScale="92500" lnSpcReduction="20000"/>
+            <a:normAutofit lnSpcReduction="10000"/>
           </a:bodyPr>
           <a:lstStyle/>
           <a:p>
@@ -16711,38 +17489,42 @@
               <a:buNone/>
             </a:pPr>
             <a:r>
+              <a:rPr dirty="0"/>
               <a:t>What else can we do with a Bayesian posterior distribution beyond credible intervals?</a:t>
             </a:r>
           </a:p>
           <a:p>
             <a:pPr lvl="0"/>
             <a:r>
+              <a:rPr dirty="0"/>
               <a:t>Perform simulations and make predictions</a:t>
             </a:r>
           </a:p>
           <a:p>
             <a:pPr lvl="0"/>
             <a:r>
+              <a:rPr dirty="0"/>
               <a:t>Predictions are computed by simulating from the posterior distribution</a:t>
             </a:r>
           </a:p>
           <a:p>
             <a:pPr lvl="0"/>
             <a:r>
+              <a:rPr dirty="0"/>
               <a:t>Results of these simulations are useful for several purposes, including:</a:t>
             </a:r>
           </a:p>
           <a:p>
             <a:pPr lvl="1"/>
             <a:r>
+              <a:rPr dirty="0"/>
               <a:t>Predicting posterior values</a:t>
             </a:r>
-            <a:br/>
-            <a:endParaRPr/>
           </a:p>
           <a:p>
             <a:pPr lvl="1"/>
             <a:r>
+              <a:rPr dirty="0"/>
               <a:t>Model checking by comparing simulation results agree (or not) with observations</a:t>
             </a:r>
           </a:p>
@@ -16799,8 +17581,8 @@
           </a:p>
         </p:txBody>
       </p:sp>
-      <mc:AlternateContent xmlns:mc="http://schemas.openxmlformats.org/markup-compatibility/2006" xmlns:a14="http://schemas.microsoft.com/office/drawing/2010/main">
-        <mc:Choice Requires="a14">
+      <mc:AlternateContent xmlns:mc="http://schemas.openxmlformats.org/markup-compatibility/2006">
+        <mc:Choice xmlns:a14="http://schemas.microsoft.com/office/drawing/2010/main" Requires="a14">
           <p:sp>
             <p:nvSpPr>
               <p:cNvPr id="3" name="Content Placeholder 2"/>
@@ -16811,16 +17593,32 @@
                 <p:ph idx="1"/>
               </p:nvPr>
             </p:nvSpPr>
-            <p:spPr/>
+            <p:spPr>
+              <a:xfrm>
+                <a:off x="457200" y="1154177"/>
+                <a:ext cx="8229600" cy="728996"/>
+              </a:xfrm>
+            </p:spPr>
             <p:txBody>
-              <a:bodyPr/>
+              <a:bodyPr>
+                <a:normAutofit fontScale="92500" lnSpcReduction="10000"/>
+              </a:bodyPr>
               <a:lstStyle/>
               <a:p>
                 <a:pPr marL="0" lvl="0" indent="0">
                   <a:buNone/>
                 </a:pPr>
                 <a:r>
-                  <a:t>Example; What are the probabilities of distracted drivers for the next 10 cars with posterior, </a:t>
+                  <a:rPr dirty="0"/>
+                  <a:t>Example; What are the probabilities of distracted drivers for the next 10 cars </a:t>
+                </a:r>
+                <a:r>
+                  <a:rPr lang="en-US" dirty="0"/>
+                  <a:t>simulated from</a:t>
+                </a:r>
+                <a:r>
+                  <a:rPr dirty="0"/>
+                  <a:t> posterior, </a:t>
                 </a:r>
                 <a14:m>
                   <m:oMath xmlns:m="http://schemas.openxmlformats.org/officeDocument/2006/math">
@@ -16862,13 +17660,14 @@
                   </m:oMath>
                 </a14:m>
                 <a:r>
+                  <a:rPr dirty="0"/>
                   <a:t>?</a:t>
                 </a:r>
               </a:p>
             </p:txBody>
           </p:sp>
         </mc:Choice>
-        <mc:Fallback xmlns="">
+        <mc:Fallback>
           <p:sp>
             <p:nvSpPr>
               <p:cNvPr id="3" name="Content Placeholder 2"/>
@@ -16880,10 +17679,14 @@
               </p:nvPr>
             </p:nvSpPr>
             <p:spPr>
+              <a:xfrm>
+                <a:off x="457200" y="1154177"/>
+                <a:ext cx="8229600" cy="728996"/>
+              </a:xfrm>
               <a:blipFill>
                 <a:blip r:embed="rId2"/>
                 <a:stretch>
-                  <a:fillRect l="-1111" t="-1436"/>
+                  <a:fillRect l="-963" t="-10000" b="-12500"/>
                 </a:stretch>
               </a:blipFill>
             </p:spPr>
@@ -16918,7 +17721,7 @@
         </p:blipFill>
         <p:spPr bwMode="auto">
           <a:xfrm>
-            <a:off x="2527300" y="1193800"/>
+            <a:off x="2746756" y="1883173"/>
             <a:ext cx="4102100" cy="2882900"/>
           </a:xfrm>
           <a:prstGeom prst="rect">
@@ -16940,8 +17743,8 @@
         </p:nvSpPr>
         <p:spPr>
           <a:xfrm>
-            <a:off x="457200" y="4076700"/>
-            <a:ext cx="8229600" cy="508000"/>
+            <a:off x="603504" y="4731544"/>
+            <a:ext cx="8229600" cy="353535"/>
           </a:xfrm>
           <a:prstGeom prst="rect">
             <a:avLst/>
@@ -16956,6 +17759,7 @@
               <a:buNone/>
             </a:pPr>
             <a:r>
+              <a:rPr dirty="0"/>
               <a:t>Probability of distract drivers for next 10 cars</a:t>
             </a:r>
           </a:p>
@@ -17020,10 +17824,15 @@
             <p:ph idx="1"/>
           </p:nvPr>
         </p:nvSpPr>
-        <p:spPr/>
+        <p:spPr>
+          <a:xfrm>
+            <a:off x="457200" y="1200150"/>
+            <a:ext cx="8229600" cy="3684777"/>
+          </a:xfrm>
+        </p:spPr>
         <p:txBody>
           <a:bodyPr>
-            <a:normAutofit fontScale="55000" lnSpcReduction="20000"/>
+            <a:normAutofit fontScale="85000" lnSpcReduction="20000"/>
           </a:bodyPr>
           <a:lstStyle/>
           <a:p>
@@ -17031,74 +17840,136 @@
               <a:buNone/>
             </a:pPr>
             <a:r>
+              <a:rPr dirty="0"/>
               <a:t>Bayesian analysis is a contrast to frequentist methods</a:t>
             </a:r>
           </a:p>
           <a:p>
             <a:pPr lvl="0"/>
             <a:r>
-              <a:t>The objective of Bayesian analysis is to compute a posterior distribution</a:t>
-            </a:r>
-            <a:br/>
-            <a:endParaRPr/>
+              <a:rPr dirty="0"/>
+              <a:t>The objective of Bayesian analysis is to compute a </a:t>
+            </a:r>
+            <a:r>
+              <a:rPr b="1" dirty="0"/>
+              <a:t>posterior distribution</a:t>
+            </a:r>
           </a:p>
           <a:p>
             <a:pPr lvl="0"/>
             <a:r>
-              <a:t>Contrasts with frequentist statistics is to compute a point estimate and confidence interval from a sample</a:t>
+              <a:rPr dirty="0"/>
+              <a:t>Contrasts with frequentist statistics </a:t>
+            </a:r>
+            <a:r>
+              <a:rPr lang="en-US" dirty="0"/>
+              <a:t>which </a:t>
+            </a:r>
+            <a:r>
+              <a:rPr dirty="0"/>
+              <a:t>compute</a:t>
+            </a:r>
+            <a:r>
+              <a:rPr lang="en-US" dirty="0"/>
+              <a:t>s</a:t>
+            </a:r>
+            <a:r>
+              <a:rPr dirty="0"/>
+              <a:t> a </a:t>
+            </a:r>
+            <a:r>
+              <a:rPr b="1" dirty="0"/>
+              <a:t>point estimate </a:t>
+            </a:r>
+            <a:r>
+              <a:rPr dirty="0"/>
+              <a:t>and </a:t>
+            </a:r>
+            <a:r>
+              <a:rPr b="1" dirty="0"/>
+              <a:t>confidence interval </a:t>
+            </a:r>
+            <a:r>
+              <a:rPr dirty="0"/>
+              <a:t>from a sample</a:t>
             </a:r>
           </a:p>
           <a:p>
             <a:pPr lvl="0"/>
             <a:r>
-              <a:t>Bayesian models allow expressing prior information in the form of a prior distribution</a:t>
-            </a:r>
-            <a:br/>
-            <a:endParaRPr/>
+              <a:rPr dirty="0"/>
+              <a:t>Bayesian models allow expressing prior information in the form of a </a:t>
+            </a:r>
+            <a:r>
+              <a:rPr b="1" dirty="0"/>
+              <a:t>prior distribution</a:t>
+            </a:r>
           </a:p>
           <a:p>
             <a:pPr lvl="0"/>
             <a:r>
+              <a:rPr dirty="0"/>
               <a:t>Selection of prior distributions can be performed in a number of ways</a:t>
             </a:r>
           </a:p>
           <a:p>
             <a:pPr lvl="0"/>
             <a:r>
+              <a:rPr dirty="0"/>
               <a:t>The posterior distribution is said to quantify our current </a:t>
             </a:r>
             <a:r>
-              <a:rPr b="1"/>
+              <a:rPr b="1" dirty="0"/>
               <a:t>belief</a:t>
             </a:r>
-            <a:br/>
-            <a:endParaRPr/>
+            <a:endParaRPr dirty="0"/>
           </a:p>
           <a:p>
             <a:pPr lvl="0"/>
             <a:r>
-              <a:t>We update beliefs based on additional data or evidence</a:t>
-            </a:r>
-            <a:br/>
-            <a:endParaRPr/>
+              <a:rPr dirty="0"/>
+              <a:t>We </a:t>
+            </a:r>
+            <a:r>
+              <a:rPr b="1" dirty="0"/>
+              <a:t>update beliefs </a:t>
+            </a:r>
+            <a:r>
+              <a:rPr dirty="0"/>
+              <a:t>based on additional data or evidence</a:t>
+            </a:r>
           </a:p>
           <a:p>
             <a:pPr lvl="0"/>
             <a:r>
-              <a:t>A critical difference with frequentist models which must be computed from a complete sample</a:t>
-            </a:r>
-            <a:br/>
-            <a:endParaRPr/>
+              <a:rPr dirty="0"/>
+              <a:t>Inference can be performed on the posterior distribution by finding the </a:t>
+            </a:r>
+            <a:r>
+              <a:rPr b="1" dirty="0"/>
+              <a:t>maximum a </a:t>
+            </a:r>
+            <a:r>
+              <a:rPr b="1" dirty="0" err="1"/>
+              <a:t>postiori</a:t>
+            </a:r>
+            <a:r>
+              <a:rPr b="1" dirty="0"/>
+              <a:t> (MAP) </a:t>
+            </a:r>
+            <a:r>
+              <a:rPr dirty="0"/>
+              <a:t>value and a </a:t>
+            </a:r>
+            <a:r>
+              <a:rPr b="1" dirty="0"/>
+              <a:t>credible interval</a:t>
+            </a:r>
           </a:p>
           <a:p>
             <a:pPr lvl="0"/>
             <a:r>
-              <a:t>Inference can be performed on the posterior distribution by finding the maximum a postiori (MAP) value and a credible interval</a:t>
-            </a:r>
-          </a:p>
-          <a:p>
-            <a:pPr lvl="0"/>
-            <a:r>
+              <a:rPr dirty="0"/>
               <a:t>Predictions are made by simulating from the posterior distribution a</a:t>
             </a:r>
           </a:p>
@@ -17153,8 +18024,8 @@
           </a:p>
         </p:txBody>
       </p:sp>
-      <mc:AlternateContent xmlns:mc="http://schemas.openxmlformats.org/markup-compatibility/2006" xmlns:a14="http://schemas.microsoft.com/office/drawing/2010/main">
-        <mc:Choice Requires="a14">
+      <mc:AlternateContent xmlns:mc="http://schemas.openxmlformats.org/markup-compatibility/2006">
+        <mc:Choice xmlns:a14="http://schemas.microsoft.com/office/drawing/2010/main" Requires="a14">
           <p:sp>
             <p:nvSpPr>
               <p:cNvPr id="3" name="Content Placeholder 2"/>
@@ -17165,10 +18036,15 @@
                 <p:ph idx="1"/>
               </p:nvPr>
             </p:nvSpPr>
-            <p:spPr/>
+            <p:spPr>
+              <a:xfrm>
+                <a:off x="457200" y="1200150"/>
+                <a:ext cx="8229600" cy="3554729"/>
+              </a:xfrm>
+            </p:spPr>
             <p:txBody>
               <a:bodyPr>
-                <a:normAutofit fontScale="70000" lnSpcReduction="20000"/>
+                <a:normAutofit fontScale="85000" lnSpcReduction="20000"/>
               </a:bodyPr>
               <a:lstStyle/>
               <a:p>
@@ -17193,10 +18069,6 @@
                   <a:rPr dirty="0"/>
                   <a:t>Results can be no better than the sample you start with</a:t>
                 </a:r>
-                <a:br>
-                  <a:rPr dirty="0"/>
-                </a:br>
-                <a:endParaRPr dirty="0"/>
               </a:p>
               <a:p>
                 <a:pPr lvl="1"/>
@@ -17255,10 +18127,6 @@
                   <a:rPr dirty="0"/>
                   <a:t>Be suspicious of overly optimistic confidence intervals</a:t>
                 </a:r>
-                <a:br>
-                  <a:rPr dirty="0"/>
-                </a:br>
-                <a:endParaRPr dirty="0"/>
               </a:p>
               <a:p>
                 <a:pPr lvl="1"/>
@@ -17277,7 +18145,7 @@
             </p:txBody>
           </p:sp>
         </mc:Choice>
-        <mc:Fallback xmlns="">
+        <mc:Fallback>
           <p:sp>
             <p:nvSpPr>
               <p:cNvPr id="3" name="Content Placeholder 2"/>
@@ -17289,10 +18157,14 @@
               </p:nvPr>
             </p:nvSpPr>
             <p:spPr>
+              <a:xfrm>
+                <a:off x="457200" y="1200150"/>
+                <a:ext cx="8229600" cy="3554729"/>
+              </a:xfrm>
               <a:blipFill>
                 <a:blip r:embed="rId2"/>
                 <a:stretch>
-                  <a:fillRect l="-444" t="-1975"/>
+                  <a:fillRect l="-741" t="-2573" r="-889"/>
                 </a:stretch>
               </a:blipFill>
             </p:spPr>
@@ -17378,7 +18250,7 @@
         </p:spPr>
         <p:txBody>
           <a:bodyPr>
-            <a:normAutofit fontScale="85000" lnSpcReduction="20000"/>
+            <a:normAutofit fontScale="92500" lnSpcReduction="20000"/>
           </a:bodyPr>
           <a:lstStyle/>
           <a:p>
@@ -17436,8 +18308,15 @@
           <a:p>
             <a:pPr lvl="1"/>
             <a:r>
-              <a:rPr dirty="0"/>
-              <a:t>The need to specify a </a:t>
+              <a:rPr lang="en-US" dirty="0" err="1"/>
+              <a:t>Specifing</a:t>
+            </a:r>
+            <a:r>
+              <a:rPr lang="en-US"/>
+              <a:t> </a:t>
+            </a:r>
+            <a:r>
+              <a:t>a </a:t>
             </a:r>
             <a:r>
               <a:rPr b="1" dirty="0"/>

</xml_diff>

<commit_message>
Small updates and corrections to slide deck
</commit_message>
<xml_diff>
--- a/LectureSlides/07_IntroductionToBayesModels.pptx
+++ b/LectureSlides/07_IntroductionToBayesModels.pptx
@@ -254,7 +254,7 @@
           <a:p>
             <a:fld id="{13DDEE00-70AE-47E2-95E5-F1C95ECCE916}" type="datetimeFigureOut">
               <a:rPr lang="en-US" smtClean="0"/>
-              <a:t>9/20/2024</a:t>
+              <a:t>10/1/2024</a:t>
             </a:fld>
             <a:endParaRPr lang="en-US"/>
           </a:p>
@@ -784,7 +784,7 @@
           <a:p>
             <a:fld id="{241EB5C9-1307-BA42-ABA2-0BC069CD8E7F}" type="datetimeFigureOut">
               <a:rPr lang="en-US" smtClean="0"/>
-              <a:t>9/20/2024</a:t>
+              <a:t>10/1/2024</a:t>
             </a:fld>
             <a:endParaRPr lang="en-US"/>
           </a:p>
@@ -952,7 +952,7 @@
           <a:p>
             <a:fld id="{241EB5C9-1307-BA42-ABA2-0BC069CD8E7F}" type="datetimeFigureOut">
               <a:rPr lang="en-US" smtClean="0"/>
-              <a:t>9/20/2024</a:t>
+              <a:t>10/1/2024</a:t>
             </a:fld>
             <a:endParaRPr lang="en-US"/>
           </a:p>
@@ -1130,7 +1130,7 @@
           <a:p>
             <a:fld id="{241EB5C9-1307-BA42-ABA2-0BC069CD8E7F}" type="datetimeFigureOut">
               <a:rPr lang="en-US" smtClean="0"/>
-              <a:t>9/20/2024</a:t>
+              <a:t>10/1/2024</a:t>
             </a:fld>
             <a:endParaRPr lang="en-US"/>
           </a:p>
@@ -1298,7 +1298,7 @@
           <a:p>
             <a:fld id="{241EB5C9-1307-BA42-ABA2-0BC069CD8E7F}" type="datetimeFigureOut">
               <a:rPr lang="en-US" smtClean="0"/>
-              <a:t>9/20/2024</a:t>
+              <a:t>10/1/2024</a:t>
             </a:fld>
             <a:endParaRPr lang="en-US"/>
           </a:p>
@@ -1543,7 +1543,7 @@
           <a:p>
             <a:fld id="{241EB5C9-1307-BA42-ABA2-0BC069CD8E7F}" type="datetimeFigureOut">
               <a:rPr lang="en-US" smtClean="0"/>
-              <a:t>9/20/2024</a:t>
+              <a:t>10/1/2024</a:t>
             </a:fld>
             <a:endParaRPr lang="en-US"/>
           </a:p>
@@ -1828,7 +1828,7 @@
           <a:p>
             <a:fld id="{241EB5C9-1307-BA42-ABA2-0BC069CD8E7F}" type="datetimeFigureOut">
               <a:rPr lang="en-US" smtClean="0"/>
-              <a:t>9/20/2024</a:t>
+              <a:t>10/1/2024</a:t>
             </a:fld>
             <a:endParaRPr lang="en-US"/>
           </a:p>
@@ -2247,7 +2247,7 @@
           <a:p>
             <a:fld id="{241EB5C9-1307-BA42-ABA2-0BC069CD8E7F}" type="datetimeFigureOut">
               <a:rPr lang="en-US" smtClean="0"/>
-              <a:t>9/20/2024</a:t>
+              <a:t>10/1/2024</a:t>
             </a:fld>
             <a:endParaRPr lang="en-US"/>
           </a:p>
@@ -2364,7 +2364,7 @@
           <a:p>
             <a:fld id="{241EB5C9-1307-BA42-ABA2-0BC069CD8E7F}" type="datetimeFigureOut">
               <a:rPr lang="en-US" smtClean="0"/>
-              <a:t>9/20/2024</a:t>
+              <a:t>10/1/2024</a:t>
             </a:fld>
             <a:endParaRPr lang="en-US"/>
           </a:p>
@@ -2459,7 +2459,7 @@
           <a:p>
             <a:fld id="{241EB5C9-1307-BA42-ABA2-0BC069CD8E7F}" type="datetimeFigureOut">
               <a:rPr lang="en-US" smtClean="0"/>
-              <a:t>9/20/2024</a:t>
+              <a:t>10/1/2024</a:t>
             </a:fld>
             <a:endParaRPr lang="en-US"/>
           </a:p>
@@ -2734,7 +2734,7 @@
           <a:p>
             <a:fld id="{241EB5C9-1307-BA42-ABA2-0BC069CD8E7F}" type="datetimeFigureOut">
               <a:rPr lang="en-US" smtClean="0"/>
-              <a:t>9/20/2024</a:t>
+              <a:t>10/1/2024</a:t>
             </a:fld>
             <a:endParaRPr lang="en-US"/>
           </a:p>
@@ -2986,7 +2986,7 @@
           <a:p>
             <a:fld id="{241EB5C9-1307-BA42-ABA2-0BC069CD8E7F}" type="datetimeFigureOut">
               <a:rPr lang="en-US" smtClean="0"/>
-              <a:t>9/20/2024</a:t>
+              <a:t>10/1/2024</a:t>
             </a:fld>
             <a:endParaRPr lang="en-US"/>
           </a:p>
@@ -3197,7 +3197,7 @@
           <a:p>
             <a:fld id="{241EB5C9-1307-BA42-ABA2-0BC069CD8E7F}" type="datetimeFigureOut">
               <a:rPr lang="en-US" smtClean="0"/>
-              <a:t>9/20/2024</a:t>
+              <a:t>10/1/2024</a:t>
             </a:fld>
             <a:endParaRPr lang="en-US"/>
           </a:p>
@@ -4956,13 +4956,37 @@
                 <a:pPr lvl="0"/>
                 <a:r>
                   <a:rPr sz="2000" dirty="0"/>
-                  <a:t>Example, it is often the case that only one or a few parameters of a joint distribution will be of interest</a:t>
+                  <a:t>Example</a:t>
+                </a:r>
+                <a:r>
+                  <a:rPr lang="en-US" sz="2000" dirty="0"/>
+                  <a:t>;</a:t>
+                </a:r>
+                <a:r>
+                  <a:rPr sz="2000" dirty="0"/>
+                  <a:t> it is often the case that only one or a few parameters of a joint distribution </a:t>
+                </a:r>
+                <a:r>
+                  <a:rPr lang="en-US" sz="2000" dirty="0"/>
+                  <a:t>are </a:t>
+                </a:r>
+                <a:r>
+                  <a:rPr sz="2000" dirty="0"/>
+                  <a:t>of interest</a:t>
                 </a:r>
               </a:p>
               <a:p>
                 <a:r>
                   <a:rPr sz="2000" dirty="0"/>
-                  <a:t>In other words, we are interested in the marginal distribution of these parameters</a:t>
+                  <a:t>In other words, we are interested in the </a:t>
+                </a:r>
+                <a:r>
+                  <a:rPr sz="2000" b="1" dirty="0"/>
+                  <a:t>marginal distribution </a:t>
+                </a:r>
+                <a:r>
+                  <a:rPr sz="2000" dirty="0"/>
+                  <a:t>of these parameters</a:t>
                 </a:r>
               </a:p>
               <a:p>
@@ -5044,6 +5068,11 @@
         </mc:Fallback>
       </mc:AlternateContent>
     </p:spTree>
+    <p:extLst>
+      <p:ext uri="{BB962C8B-B14F-4D97-AF65-F5344CB8AC3E}">
+        <p14:creationId xmlns:p14="http://schemas.microsoft.com/office/powerpoint/2010/main" val="2581782957"/>
+      </p:ext>
+    </p:extLst>
   </p:cSld>
   <p:clrMapOvr>
     <a:masterClrMapping/>
@@ -5132,7 +5161,15 @@
                 <a:pPr lvl="0"/>
                 <a:r>
                   <a:rPr sz="2000" dirty="0"/>
-                  <a:t>Consider a multivariate probability density function with </a:t>
+                  <a:t>Consider a multivariate </a:t>
+                </a:r>
+                <a:r>
+                  <a:rPr sz="2000" b="1" dirty="0"/>
+                  <a:t>probability density function </a:t>
+                </a:r>
+                <a:r>
+                  <a:rPr sz="2000" dirty="0"/>
+                  <a:t>with </a:t>
                 </a:r>
                 <a14:m>
                   <m:oMath xmlns:m="http://schemas.openxmlformats.org/officeDocument/2006/math">
@@ -5146,7 +5183,15 @@
                 </a14:m>
                 <a:r>
                   <a:rPr sz="2000" dirty="0"/>
-                  <a:t> variables, </a:t>
+                  <a:t> </a:t>
+                </a:r>
+                <a:r>
+                  <a:rPr lang="en-US" sz="2000" dirty="0"/>
+                  <a:t>dimensions</a:t>
+                </a:r>
+                <a:r>
+                  <a:rPr sz="2000" dirty="0"/>
+                  <a:t>, </a:t>
                 </a:r>
                 <a14:m>
                   <m:oMath xmlns:m="http://schemas.openxmlformats.org/officeDocument/2006/math">
@@ -5656,17 +5701,36 @@
                         </a:rPr>
                         <m:t>𝑑</m:t>
                       </m:r>
+                      <m:sSub>
+                        <m:sSubPr>
+                          <m:ctrlPr>
+                            <a:rPr lang="ar-AE" sz="2000" i="1">
+                              <a:latin typeface="Cambria Math" panose="02040503050406030204" pitchFamily="18" charset="0"/>
+                            </a:rPr>
+                          </m:ctrlPr>
+                        </m:sSubPr>
+                        <m:e>
+                          <m:r>
+                            <a:rPr lang="ar-AE" sz="2000">
+                              <a:latin typeface="Cambria Math" panose="02040503050406030204" pitchFamily="18" charset="0"/>
+                            </a:rPr>
+                            <m:t>𝜃</m:t>
+                          </m:r>
+                        </m:e>
+                        <m:sub>
+                          <m:r>
+                            <a:rPr lang="ar-AE" sz="2000">
+                              <a:latin typeface="Cambria Math" panose="02040503050406030204" pitchFamily="18" charset="0"/>
+                            </a:rPr>
+                            <m:t>2</m:t>
+                          </m:r>
+                        </m:sub>
+                      </m:sSub>
                       <m:r>
                         <a:rPr sz="2000">
                           <a:latin typeface="Cambria Math" panose="02040503050406030204" pitchFamily="18" charset="0"/>
                         </a:rPr>
-                        <m:t>𝜃</m:t>
-                      </m:r>
-                      <m:r>
-                        <a:rPr sz="2000">
-                          <a:latin typeface="Cambria Math" panose="02040503050406030204" pitchFamily="18" charset="0"/>
-                        </a:rPr>
-                        <m:t>2,…,</m:t>
+                        <m:t>,…,</m:t>
                       </m:r>
                       <m:r>
                         <a:rPr sz="2000">
@@ -5711,7 +5775,7 @@
                 </a:r>
                 <a:r>
                   <a:rPr lang="en-US" sz="2000" dirty="0"/>
-                  <a:t>evaluating</a:t>
+                  <a:t>directly evaluating</a:t>
                 </a:r>
                 <a:r>
                   <a:rPr sz="2000" dirty="0"/>
@@ -5762,7 +5826,7 @@
     </p:spTree>
     <p:extLst>
       <p:ext uri="{BB962C8B-B14F-4D97-AF65-F5344CB8AC3E}">
-        <p14:creationId xmlns:p14="http://schemas.microsoft.com/office/powerpoint/2010/main" val="1035835170"/>
+        <p14:creationId xmlns:p14="http://schemas.microsoft.com/office/powerpoint/2010/main" val="179148293"/>
       </p:ext>
     </p:extLst>
   </p:cSld>
@@ -5833,7 +5897,7 @@
             </p:spPr>
             <p:txBody>
               <a:bodyPr>
-                <a:normAutofit fontScale="77500" lnSpcReduction="20000"/>
+                <a:normAutofit fontScale="85000" lnSpcReduction="10000"/>
               </a:bodyPr>
               <a:lstStyle/>
               <a:p>
@@ -5846,14 +5910,30 @@
                 </a:r>
                 <a:r>
                   <a:rPr dirty="0"/>
-                  <a:t>or discrete distributions compute the marginal by summation</a:t>
+                  <a:t>or </a:t>
+                </a:r>
+                <a:r>
+                  <a:rPr b="1" dirty="0"/>
+                  <a:t>discrete distributions </a:t>
+                </a:r>
+                <a:r>
+                  <a:rPr dirty="0"/>
+                  <a:t>compute the marginal by summation</a:t>
                 </a:r>
               </a:p>
               <a:p>
                 <a:pPr lvl="0"/>
                 <a:r>
                   <a:rPr dirty="0"/>
-                  <a:t>Example, need to know (un-normalized) posterior distribution of parameter </a:t>
+                  <a:t>Example, need to know </a:t>
+                </a:r>
+                <a:r>
+                  <a:rPr lang="en-US" dirty="0"/>
+                  <a:t>the </a:t>
+                </a:r>
+                <a:r>
+                  <a:rPr dirty="0"/>
+                  <a:t>(un-normalized) posterior distribution of parameter </a:t>
                 </a:r>
                 <a14:m>
                   <m:oMath xmlns:m="http://schemas.openxmlformats.org/officeDocument/2006/math">
@@ -5867,7 +5947,19 @@
                 </a14:m>
                 <a:r>
                   <a:rPr dirty="0"/>
-                  <a:t>, a marginal distribution:</a:t>
+                  <a:t>, </a:t>
+                </a:r>
+                <a:r>
+                  <a:rPr lang="en-US" dirty="0" err="1"/>
+                  <a:t>compted</a:t>
+                </a:r>
+                <a:r>
+                  <a:rPr lang="en-US" dirty="0"/>
+                  <a:t> as a</a:t>
+                </a:r>
+                <a:r>
+                  <a:rPr dirty="0"/>
+                  <a:t> marginal distribution:</a:t>
                 </a:r>
               </a:p>
               <a:p>
@@ -6229,8 +6321,23 @@
                 </a14:m>
                 <a:r>
                   <a:rPr dirty="0"/>
-                  <a:t> from samples without ever directly computing the marginal</a:t>
-                </a:r>
+                  <a:t> from samples without directly </a:t>
+                </a:r>
+                <a:r>
+                  <a:rPr lang="en-US" dirty="0"/>
+                  <a:t>knowing </a:t>
+                </a:r>
+                <a14:m>
+                  <m:oMath xmlns:m="http://schemas.openxmlformats.org/officeDocument/2006/math">
+                    <m:r>
+                      <a:rPr lang="en-US">
+                        <a:latin typeface="Cambria Math" panose="02040503050406030204" pitchFamily="18" charset="0"/>
+                      </a:rPr>
+                      <m:t>𝜃</m:t>
+                    </m:r>
+                  </m:oMath>
+                </a14:m>
+                <a:endParaRPr dirty="0"/>
               </a:p>
             </p:txBody>
           </p:sp>
@@ -6254,7 +6361,7 @@
               <a:blipFill>
                 <a:blip r:embed="rId2"/>
                 <a:stretch>
-                  <a:fillRect l="-667" t="-2121" r="-667"/>
+                  <a:fillRect l="-741" t="-1794" b="-2936"/>
                 </a:stretch>
               </a:blipFill>
             </p:spPr>
@@ -6274,6 +6381,11 @@
         </mc:Fallback>
       </mc:AlternateContent>
     </p:spTree>
+    <p:extLst>
+      <p:ext uri="{BB962C8B-B14F-4D97-AF65-F5344CB8AC3E}">
+        <p14:creationId xmlns:p14="http://schemas.microsoft.com/office/powerpoint/2010/main" val="2800604549"/>
+      </p:ext>
+    </p:extLst>
   </p:cSld>
   <p:clrMapOvr>
     <a:masterClrMapping/>
@@ -6998,7 +7110,15 @@
             </a:pPr>
             <a:r>
               <a:rPr dirty="0"/>
-              <a:t>Relationships can apply to the parameters in a model; partial slopes, intercept, error distributions, lasso constants, </a:t>
+              <a:t>Relationships can apply to the parameters in a model;</a:t>
+            </a:r>
+            <a:r>
+              <a:rPr lang="en-US" dirty="0"/>
+              <a:t> e.g.</a:t>
+            </a:r>
+            <a:r>
+              <a:rPr dirty="0"/>
+              <a:t> partial slopes, intercept, error distributions, lasso constants, </a:t>
             </a:r>
             <a:r>
               <a:rPr dirty="0" err="1"/>
@@ -7057,8 +7177,8 @@
           </a:p>
         </p:txBody>
       </p:sp>
-      <mc:AlternateContent xmlns:mc="http://schemas.openxmlformats.org/markup-compatibility/2006" xmlns:a14="http://schemas.microsoft.com/office/drawing/2010/main">
-        <mc:Choice Requires="a14">
+      <mc:AlternateContent xmlns:mc="http://schemas.openxmlformats.org/markup-compatibility/2006">
+        <mc:Choice xmlns:a14="http://schemas.microsoft.com/office/drawing/2010/main" Requires="a14">
           <p:sp>
             <p:nvSpPr>
               <p:cNvPr id="3" name="Content Placeholder 2"/>
@@ -7088,7 +7208,7 @@
                 <a:pPr lvl="0"/>
                 <a:r>
                   <a:rPr lang="en-US" dirty="0"/>
-                  <a:t>We must avoid directly summing all of the possibilities to compute the denominator, </a:t>
+                  <a:t>We must avoid directly enumerating all of the possibilities required to compute the denominator, </a:t>
                 </a:r>
                 <a14:m>
                   <m:oMath xmlns:m="http://schemas.openxmlformats.org/officeDocument/2006/math">
@@ -7690,7 +7810,7 @@
             </p:txBody>
           </p:sp>
         </mc:Choice>
-        <mc:Fallback xmlns="">
+        <mc:Fallback>
           <p:sp>
             <p:nvSpPr>
               <p:cNvPr id="3" name="Content Placeholder 2"/>
@@ -7794,8 +7914,12 @@
               <a:buNone/>
             </a:pPr>
             <a:r>
-              <a:rPr dirty="0"/>
-              <a:t>Statistical inference seeks to characterize the uncertainty in statistical point estimates</a:t>
+              <a:rPr b="1" dirty="0"/>
+              <a:t>Statistical inference </a:t>
+            </a:r>
+            <a:r>
+              <a:rPr dirty="0"/>
+              <a:t>seeks to characterize the uncertainty in statistical point estimates</a:t>
             </a:r>
           </a:p>
           <a:p>
@@ -7809,14 +7933,26 @@
             <a:pPr lvl="0"/>
             <a:r>
               <a:rPr dirty="0"/>
-              <a:t>Inferences using statistics must consider the uncertainty in the estimates</a:t>
+              <a:t>Inferences using statistics must consider the </a:t>
+            </a:r>
+            <a:r>
+              <a:rPr b="1" dirty="0"/>
+              <a:t>uncertainty</a:t>
+            </a:r>
+            <a:r>
+              <a:rPr dirty="0"/>
+              <a:t> in the estimates</a:t>
             </a:r>
           </a:p>
           <a:p>
             <a:pPr lvl="0"/>
             <a:r>
-              <a:rPr dirty="0"/>
-              <a:t>Confidence intervals quantify uncertainty in statistical estimates</a:t>
+              <a:rPr b="1" dirty="0"/>
+              <a:t>Confidence intervals </a:t>
+            </a:r>
+            <a:r>
+              <a:rPr dirty="0"/>
+              <a:t>quantify uncertainty in statistical estimates</a:t>
             </a:r>
           </a:p>
           <a:p>
@@ -7892,8 +8028,8 @@
           </a:p>
         </p:txBody>
       </p:sp>
-      <mc:AlternateContent xmlns:mc="http://schemas.openxmlformats.org/markup-compatibility/2006" xmlns:a14="http://schemas.microsoft.com/office/drawing/2010/main">
-        <mc:Choice Requires="a14">
+      <mc:AlternateContent xmlns:mc="http://schemas.openxmlformats.org/markup-compatibility/2006">
+        <mc:Choice xmlns:a14="http://schemas.microsoft.com/office/drawing/2010/main" Requires="a14">
           <p:sp>
             <p:nvSpPr>
               <p:cNvPr id="3" name="Content Placeholder 2"/>
@@ -7904,7 +8040,12 @@
                 <p:ph idx="1"/>
               </p:nvPr>
             </p:nvSpPr>
-            <p:spPr/>
+            <p:spPr>
+              <a:xfrm>
+                <a:off x="457200" y="1200151"/>
+                <a:ext cx="8229600" cy="3737370"/>
+              </a:xfrm>
+            </p:spPr>
             <p:txBody>
               <a:bodyPr>
                 <a:normAutofit fontScale="70000" lnSpcReduction="20000"/>
@@ -8526,7 +8667,7 @@
             </p:txBody>
           </p:sp>
         </mc:Choice>
-        <mc:Fallback xmlns="">
+        <mc:Fallback>
           <p:sp>
             <p:nvSpPr>
               <p:cNvPr id="3" name="Content Placeholder 2"/>
@@ -8538,10 +8679,14 @@
               </p:nvPr>
             </p:nvSpPr>
             <p:spPr>
+              <a:xfrm>
+                <a:off x="457200" y="1200151"/>
+                <a:ext cx="8229600" cy="3737370"/>
+              </a:xfrm>
               <a:blipFill>
                 <a:blip r:embed="rId2"/>
                 <a:stretch>
-                  <a:fillRect l="-444" t="-1975"/>
+                  <a:fillRect l="-444" t="-1794"/>
                 </a:stretch>
               </a:blipFill>
             </p:spPr>
@@ -9200,8 +9345,8 @@
           </a:p>
         </p:txBody>
       </p:sp>
-      <mc:AlternateContent xmlns:mc="http://schemas.openxmlformats.org/markup-compatibility/2006" xmlns:a14="http://schemas.microsoft.com/office/drawing/2010/main">
-        <mc:Choice Requires="a14">
+      <mc:AlternateContent xmlns:mc="http://schemas.openxmlformats.org/markup-compatibility/2006">
+        <mc:Choice xmlns:a14="http://schemas.microsoft.com/office/drawing/2010/main" Requires="a14">
           <p:sp>
             <p:nvSpPr>
               <p:cNvPr id="3" name="Content Placeholder 2"/>
@@ -9212,10 +9357,15 @@
                 <p:ph idx="1"/>
               </p:nvPr>
             </p:nvSpPr>
-            <p:spPr/>
+            <p:spPr>
+              <a:xfrm>
+                <a:off x="457200" y="1200150"/>
+                <a:ext cx="8229600" cy="3570985"/>
+              </a:xfrm>
+            </p:spPr>
             <p:txBody>
               <a:bodyPr>
-                <a:normAutofit fontScale="85000" lnSpcReduction="20000"/>
+                <a:normAutofit fontScale="92500" lnSpcReduction="20000"/>
               </a:bodyPr>
               <a:lstStyle/>
               <a:p>
@@ -9224,14 +9374,7 @@
                 </a:pPr>
                 <a:r>
                   <a:rPr lang="en-US" dirty="0"/>
-                  <a:t>How to we interpret the foregoing relationship?</a:t>
-                </a:r>
-              </a:p>
-              <a:p>
-                <a:pPr lvl="0"/>
-                <a:r>
-                  <a:rPr lang="en-US" dirty="0"/>
-                  <a:t>Consider the following relationship:</a:t>
+                  <a:t>How can we compute the posterior distribution? </a:t>
                 </a:r>
               </a:p>
               <a:p>
@@ -9504,14 +9647,20 @@
                 <a:endParaRPr lang="en-US" dirty="0"/>
               </a:p>
               <a:p>
-                <a:pPr lvl="0"/>
+                <a:pPr marL="457200" lvl="0" indent="-457200">
+                  <a:buFont typeface="+mj-lt"/>
+                  <a:buAutoNum type="arabicPeriod"/>
+                </a:pPr>
                 <a:r>
                   <a:rPr lang="en-US" dirty="0"/>
                   <a:t>We can find an un-normalized function proportional to the posterior distribution</a:t>
                 </a:r>
               </a:p>
               <a:p>
-                <a:pPr lvl="0"/>
+                <a:pPr marL="457200" lvl="0" indent="-457200">
+                  <a:buFont typeface="+mj-lt"/>
+                  <a:buAutoNum type="arabicPeriod"/>
+                </a:pPr>
                 <a:r>
                   <a:rPr lang="en-US" dirty="0"/>
                   <a:t>Sum over </a:t>
@@ -9584,7 +9733,11 @@
                 </a:r>
                 <a:r>
                   <a:rPr lang="en-US" dirty="0"/>
-                  <a:t>to find the marginal distribution </a:t>
+                  <a:t>to find the </a:t>
+                </a:r>
+                <a:r>
+                  <a:rPr lang="en-US" b="1" dirty="0"/>
+                  <a:t>marginal distribution </a:t>
                 </a:r>
                 <a14:m>
                   <m:oMath xmlns:m="http://schemas.openxmlformats.org/officeDocument/2006/math">
@@ -9613,10 +9766,23 @@
                     </m:d>
                   </m:oMath>
                 </a14:m>
+                <a:endParaRPr lang="en-US" dirty="0"/>
+              </a:p>
+              <a:p>
+                <a:pPr marL="457200" lvl="0" indent="-457200">
+                  <a:buFont typeface="+mj-lt"/>
+                  <a:buAutoNum type="arabicPeriod"/>
+                </a:pPr>
+                <a:r>
+                  <a:rPr lang="en-US" dirty="0"/>
+                  <a:t>Normalize the posterior </a:t>
+                </a:r>
                 <a:endParaRPr lang="ar-AE" dirty="0"/>
               </a:p>
               <a:p>
-                <a:pPr lvl="0"/>
+                <a:pPr marL="0" lvl="0" indent="0">
+                  <a:buNone/>
+                </a:pPr>
                 <a:r>
                   <a:rPr lang="en-US" dirty="0"/>
                   <a:t>Approach can transform an intractable computation into a simple summation</a:t>
@@ -9626,7 +9792,7 @@
             </p:txBody>
           </p:sp>
         </mc:Choice>
-        <mc:Fallback xmlns="">
+        <mc:Fallback>
           <p:sp>
             <p:nvSpPr>
               <p:cNvPr id="3" name="Content Placeholder 2"/>
@@ -9638,10 +9804,14 @@
               </p:nvPr>
             </p:nvSpPr>
             <p:spPr>
+              <a:xfrm>
+                <a:off x="457200" y="1200150"/>
+                <a:ext cx="8229600" cy="3570985"/>
+              </a:xfrm>
               <a:blipFill>
                 <a:blip r:embed="rId2"/>
                 <a:stretch>
-                  <a:fillRect l="-741" t="-2693"/>
+                  <a:fillRect l="-963" t="-2901" b="-683"/>
                 </a:stretch>
               </a:blipFill>
             </p:spPr>
@@ -9712,8 +9882,13 @@
             </a:pPr>
             <a:r>
               <a:rPr dirty="0"/>
-              <a:t>Creating Bayes models</a:t>
-            </a:r>
+              <a:t>Bayes</a:t>
+            </a:r>
+            <a:r>
+              <a:rPr lang="en-US" dirty="0"/>
+              <a:t>ian Workflow</a:t>
+            </a:r>
+            <a:endParaRPr dirty="0"/>
           </a:p>
         </p:txBody>
       </p:sp>
@@ -9735,7 +9910,7 @@
         </p:spPr>
         <p:txBody>
           <a:bodyPr>
-            <a:normAutofit fontScale="85000" lnSpcReduction="10000"/>
+            <a:normAutofit fontScale="85000" lnSpcReduction="20000"/>
           </a:bodyPr>
           <a:lstStyle/>
           <a:p>
@@ -9879,11 +10054,27 @@
             </a:pPr>
             <a:r>
               <a:rPr dirty="0"/>
-              <a:t>Inference on the posterior can be performed; compute </a:t>
+              <a:t>Inference on the posterior can be performed; compute</a:t>
+            </a:r>
+            <a:r>
+              <a:rPr lang="en-US" dirty="0"/>
+              <a:t> </a:t>
+            </a:r>
+            <a:r>
+              <a:rPr lang="en-US" b="1" dirty="0"/>
+              <a:t>MAP</a:t>
+            </a:r>
+            <a:r>
+              <a:rPr lang="en-US" dirty="0"/>
+              <a:t> and</a:t>
+            </a:r>
+            <a:r>
+              <a:rPr dirty="0"/>
+              <a:t> </a:t>
             </a:r>
             <a:r>
               <a:rPr b="1" dirty="0"/>
-              <a:t>credible intervals</a:t>
+              <a:t>credible interval</a:t>
             </a:r>
           </a:p>
           <a:p>
@@ -9904,15 +10095,7 @@
             </a:r>
             <a:r>
               <a:rPr dirty="0"/>
-              <a:t> </a:t>
-            </a:r>
-            <a:r>
-              <a:rPr lang="en-US" dirty="0"/>
-              <a:t>t</a:t>
-            </a:r>
-            <a:r>
-              <a:rPr dirty="0"/>
-              <a:t>he predictions from the model.</a:t>
+              <a:t> predictions from the model.</a:t>
             </a:r>
           </a:p>
         </p:txBody>
@@ -10132,7 +10315,15 @@
             </a:pPr>
             <a:r>
               <a:rPr sz="2200" dirty="0"/>
-              <a:t>The choice of the prior is a difficult, and potentially vexing, problem when performing Bayesian analysis</a:t>
+              <a:t>The </a:t>
+            </a:r>
+            <a:r>
+              <a:rPr sz="2200" b="1" dirty="0"/>
+              <a:t>choice of the prior </a:t>
+            </a:r>
+            <a:r>
+              <a:rPr sz="2200" dirty="0"/>
+              <a:t>is a difficult, and potentially vexing, problem when performing Bayesian analysis</a:t>
             </a:r>
           </a:p>
           <a:p>
@@ -10146,19 +10337,23 @@
             <a:pPr lvl="0"/>
             <a:r>
               <a:rPr sz="2200" dirty="0"/>
-              <a:t>General guidance is that a prior must be convincing to a </a:t>
+              <a:t>General guidance is that a prior must be </a:t>
             </a:r>
             <a:r>
               <a:rPr sz="2200" b="1" dirty="0"/>
-              <a:t>skeptical audience</a:t>
+              <a:t>convincing to a skeptical audience</a:t>
             </a:r>
             <a:endParaRPr sz="2200" dirty="0"/>
           </a:p>
           <a:p>
             <a:pPr lvl="0"/>
             <a:r>
+              <a:rPr lang="en-US" sz="2200" dirty="0"/>
+              <a:t>T</a:t>
+            </a:r>
+            <a:r>
               <a:rPr sz="2200" dirty="0"/>
-              <a:t>Often tend to use vague or less informative priors in practice</a:t>
+              <a:t>end to use vague or less informative priors in practice</a:t>
             </a:r>
             <a:endParaRPr lang="en-US" sz="2200" dirty="0"/>
           </a:p>
@@ -10255,7 +10450,7 @@
             <a:pPr lvl="0"/>
             <a:r>
               <a:rPr dirty="0"/>
-              <a:t>Use prior </a:t>
+              <a:t>Use </a:t>
             </a:r>
             <a:r>
               <a:rPr b="1" dirty="0"/>
@@ -10314,15 +10509,7 @@
             <a:pPr lvl="1"/>
             <a:r>
               <a:rPr dirty="0"/>
-              <a:t>Example, there</a:t>
-            </a:r>
-            <a:r>
-              <a:rPr lang="en-US" dirty="0"/>
-              <a:t> count be</a:t>
-            </a:r>
-            <a:r>
-              <a:rPr dirty="0"/>
-              <a:t> </a:t>
+              <a:t>Example, </a:t>
             </a:r>
             <a:r>
               <a:rPr lang="en-US" dirty="0"/>
@@ -10464,7 +10651,7 @@
         </p:spPr>
         <p:txBody>
           <a:bodyPr>
-            <a:normAutofit fontScale="77500" lnSpcReduction="20000"/>
+            <a:normAutofit fontScale="85000" lnSpcReduction="20000"/>
           </a:bodyPr>
           <a:lstStyle/>
           <a:p>
@@ -10497,7 +10684,7 @@
             <a:pPr lvl="0"/>
             <a:r>
               <a:rPr dirty="0"/>
-              <a:t>Deriving a prior distribution in this manner is sometimes called </a:t>
+              <a:t>Deriving a prior distribution in this manner is called </a:t>
             </a:r>
             <a:r>
               <a:rPr b="1" dirty="0"/>
@@ -10563,7 +10750,15 @@
             </a:r>
             <a:r>
               <a:rPr dirty="0"/>
-              <a:t> by locations to </a:t>
+              <a:t> by locations</a:t>
+            </a:r>
+            <a:r>
+              <a:rPr lang="en-US" dirty="0"/>
+              <a:t>, property characteristics, etc.</a:t>
+            </a:r>
+            <a:r>
+              <a:rPr dirty="0"/>
+              <a:t> to </a:t>
             </a:r>
             <a:r>
               <a:rPr b="1" dirty="0"/>
@@ -10589,8 +10784,13 @@
             <a:pPr lvl="0"/>
             <a:r>
               <a:rPr dirty="0"/>
-              <a:t>Typically, a less informative prior distribution is used than the actual empirical distribution so the model is not overly constrained</a:t>
-            </a:r>
+              <a:t>Typically, a less informative prior distribution is used than the actual empirical distribution so the model is not </a:t>
+            </a:r>
+            <a:r>
+              <a:rPr dirty="0" err="1"/>
+              <a:t>overlyconstrained</a:t>
+            </a:r>
+            <a:endParaRPr dirty="0"/>
           </a:p>
         </p:txBody>
       </p:sp>
@@ -10869,8 +11069,8 @@
           </a:p>
         </p:txBody>
       </p:sp>
-      <mc:AlternateContent xmlns:mc="http://schemas.openxmlformats.org/markup-compatibility/2006">
-        <mc:Choice xmlns:a14="http://schemas.microsoft.com/office/drawing/2010/main" Requires="a14">
+      <mc:AlternateContent xmlns:mc="http://schemas.openxmlformats.org/markup-compatibility/2006" xmlns:a14="http://schemas.microsoft.com/office/drawing/2010/main">
+        <mc:Choice Requires="a14">
           <p:graphicFrame>
             <p:nvGraphicFramePr>
               <p:cNvPr id="5" name="Table 4">
@@ -11324,7 +11524,7 @@
             </a:graphic>
           </p:graphicFrame>
         </mc:Choice>
-        <mc:Fallback>
+        <mc:Fallback xmlns="">
           <p:graphicFrame>
             <p:nvGraphicFramePr>
               <p:cNvPr id="5" name="Table 4">
@@ -11796,15 +11996,23 @@
               <a:buNone/>
             </a:pPr>
             <a:r>
-              <a:rPr dirty="0"/>
-              <a:t>Nonparametric bootstrap estimation is widely useful and requires minimal assumption</a:t>
+              <a:rPr b="1" dirty="0"/>
+              <a:t>Nonparametric bootstrap </a:t>
+            </a:r>
+            <a:r>
+              <a:rPr dirty="0"/>
+              <a:t>estimation is widely useful and requires minimal assumption</a:t>
             </a:r>
           </a:p>
           <a:p>
             <a:pPr lvl="0"/>
             <a:r>
-              <a:rPr dirty="0"/>
-              <a:t>Bootstrap distribution is comprised of values of the statistic computed from bootstrap resamples of the original observations (data sample)</a:t>
+              <a:rPr b="1" dirty="0"/>
+              <a:t>Bootstrap distribution </a:t>
+            </a:r>
+            <a:r>
+              <a:rPr dirty="0"/>
+              <a:t>is comprised of values of the statistic computed from bootstrap resamples of the original observations (data sample)</a:t>
             </a:r>
           </a:p>
           <a:p>
@@ -11866,9 +12074,18 @@
           <a:p>
             <a:pPr lvl="1"/>
             <a:r>
-              <a:rPr dirty="0"/>
-              <a:t>The bootstrap confidence interval is computed from the bootstrap distribution</a:t>
-            </a:r>
+              <a:rPr lang="en-US" dirty="0"/>
+              <a:t>Compute</a:t>
+            </a:r>
+            <a:r>
+              <a:rPr dirty="0"/>
+              <a:t> bootstrap confidence interva</a:t>
+            </a:r>
+            <a:r>
+              <a:rPr lang="en-US" dirty="0"/>
+              <a:t>ls</a:t>
+            </a:r>
+            <a:endParaRPr dirty="0"/>
           </a:p>
         </p:txBody>
       </p:sp>
@@ -11931,8 +12148,8 @@
           </a:p>
         </p:txBody>
       </p:sp>
-      <mc:AlternateContent xmlns:mc="http://schemas.openxmlformats.org/markup-compatibility/2006" xmlns:a14="http://schemas.microsoft.com/office/drawing/2010/main">
-        <mc:Choice Requires="a14">
+      <mc:AlternateContent xmlns:mc="http://schemas.openxmlformats.org/markup-compatibility/2006">
+        <mc:Choice xmlns:a14="http://schemas.microsoft.com/office/drawing/2010/main" Requires="a14">
           <p:sp>
             <p:nvSpPr>
               <p:cNvPr id="3" name="Content Placeholder 2"/>
@@ -11959,19 +12176,39 @@
                   <a:buNone/>
                 </a:pPr>
                 <a:r>
+                  <a:rPr lang="en-US" dirty="0"/>
+                  <a:t>Example: </a:t>
+                </a:r>
+                <a:r>
                   <a:rPr dirty="0"/>
-                  <a:t>We are interested in analyzing the incidence of distracted drivers</a:t>
+                  <a:t>analyz</a:t>
+                </a:r>
+                <a:r>
+                  <a:rPr lang="en-US" dirty="0"/>
+                  <a:t>e </a:t>
+                </a:r>
+                <a:r>
+                  <a:rPr dirty="0"/>
+                  <a:t>the incidence of distracted drivers</a:t>
                 </a:r>
               </a:p>
               <a:p>
                 <a:pPr lvl="0"/>
                 <a:r>
+                  <a:rPr lang="en-US" b="1" dirty="0"/>
+                  <a:t>Sample Data: </a:t>
+                </a:r>
+                <a:r>
                   <a:rPr dirty="0"/>
                   <a:t>Randomly sample the behavior of 40 drivers at an intersection and determine if they exhibit distracted driving or not</a:t>
                 </a:r>
               </a:p>
               <a:p>
                 <a:pPr lvl="0"/>
+                <a:r>
+                  <a:rPr lang="en-US" b="1" dirty="0"/>
+                  <a:t>Choose Likelihood Model: </a:t>
+                </a:r>
                 <a:r>
                   <a:rPr dirty="0"/>
                   <a:t>Data are Binomially distributed, a driver is distracted or not, with likelihood:</a:t>
@@ -12275,7 +12512,7 @@
             </p:txBody>
           </p:sp>
         </mc:Choice>
-        <mc:Fallback xmlns="">
+        <mc:Fallback>
           <p:sp>
             <p:nvSpPr>
               <p:cNvPr id="3" name="Content Placeholder 2"/>
@@ -12376,8 +12613,8 @@
           </a:p>
         </p:txBody>
       </p:sp>
-      <mc:AlternateContent xmlns:mc="http://schemas.openxmlformats.org/markup-compatibility/2006" xmlns:a14="http://schemas.microsoft.com/office/drawing/2010/main">
-        <mc:Choice Requires="a14">
+      <mc:AlternateContent xmlns:mc="http://schemas.openxmlformats.org/markup-compatibility/2006">
+        <mc:Choice xmlns:a14="http://schemas.microsoft.com/office/drawing/2010/main" Requires="a14">
           <p:sp>
             <p:nvSpPr>
               <p:cNvPr id="3" name="Content Placeholder 2"/>
@@ -12398,7 +12635,7 @@
                 </a:pPr>
                 <a:r>
                   <a:rPr lang="en-US" dirty="0"/>
-                  <a:t>The steps to compute the posterior for this example</a:t>
+                  <a:t>Example: The steps to compute the posterior</a:t>
                 </a:r>
                 <a:r>
                   <a:rPr dirty="0"/>
@@ -12410,8 +12647,16 @@
                   <a:buAutoNum type="arabicPeriod"/>
                 </a:pPr>
                 <a:r>
+                  <a:rPr lang="en-US" b="1" dirty="0"/>
+                  <a:t>Select</a:t>
+                </a:r>
+                <a:r>
+                  <a:rPr b="1" dirty="0"/>
+                  <a:t> the conjugate prior</a:t>
+                </a:r>
+                <a:r>
                   <a:rPr dirty="0"/>
-                  <a:t>Use the conjugate prior, the </a:t>
+                  <a:t>, the </a:t>
                 </a:r>
                 <a:r>
                   <a:rPr b="1" dirty="0"/>
@@ -12485,11 +12730,19 @@
                 </a:r>
                 <a:r>
                   <a:rPr lang="en-US" dirty="0"/>
-                  <a:t> Beta</a:t>
+                  <a:t> </a:t>
+                </a:r>
+                <a:r>
+                  <a:rPr lang="en-US" b="1" dirty="0"/>
+                  <a:t>Beta</a:t>
+                </a:r>
+                <a:r>
+                  <a:rPr b="1" dirty="0"/>
+                  <a:t> posterior distribution </a:t>
                 </a:r>
                 <a:r>
                   <a:rPr dirty="0"/>
-                  <a:t> posterior distribution of distracted driving</a:t>
+                  <a:t>of distracted driving</a:t>
                 </a:r>
                 <a:r>
                   <a:rPr lang="en-US" dirty="0"/>
@@ -12502,14 +12755,18 @@
                   <a:buAutoNum type="arabicPeriod"/>
                 </a:pPr>
                 <a:r>
+                  <a:rPr b="1" dirty="0"/>
+                  <a:t>Add more evidence </a:t>
+                </a:r>
+                <a:r>
                   <a:rPr dirty="0"/>
-                  <a:t>Add more evidence (data) and update the posterior distribution.</a:t>
+                  <a:t>(data) and update the posterior distribution.</a:t>
                 </a:r>
               </a:p>
             </p:txBody>
           </p:sp>
         </mc:Choice>
-        <mc:Fallback xmlns="">
+        <mc:Fallback>
           <p:sp>
             <p:nvSpPr>
               <p:cNvPr id="3" name="Content Placeholder 2"/>
@@ -12639,43 +12896,182 @@
           </a:ln>
         </p:spPr>
       </p:pic>
-      <p:sp>
-        <p:nvSpPr>
-          <p:cNvPr id="5" name="TextBox 3"/>
-          <p:cNvSpPr txBox="1"/>
-          <p:nvPr/>
-        </p:nvSpPr>
-        <p:spPr>
-          <a:xfrm>
-            <a:off x="319024" y="1491488"/>
-            <a:ext cx="2184400" cy="2365248"/>
-          </a:xfrm>
-          <a:prstGeom prst="rect">
-            <a:avLst/>
-          </a:prstGeom>
-          <a:noFill/>
-        </p:spPr>
-        <p:txBody>
-          <a:bodyPr/>
-          <a:lstStyle/>
-          <a:p>
-            <a:pPr algn="ctr"/>
-            <a:r>
-              <a:rPr lang="en-US" sz="2000" dirty="0"/>
-              <a:t>What are the properties of the Beta distribution </a:t>
-            </a:r>
-            <a:r>
-              <a:rPr sz="2000" dirty="0"/>
-              <a:t>for different parameter values</a:t>
-            </a:r>
-            <a:r>
-              <a:rPr lang="en-US" sz="2000" dirty="0"/>
-              <a:t>?</a:t>
-            </a:r>
-            <a:endParaRPr sz="2000" dirty="0"/>
-          </a:p>
-        </p:txBody>
-      </p:sp>
+      <mc:AlternateContent xmlns:mc="http://schemas.openxmlformats.org/markup-compatibility/2006">
+        <mc:Choice xmlns:a14="http://schemas.microsoft.com/office/drawing/2010/main" Requires="a14">
+          <p:sp>
+            <p:nvSpPr>
+              <p:cNvPr id="5" name="TextBox 3"/>
+              <p:cNvSpPr txBox="1"/>
+              <p:nvPr/>
+            </p:nvSpPr>
+            <p:spPr>
+              <a:xfrm>
+                <a:off x="319024" y="727881"/>
+                <a:ext cx="2184400" cy="4194930"/>
+              </a:xfrm>
+              <a:prstGeom prst="rect">
+                <a:avLst/>
+              </a:prstGeom>
+              <a:noFill/>
+            </p:spPr>
+            <p:txBody>
+              <a:bodyPr/>
+              <a:lstStyle/>
+              <a:p>
+                <a:r>
+                  <a:rPr lang="en-US" sz="2000" dirty="0"/>
+                  <a:t>What are the properties of the Beta distribution for different parameter values?</a:t>
+                </a:r>
+              </a:p>
+              <a:p>
+                <a:pPr marL="457200" indent="-457200">
+                  <a:buFont typeface="Arial" panose="020B0604020202020204" pitchFamily="34" charset="0"/>
+                  <a:buChar char="•"/>
+                </a:pPr>
+                <a14:m>
+                  <m:oMath xmlns:m="http://schemas.openxmlformats.org/officeDocument/2006/math">
+                    <m:r>
+                      <a:rPr lang="en-US" sz="2000" b="0" i="1" smtClean="0">
+                        <a:latin typeface="Cambria Math" panose="02040503050406030204" pitchFamily="18" charset="0"/>
+                      </a:rPr>
+                      <m:t>𝑎</m:t>
+                    </m:r>
+                    <m:r>
+                      <a:rPr lang="en-US" sz="2000" b="0" i="1" smtClean="0">
+                        <a:latin typeface="Cambria Math" panose="02040503050406030204" pitchFamily="18" charset="0"/>
+                      </a:rPr>
+                      <m:t>=</m:t>
+                    </m:r>
+                    <m:r>
+                      <a:rPr lang="en-US" sz="2000" b="0" i="1" smtClean="0">
+                        <a:latin typeface="Cambria Math" panose="02040503050406030204" pitchFamily="18" charset="0"/>
+                      </a:rPr>
+                      <m:t>𝑏</m:t>
+                    </m:r>
+                  </m:oMath>
+                </a14:m>
+                <a:r>
+                  <a:rPr lang="en-US" sz="2000" dirty="0"/>
+                  <a:t> symmetric distribution  </a:t>
+                </a:r>
+              </a:p>
+              <a:p>
+                <a:pPr marL="457200" indent="-457200">
+                  <a:buFont typeface="Arial" panose="020B0604020202020204" pitchFamily="34" charset="0"/>
+                  <a:buChar char="•"/>
+                </a:pPr>
+                <a14:m>
+                  <m:oMath xmlns:m="http://schemas.openxmlformats.org/officeDocument/2006/math">
+                    <m:r>
+                      <a:rPr lang="en-US" sz="2000" b="0" i="1" smtClean="0">
+                        <a:latin typeface="Cambria Math" panose="02040503050406030204" pitchFamily="18" charset="0"/>
+                      </a:rPr>
+                      <m:t>𝑎</m:t>
+                    </m:r>
+                    <m:r>
+                      <a:rPr lang="en-US" sz="2000" b="0" i="1" smtClean="0">
+                        <a:latin typeface="Cambria Math" panose="02040503050406030204" pitchFamily="18" charset="0"/>
+                      </a:rPr>
+                      <m:t>&gt;</m:t>
+                    </m:r>
+                    <m:r>
+                      <a:rPr lang="en-US" sz="2000" b="0" i="1" smtClean="0">
+                        <a:latin typeface="Cambria Math" panose="02040503050406030204" pitchFamily="18" charset="0"/>
+                      </a:rPr>
+                      <m:t>𝑏</m:t>
+                    </m:r>
+                  </m:oMath>
+                </a14:m>
+                <a:r>
+                  <a:rPr lang="en-US" sz="2000" dirty="0"/>
+                  <a:t> right skewed distribution</a:t>
+                </a:r>
+              </a:p>
+              <a:p>
+                <a:pPr marL="457200" indent="-457200">
+                  <a:buFont typeface="Arial" panose="020B0604020202020204" pitchFamily="34" charset="0"/>
+                  <a:buChar char="•"/>
+                </a:pPr>
+                <a14:m>
+                  <m:oMath xmlns:m="http://schemas.openxmlformats.org/officeDocument/2006/math">
+                    <m:r>
+                      <a:rPr lang="en-US" sz="2000" b="0" i="1" smtClean="0">
+                        <a:latin typeface="Cambria Math" panose="02040503050406030204" pitchFamily="18" charset="0"/>
+                      </a:rPr>
+                      <m:t>𝑎</m:t>
+                    </m:r>
+                    <m:r>
+                      <a:rPr lang="en-US" sz="2000" b="0" i="1" smtClean="0">
+                        <a:latin typeface="Cambria Math" panose="02040503050406030204" pitchFamily="18" charset="0"/>
+                      </a:rPr>
+                      <m:t>&lt;</m:t>
+                    </m:r>
+                    <m:r>
+                      <a:rPr lang="en-US" sz="2000" b="0" i="1" smtClean="0">
+                        <a:latin typeface="Cambria Math" panose="02040503050406030204" pitchFamily="18" charset="0"/>
+                      </a:rPr>
+                      <m:t>𝑏</m:t>
+                    </m:r>
+                  </m:oMath>
+                </a14:m>
+                <a:r>
+                  <a:rPr lang="en-US" sz="2000" dirty="0"/>
+                  <a:t> left skewed distribution</a:t>
+                </a:r>
+              </a:p>
+              <a:p>
+                <a:pPr marL="457200" indent="-457200">
+                  <a:buFont typeface="Arial" panose="020B0604020202020204" pitchFamily="34" charset="0"/>
+                  <a:buChar char="•"/>
+                </a:pPr>
+                <a:endParaRPr lang="en-US" sz="2000" dirty="0"/>
+              </a:p>
+              <a:p>
+                <a:pPr algn="ctr"/>
+                <a:endParaRPr sz="2000" dirty="0"/>
+              </a:p>
+            </p:txBody>
+          </p:sp>
+        </mc:Choice>
+        <mc:Fallback>
+          <p:sp>
+            <p:nvSpPr>
+              <p:cNvPr id="5" name="TextBox 3"/>
+              <p:cNvSpPr txBox="1">
+                <a:spLocks noRot="1" noChangeAspect="1" noMove="1" noResize="1" noEditPoints="1" noAdjustHandles="1" noChangeArrowheads="1" noChangeShapeType="1" noTextEdit="1"/>
+              </p:cNvSpPr>
+              <p:nvPr/>
+            </p:nvSpPr>
+            <p:spPr>
+              <a:xfrm>
+                <a:off x="319024" y="727881"/>
+                <a:ext cx="2184400" cy="4194930"/>
+              </a:xfrm>
+              <a:prstGeom prst="rect">
+                <a:avLst/>
+              </a:prstGeom>
+              <a:blipFill>
+                <a:blip r:embed="rId3"/>
+                <a:stretch>
+                  <a:fillRect l="-2786" t="-726" b="-6386"/>
+                </a:stretch>
+              </a:blipFill>
+            </p:spPr>
+            <p:txBody>
+              <a:bodyPr/>
+              <a:lstStyle/>
+              <a:p>
+                <a:r>
+                  <a:rPr lang="en-US">
+                    <a:noFill/>
+                  </a:rPr>
+                  <a:t> </a:t>
+                </a:r>
+              </a:p>
+            </p:txBody>
+          </p:sp>
+        </mc:Fallback>
+      </mc:AlternateContent>
     </p:spTree>
   </p:cSld>
   <p:clrMapOvr>
@@ -12735,8 +13131,8 @@
           </a:p>
         </p:txBody>
       </p:sp>
-      <mc:AlternateContent xmlns:mc="http://schemas.openxmlformats.org/markup-compatibility/2006" xmlns:a14="http://schemas.microsoft.com/office/drawing/2010/main">
-        <mc:Choice Requires="a14">
+      <mc:AlternateContent xmlns:mc="http://schemas.openxmlformats.org/markup-compatibility/2006">
+        <mc:Choice xmlns:a14="http://schemas.microsoft.com/office/drawing/2010/main" Requires="a14">
           <p:sp>
             <p:nvSpPr>
               <p:cNvPr id="3" name="Content Placeholder 2"/>
@@ -12755,7 +13151,7 @@
             </p:spPr>
             <p:txBody>
               <a:bodyPr>
-                <a:normAutofit fontScale="92500" lnSpcReduction="10000"/>
+                <a:normAutofit fontScale="92500"/>
               </a:bodyPr>
               <a:lstStyle/>
               <a:p>
@@ -12764,14 +13160,26 @@
                 </a:pPr>
                 <a:r>
                   <a:rPr lang="en-US" dirty="0"/>
-                  <a:t>Consider the product of a Binomial likelihood and a Beta prior</a:t>
+                  <a:t>Consider the product of a </a:t>
+                </a:r>
+                <a:r>
+                  <a:rPr lang="en-US" b="1" dirty="0"/>
+                  <a:t>Binomial likelihood </a:t>
+                </a:r>
+                <a:r>
+                  <a:rPr lang="en-US" dirty="0"/>
+                  <a:t>and a </a:t>
+                </a:r>
+                <a:r>
+                  <a:rPr lang="en-US" b="1" dirty="0"/>
+                  <a:t>Beta prior</a:t>
                 </a:r>
               </a:p>
               <a:p>
                 <a:pPr lvl="0"/>
                 <a:r>
                   <a:rPr lang="en-US" dirty="0"/>
-                  <a:t>Define the evidence as </a:t>
+                  <a:t>Define evidence as </a:t>
                 </a:r>
                 <a14:m>
                   <m:oMath xmlns:m="http://schemas.openxmlformats.org/officeDocument/2006/math">
@@ -13509,7 +13917,7 @@
             </p:txBody>
           </p:sp>
         </mc:Choice>
-        <mc:Fallback xmlns="">
+        <mc:Fallback>
           <p:sp>
             <p:nvSpPr>
               <p:cNvPr id="3" name="Content Placeholder 2"/>
@@ -13528,7 +13936,7 @@
               <a:blipFill>
                 <a:blip r:embed="rId2"/>
                 <a:stretch>
-                  <a:fillRect l="-963" t="-2041" b="-942"/>
+                  <a:fillRect l="-963" t="-1099"/>
                 </a:stretch>
               </a:blipFill>
             </p:spPr>
@@ -14121,8 +14529,8 @@
           </a:p>
         </p:txBody>
       </p:sp>
-      <mc:AlternateContent xmlns:mc="http://schemas.openxmlformats.org/markup-compatibility/2006" xmlns:a14="http://schemas.microsoft.com/office/drawing/2010/main">
-        <mc:Choice Requires="a14">
+      <mc:AlternateContent xmlns:mc="http://schemas.openxmlformats.org/markup-compatibility/2006">
+        <mc:Choice xmlns:a14="http://schemas.microsoft.com/office/drawing/2010/main" Requires="a14">
           <p:sp>
             <p:nvSpPr>
               <p:cNvPr id="3" name="Content Placeholder 2"/>
@@ -14287,7 +14695,15 @@
                 </a:r>
                 <a:r>
                   <a:rPr dirty="0"/>
-                  <a:t> is also in the form (actual) counts of successes, </a:t>
+                  <a:t> is also in the form (actual) </a:t>
+                </a:r>
+                <a:r>
+                  <a:rPr b="1" dirty="0"/>
+                  <a:t>counts of successes</a:t>
+                </a:r>
+                <a:r>
+                  <a:rPr dirty="0"/>
+                  <a:t>, </a:t>
                 </a:r>
                 <a14:m>
                   <m:oMath xmlns:m="http://schemas.openxmlformats.org/officeDocument/2006/math">
@@ -14301,7 +14717,15 @@
                 </a14:m>
                 <a:r>
                   <a:rPr dirty="0"/>
-                  <a:t> and failure, </a:t>
+                  <a:t> and </a:t>
+                </a:r>
+                <a:r>
+                  <a:rPr b="1" dirty="0"/>
+                  <a:t>failure</a:t>
+                </a:r>
+                <a:r>
+                  <a:rPr dirty="0"/>
+                  <a:t>, </a:t>
                 </a:r>
                 <a14:m>
                   <m:oMath xmlns:m="http://schemas.openxmlformats.org/officeDocument/2006/math">
@@ -14319,7 +14743,23 @@
                 <a:pPr lvl="0"/>
                 <a:r>
                   <a:rPr dirty="0"/>
-                  <a:t>The more evidence the greater the influence on the posterior distribution</a:t>
+                  <a:t>The more </a:t>
+                </a:r>
+                <a:r>
+                  <a:rPr b="1" dirty="0"/>
+                  <a:t>evidence</a:t>
+                </a:r>
+                <a:r>
+                  <a:rPr dirty="0"/>
+                  <a:t> the </a:t>
+                </a:r>
+                <a:r>
+                  <a:rPr b="1" dirty="0"/>
+                  <a:t>greater the influence on the posterior </a:t>
+                </a:r>
+                <a:r>
+                  <a:rPr dirty="0"/>
+                  <a:t>distribution</a:t>
                 </a:r>
               </a:p>
               <a:p>
@@ -14339,7 +14779,7 @@
             </p:txBody>
           </p:sp>
         </mc:Choice>
-        <mc:Fallback xmlns="">
+        <mc:Fallback>
           <p:sp>
             <p:nvSpPr>
               <p:cNvPr id="3" name="Content Placeholder 2"/>
@@ -14358,7 +14798,7 @@
               <a:blipFill>
                 <a:blip r:embed="rId2"/>
                 <a:stretch>
-                  <a:fillRect l="-1111" t="-2265" r="-444" b="-2265"/>
+                  <a:fillRect l="-1111" t="-2265" r="-1852" b="-2265"/>
                 </a:stretch>
               </a:blipFill>
             </p:spPr>
@@ -14615,8 +15055,12 @@
               </a:p>
               <a:p>
                 <a:r>
+                  <a:rPr b="1" dirty="0"/>
+                  <a:t>Evidence</a:t>
+                </a:r>
+                <a:r>
                   <a:rPr dirty="0"/>
-                  <a:t>Evidence, successes </a:t>
+                  <a:t>, successes </a:t>
                 </a:r>
                 <a14:m>
                   <m:oMath xmlns:m="http://schemas.openxmlformats.org/officeDocument/2006/math">
@@ -14659,7 +15103,15 @@
                 </a:br>
                 <a:r>
                   <a:rPr dirty="0"/>
-                  <a:t>- Posterior is </a:t>
+                  <a:t>- </a:t>
+                </a:r>
+                <a:r>
+                  <a:rPr b="1" dirty="0"/>
+                  <a:t>Posterior</a:t>
+                </a:r>
+                <a:r>
+                  <a:rPr dirty="0"/>
+                  <a:t> is </a:t>
                 </a:r>
                 <a14:m>
                   <m:oMath xmlns:m="http://schemas.openxmlformats.org/officeDocument/2006/math">
@@ -14962,7 +15414,15 @@
             </a:r>
             <a:r>
               <a:rPr dirty="0"/>
-              <a:t>estimate of the poster distribution?</a:t>
+              <a:t>estimate of the poster</a:t>
+            </a:r>
+            <a:r>
+              <a:rPr lang="en-US" dirty="0"/>
+              <a:t>ior</a:t>
+            </a:r>
+            <a:r>
+              <a:rPr dirty="0"/>
+              <a:t> distribution?</a:t>
             </a:r>
           </a:p>
           <a:p>
@@ -14975,7 +15435,7 @@
             </a:r>
             <a:r>
               <a:rPr lang="en-US" dirty="0"/>
-              <a:t>likelihood distribution </a:t>
+              <a:t>likelihood function </a:t>
             </a:r>
           </a:p>
           <a:p>
@@ -14999,10 +15459,18 @@
               <a:buAutoNum type="arabicPeriod"/>
             </a:pPr>
             <a:r>
+              <a:rPr lang="en-US" b="1" dirty="0"/>
+              <a:t>Grid sample </a:t>
+            </a:r>
+            <a:r>
               <a:rPr lang="en-US" dirty="0"/>
-              <a:t>Grid sample or Markov chain Monte Carlo (MCMC) sample</a:t>
-            </a:r>
-            <a:endParaRPr dirty="0"/>
+              <a:t>or Markov chain </a:t>
+            </a:r>
+            <a:r>
+              <a:rPr lang="en-US" b="1" dirty="0"/>
+              <a:t>Monte Carlo (MCMC) sample</a:t>
+            </a:r>
+            <a:endParaRPr b="1" dirty="0"/>
           </a:p>
           <a:p>
             <a:pPr marL="342900" lvl="0" indent="-342900">
@@ -15018,7 +15486,7 @@
             </a:r>
             <a:r>
               <a:rPr lang="en-US" dirty="0"/>
-              <a:t> of likelihood and prior</a:t>
+              <a:t> of the likelihood and the prior</a:t>
             </a:r>
             <a:r>
               <a:rPr dirty="0"/>
@@ -15031,8 +15499,12 @@
               <a:buAutoNum type="arabicPeriod"/>
             </a:pPr>
             <a:r>
+              <a:rPr lang="en-US" b="1" dirty="0"/>
+              <a:t>Normalize</a:t>
+            </a:r>
+            <a:r>
               <a:rPr lang="en-US" dirty="0"/>
-              <a:t>Normalize to compute proper posterior distribution </a:t>
+              <a:t> to compute proper posterior distribution </a:t>
             </a:r>
             <a:endParaRPr dirty="0"/>
           </a:p>
@@ -15160,7 +15632,23 @@
             </a:r>
             <a:r>
               <a:rPr dirty="0"/>
-              <a:t> can work for any number of dimensions</a:t>
+              <a:t> </a:t>
+            </a:r>
+            <a:r>
+              <a:rPr lang="en-US" dirty="0"/>
+              <a:t>grid </a:t>
+            </a:r>
+            <a:r>
+              <a:rPr lang="en-US" dirty="0" err="1"/>
+              <a:t>sampliung</a:t>
+            </a:r>
+            <a:r>
+              <a:rPr lang="en-US" dirty="0"/>
+              <a:t> </a:t>
+            </a:r>
+            <a:r>
+              <a:rPr dirty="0"/>
+              <a:t>can work for any number of dimensions</a:t>
             </a:r>
           </a:p>
           <a:p>
@@ -16503,25 +16991,41 @@
                 <a:pPr lvl="1"/>
                 <a:r>
                   <a:rPr dirty="0"/>
-                  <a:t>The upper and lower confidence intervals quantiles of the sampling distribution</a:t>
+                  <a:t>The upper and lower </a:t>
+                </a:r>
+                <a:r>
+                  <a:rPr lang="en-US" dirty="0"/>
+                  <a:t>bounds on </a:t>
+                </a:r>
+                <a:r>
+                  <a:rPr dirty="0"/>
+                  <a:t>confidence intervals </a:t>
+                </a:r>
+                <a:r>
+                  <a:rPr lang="en-US" dirty="0"/>
+                  <a:t>are </a:t>
+                </a:r>
+                <a:r>
+                  <a:rPr dirty="0"/>
+                  <a:t>quantiles of the sampling distribution</a:t>
+                </a:r>
+              </a:p>
+              <a:p>
+                <a:pPr lvl="0"/>
+                <a:r>
+                  <a:rPr dirty="0"/>
+                  <a:t>For Bayesian analysis </a:t>
+                </a:r>
+                <a:r>
+                  <a:rPr b="1" dirty="0"/>
+                  <a:t>inference performed on posterior distribution</a:t>
                 </a:r>
               </a:p>
               <a:p>
                 <a:pPr lvl="1"/>
                 <a:r>
-                  <a:rPr dirty="0"/>
-                  <a:t>Bayesian analysis has no sampling distribution uses a prior distribution and likelihood</a:t>
-                </a:r>
-              </a:p>
-              <a:p>
-                <a:pPr lvl="0"/>
-                <a:r>
-                  <a:rPr dirty="0"/>
-                  <a:t>For Bayesian analysis </a:t>
-                </a:r>
-                <a:r>
-                  <a:rPr b="1" dirty="0"/>
-                  <a:t>inference performed on posterior distribution</a:t>
+                  <a:rPr lang="en-US" dirty="0"/>
+                  <a:t>Bayesian analysis has no concept sampling distribution uses a prior distribution and likelihood</a:t>
                 </a:r>
               </a:p>
               <a:p>
@@ -16534,13 +17038,24 @@
                   <a:rPr b="1" dirty="0"/>
                   <a:t>credible interval</a:t>
                 </a:r>
-                <a:endParaRPr dirty="0"/>
+                <a:r>
+                  <a:rPr lang="en-US" dirty="0"/>
+                  <a:t> on the posterior distribution</a:t>
+                </a:r>
               </a:p>
               <a:p>
                 <a:pPr lvl="1"/>
                 <a:r>
+                  <a:rPr lang="en-US" b="1" dirty="0"/>
+                  <a:t>Credible interval </a:t>
+                </a:r>
+                <a:r>
+                  <a:rPr lang="en-US" dirty="0"/>
+                  <a:t>is the</a:t>
+                </a:r>
+                <a:r>
                   <a:rPr dirty="0"/>
-                  <a:t>A credible interval is an interval on the Bayesian posterior distribution with the </a:t>
+                  <a:t> interval with the </a:t>
                 </a:r>
                 <a:r>
                   <a:rPr b="1" dirty="0"/>
@@ -16558,7 +17073,15 @@
                 </a14:m>
                 <a:r>
                   <a:rPr b="1" dirty="0"/>
-                  <a:t> proportion of posterior probability</a:t>
+                  <a:t> </a:t>
+                </a:r>
+                <a:r>
+                  <a:rPr lang="en-US" b="1" dirty="0"/>
+                  <a:t>fraction</a:t>
+                </a:r>
+                <a:r>
+                  <a:rPr b="1" dirty="0"/>
+                  <a:t> of posterior probability</a:t>
                 </a:r>
               </a:p>
             </p:txBody>
@@ -16583,7 +17106,7 @@
               <a:blipFill>
                 <a:blip r:embed="rId2"/>
                 <a:stretch>
-                  <a:fillRect l="-741" t="-1827" r="-519"/>
+                  <a:fillRect l="-741" t="-1827" r="-963"/>
                 </a:stretch>
               </a:blipFill>
             </p:spPr>
@@ -16775,15 +17298,15 @@
                 <a:pPr lvl="0"/>
                 <a:r>
                   <a:rPr dirty="0"/>
-                  <a:t>For symmetric distributions the credible interval can numerically </a:t>
+                  <a:t>For symmetric distributions the credible interval </a:t>
                 </a:r>
                 <a:r>
                   <a:rPr lang="en-US" dirty="0"/>
-                  <a:t>be </a:t>
+                  <a:t>is</a:t>
                 </a:r>
                 <a:r>
                   <a:rPr dirty="0"/>
-                  <a:t>the same as the confidence interval</a:t>
+                  <a:t> numerically the same as the confidence interval</a:t>
                 </a:r>
               </a:p>
               <a:p>
@@ -16927,7 +17450,19 @@
                           <a:rPr>
                             <a:latin typeface="Cambria Math" panose="02040503050406030204" pitchFamily="18" charset="0"/>
                           </a:rPr>
-                          <m:t>12, 40</m:t>
+                          <m:t>12</m:t>
+                        </m:r>
+                        <m:r>
+                          <a:rPr>
+                            <a:latin typeface="Cambria Math" panose="02040503050406030204" pitchFamily="18" charset="0"/>
+                          </a:rPr>
+                          <m:t>, </m:t>
+                        </m:r>
+                        <m:r>
+                          <a:rPr>
+                            <a:latin typeface="Cambria Math" panose="02040503050406030204" pitchFamily="18" charset="0"/>
+                          </a:rPr>
+                          <m:t>40</m:t>
                         </m:r>
                       </m:e>
                     </m:d>
@@ -17199,7 +17734,7 @@
                 </a:r>
                 <a:r>
                   <a:rPr lang="en-US" dirty="0"/>
-                  <a:t> for the statistic being estimated</a:t>
+                  <a:t> for the posterior of the statistic</a:t>
                 </a:r>
               </a:p>
               <a:p>
@@ -17481,7 +18016,7 @@
         </p:spPr>
         <p:txBody>
           <a:bodyPr>
-            <a:normAutofit lnSpcReduction="10000"/>
+            <a:normAutofit/>
           </a:bodyPr>
           <a:lstStyle/>
           <a:p>
@@ -17490,8 +18025,20 @@
             </a:pPr>
             <a:r>
               <a:rPr dirty="0"/>
-              <a:t>What else can we do with a Bayesian posterior distribution beyond credible intervals?</a:t>
-            </a:r>
+              <a:t>What else can we do with </a:t>
+            </a:r>
+            <a:r>
+              <a:rPr lang="en-US" dirty="0"/>
+              <a:t>the</a:t>
+            </a:r>
+            <a:r>
+              <a:rPr dirty="0"/>
+              <a:t> Bayesian </a:t>
+            </a:r>
+            <a:r>
+              <a:t>posterior distribution?</a:t>
+            </a:r>
+            <a:endParaRPr dirty="0"/>
           </a:p>
           <a:p>
             <a:pPr lvl="0"/>
@@ -17581,8 +18128,8 @@
           </a:p>
         </p:txBody>
       </p:sp>
-      <mc:AlternateContent xmlns:mc="http://schemas.openxmlformats.org/markup-compatibility/2006">
-        <mc:Choice xmlns:a14="http://schemas.microsoft.com/office/drawing/2010/main" Requires="a14">
+      <mc:AlternateContent xmlns:mc="http://schemas.openxmlformats.org/markup-compatibility/2006" xmlns:a14="http://schemas.microsoft.com/office/drawing/2010/main">
+        <mc:Choice Requires="a14">
           <p:sp>
             <p:nvSpPr>
               <p:cNvPr id="3" name="Content Placeholder 2"/>
@@ -17667,7 +18214,7 @@
             </p:txBody>
           </p:sp>
         </mc:Choice>
-        <mc:Fallback>
+        <mc:Fallback xmlns="">
           <p:sp>
             <p:nvSpPr>
               <p:cNvPr id="3" name="Content Placeholder 2"/>
@@ -18024,8 +18571,8 @@
           </a:p>
         </p:txBody>
       </p:sp>
-      <mc:AlternateContent xmlns:mc="http://schemas.openxmlformats.org/markup-compatibility/2006">
-        <mc:Choice xmlns:a14="http://schemas.microsoft.com/office/drawing/2010/main" Requires="a14">
+      <mc:AlternateContent xmlns:mc="http://schemas.openxmlformats.org/markup-compatibility/2006" xmlns:a14="http://schemas.microsoft.com/office/drawing/2010/main">
+        <mc:Choice Requires="a14">
           <p:sp>
             <p:nvSpPr>
               <p:cNvPr id="3" name="Content Placeholder 2"/>
@@ -18145,7 +18692,7 @@
             </p:txBody>
           </p:sp>
         </mc:Choice>
-        <mc:Fallback>
+        <mc:Fallback xmlns="">
           <p:sp>
             <p:nvSpPr>
               <p:cNvPr id="3" name="Content Placeholder 2"/>
@@ -18250,7 +18797,7 @@
         </p:spPr>
         <p:txBody>
           <a:bodyPr>
-            <a:normAutofit fontScale="92500" lnSpcReduction="20000"/>
+            <a:normAutofit fontScale="85000" lnSpcReduction="10000"/>
           </a:bodyPr>
           <a:lstStyle/>
           <a:p>
@@ -18259,7 +18806,15 @@
             </a:pPr>
             <a:r>
               <a:rPr dirty="0"/>
-              <a:t>Despite the long history, Bayesian models have not been used extensively until recently</a:t>
+              <a:t>Despite the long history, </a:t>
+            </a:r>
+            <a:r>
+              <a:rPr b="1" dirty="0"/>
+              <a:t>Bayesian models </a:t>
+            </a:r>
+            <a:r>
+              <a:rPr dirty="0"/>
+              <a:t>have not been used extensively until recently</a:t>
             </a:r>
           </a:p>
           <a:p>
@@ -18272,50 +18827,47 @@
           <a:p>
             <a:pPr lvl="1"/>
             <a:r>
-              <a:rPr dirty="0"/>
+              <a:rPr b="1" dirty="0"/>
               <a:t>Frequentist </a:t>
             </a:r>
             <a:r>
+              <a:rPr lang="en-US" b="1" dirty="0"/>
+              <a:t>classical statistics </a:t>
+            </a:r>
+            <a:r>
+              <a:rPr dirty="0"/>
+              <a:t>we have been working with previously</a:t>
+            </a:r>
+          </a:p>
+          <a:p>
+            <a:pPr lvl="1"/>
+            <a:r>
+              <a:rPr dirty="0"/>
+              <a:t>Bayesian statistics</a:t>
+            </a:r>
+          </a:p>
+          <a:p>
+            <a:pPr lvl="0"/>
+            <a:r>
+              <a:rPr dirty="0"/>
+              <a:t>Limited use is a result of several difficulties</a:t>
+            </a:r>
+          </a:p>
+          <a:p>
+            <a:pPr lvl="1"/>
+            <a:r>
+              <a:rPr dirty="0"/>
+              <a:t>Rarely taught for much of the 20th Century</a:t>
+            </a:r>
+          </a:p>
+          <a:p>
+            <a:pPr lvl="1"/>
+            <a:r>
               <a:rPr lang="en-US" dirty="0"/>
-              <a:t>classical statistics </a:t>
-            </a:r>
-            <a:r>
-              <a:rPr dirty="0"/>
-              <a:t>we have been working with previously</a:t>
-            </a:r>
-          </a:p>
-          <a:p>
-            <a:pPr lvl="1"/>
-            <a:r>
-              <a:rPr dirty="0"/>
-              <a:t>Bayesian statistics</a:t>
-            </a:r>
-          </a:p>
-          <a:p>
-            <a:pPr lvl="0"/>
-            <a:r>
-              <a:rPr dirty="0"/>
-              <a:t>Limited use is a result of several difficulties</a:t>
-            </a:r>
-          </a:p>
-          <a:p>
-            <a:pPr lvl="1"/>
-            <a:r>
-              <a:rPr dirty="0"/>
-              <a:t>Rarely taught for much of the 20th Century</a:t>
-            </a:r>
-          </a:p>
-          <a:p>
-            <a:pPr lvl="1"/>
-            <a:r>
-              <a:rPr lang="en-US" dirty="0" err="1"/>
-              <a:t>Specifing</a:t>
-            </a:r>
-            <a:r>
-              <a:rPr lang="en-US"/>
-              <a:t> </a:t>
-            </a:r>
-            <a:r>
+              <a:t>Specifying </a:t>
+            </a:r>
+            <a:r>
+              <a:rPr dirty="0"/>
               <a:t>a </a:t>
             </a:r>
             <a:r>
@@ -18337,8 +18889,12 @@
           <a:p>
             <a:pPr lvl="0"/>
             <a:r>
-              <a:rPr dirty="0"/>
-              <a:t>Recent emergence of improved software and algorithms has resulted in wide and practical </a:t>
+              <a:rPr lang="en-US" dirty="0"/>
+              <a:t>E</a:t>
+            </a:r>
+            <a:r>
+              <a:rPr dirty="0"/>
+              <a:t>mergence of improved software and algorithms has resulted in wide and practical </a:t>
             </a:r>
             <a:r>
               <a:rPr lang="en-US" dirty="0"/>
@@ -18650,6 +19206,11 @@
               <a:rPr dirty="0"/>
               <a:t>Aircraft had disappeared in little traveled area of the South Atlantic Ocean</a:t>
             </a:r>
+            <a:r>
+              <a:rPr lang="en-US" dirty="0"/>
+              <a:t> on June 1, 2009</a:t>
+            </a:r>
+            <a:endParaRPr dirty="0"/>
           </a:p>
           <a:p>
             <a:pPr lvl="0"/>
@@ -18826,7 +19387,11 @@
             </a:r>
             <a:r>
               <a:rPr lang="en-US" dirty="0"/>
-              <a:t>ing</a:t>
+              <a:t>ing for the </a:t>
+            </a:r>
+            <a:r>
+              <a:rPr lang="en-US"/>
+              <a:t>US Coast Guard</a:t>
             </a:r>
             <a:endParaRPr dirty="0"/>
           </a:p>

</xml_diff>

<commit_message>
Updates, reorganization and corrections to slides
</commit_message>
<xml_diff>
--- a/LectureSlides/07_IntroductionToBayesModels.pptx
+++ b/LectureSlides/07_IntroductionToBayesModels.pptx
@@ -254,7 +254,7 @@
           <a:p>
             <a:fld id="{13DDEE00-70AE-47E2-95E5-F1C95ECCE916}" type="datetimeFigureOut">
               <a:rPr lang="en-US" smtClean="0"/>
-              <a:t>10/1/2024</a:t>
+              <a:t>10/2/2024</a:t>
             </a:fld>
             <a:endParaRPr lang="en-US"/>
           </a:p>
@@ -784,7 +784,7 @@
           <a:p>
             <a:fld id="{241EB5C9-1307-BA42-ABA2-0BC069CD8E7F}" type="datetimeFigureOut">
               <a:rPr lang="en-US" smtClean="0"/>
-              <a:t>10/1/2024</a:t>
+              <a:t>10/2/2024</a:t>
             </a:fld>
             <a:endParaRPr lang="en-US"/>
           </a:p>
@@ -952,7 +952,7 @@
           <a:p>
             <a:fld id="{241EB5C9-1307-BA42-ABA2-0BC069CD8E7F}" type="datetimeFigureOut">
               <a:rPr lang="en-US" smtClean="0"/>
-              <a:t>10/1/2024</a:t>
+              <a:t>10/2/2024</a:t>
             </a:fld>
             <a:endParaRPr lang="en-US"/>
           </a:p>
@@ -1130,7 +1130,7 @@
           <a:p>
             <a:fld id="{241EB5C9-1307-BA42-ABA2-0BC069CD8E7F}" type="datetimeFigureOut">
               <a:rPr lang="en-US" smtClean="0"/>
-              <a:t>10/1/2024</a:t>
+              <a:t>10/2/2024</a:t>
             </a:fld>
             <a:endParaRPr lang="en-US"/>
           </a:p>
@@ -1298,7 +1298,7 @@
           <a:p>
             <a:fld id="{241EB5C9-1307-BA42-ABA2-0BC069CD8E7F}" type="datetimeFigureOut">
               <a:rPr lang="en-US" smtClean="0"/>
-              <a:t>10/1/2024</a:t>
+              <a:t>10/2/2024</a:t>
             </a:fld>
             <a:endParaRPr lang="en-US"/>
           </a:p>
@@ -1543,7 +1543,7 @@
           <a:p>
             <a:fld id="{241EB5C9-1307-BA42-ABA2-0BC069CD8E7F}" type="datetimeFigureOut">
               <a:rPr lang="en-US" smtClean="0"/>
-              <a:t>10/1/2024</a:t>
+              <a:t>10/2/2024</a:t>
             </a:fld>
             <a:endParaRPr lang="en-US"/>
           </a:p>
@@ -1828,7 +1828,7 @@
           <a:p>
             <a:fld id="{241EB5C9-1307-BA42-ABA2-0BC069CD8E7F}" type="datetimeFigureOut">
               <a:rPr lang="en-US" smtClean="0"/>
-              <a:t>10/1/2024</a:t>
+              <a:t>10/2/2024</a:t>
             </a:fld>
             <a:endParaRPr lang="en-US"/>
           </a:p>
@@ -2247,7 +2247,7 @@
           <a:p>
             <a:fld id="{241EB5C9-1307-BA42-ABA2-0BC069CD8E7F}" type="datetimeFigureOut">
               <a:rPr lang="en-US" smtClean="0"/>
-              <a:t>10/1/2024</a:t>
+              <a:t>10/2/2024</a:t>
             </a:fld>
             <a:endParaRPr lang="en-US"/>
           </a:p>
@@ -2364,7 +2364,7 @@
           <a:p>
             <a:fld id="{241EB5C9-1307-BA42-ABA2-0BC069CD8E7F}" type="datetimeFigureOut">
               <a:rPr lang="en-US" smtClean="0"/>
-              <a:t>10/1/2024</a:t>
+              <a:t>10/2/2024</a:t>
             </a:fld>
             <a:endParaRPr lang="en-US"/>
           </a:p>
@@ -2459,7 +2459,7 @@
           <a:p>
             <a:fld id="{241EB5C9-1307-BA42-ABA2-0BC069CD8E7F}" type="datetimeFigureOut">
               <a:rPr lang="en-US" smtClean="0"/>
-              <a:t>10/1/2024</a:t>
+              <a:t>10/2/2024</a:t>
             </a:fld>
             <a:endParaRPr lang="en-US"/>
           </a:p>
@@ -2734,7 +2734,7 @@
           <a:p>
             <a:fld id="{241EB5C9-1307-BA42-ABA2-0BC069CD8E7F}" type="datetimeFigureOut">
               <a:rPr lang="en-US" smtClean="0"/>
-              <a:t>10/1/2024</a:t>
+              <a:t>10/2/2024</a:t>
             </a:fld>
             <a:endParaRPr lang="en-US"/>
           </a:p>
@@ -2986,7 +2986,7 @@
           <a:p>
             <a:fld id="{241EB5C9-1307-BA42-ABA2-0BC069CD8E7F}" type="datetimeFigureOut">
               <a:rPr lang="en-US" smtClean="0"/>
-              <a:t>10/1/2024</a:t>
+              <a:t>10/2/2024</a:t>
             </a:fld>
             <a:endParaRPr lang="en-US"/>
           </a:p>
@@ -3197,7 +3197,7 @@
           <a:p>
             <a:fld id="{241EB5C9-1307-BA42-ABA2-0BC069CD8E7F}" type="datetimeFigureOut">
               <a:rPr lang="en-US" smtClean="0"/>
-              <a:t>10/1/2024</a:t>
+              <a:t>10/2/2024</a:t>
             </a:fld>
             <a:endParaRPr lang="en-US"/>
           </a:p>
@@ -5877,8 +5877,8 @@
           </a:p>
         </p:txBody>
       </p:sp>
-      <mc:AlternateContent xmlns:mc="http://schemas.openxmlformats.org/markup-compatibility/2006" xmlns:a14="http://schemas.microsoft.com/office/drawing/2010/main">
-        <mc:Choice Requires="a14">
+      <mc:AlternateContent xmlns:mc="http://schemas.openxmlformats.org/markup-compatibility/2006">
+        <mc:Choice xmlns:a14="http://schemas.microsoft.com/office/drawing/2010/main" Requires="a14">
           <p:sp>
             <p:nvSpPr>
               <p:cNvPr id="3" name="Content Placeholder 2"/>
@@ -5950,12 +5950,8 @@
                   <a:t>, </a:t>
                 </a:r>
                 <a:r>
-                  <a:rPr lang="en-US" dirty="0" err="1"/>
-                  <a:t>compted</a:t>
-                </a:r>
-                <a:r>
                   <a:rPr lang="en-US" dirty="0"/>
-                  <a:t> as a</a:t>
+                  <a:t>computed as a</a:t>
                 </a:r>
                 <a:r>
                   <a:rPr dirty="0"/>
@@ -6342,7 +6338,7 @@
             </p:txBody>
           </p:sp>
         </mc:Choice>
-        <mc:Fallback xmlns="">
+        <mc:Fallback>
           <p:sp>
             <p:nvSpPr>
               <p:cNvPr id="3" name="Content Placeholder 2"/>
@@ -7049,7 +7045,15 @@
             </a:r>
             <a:r>
               <a:rPr dirty="0"/>
-              <a:t> of the parameters given the evidence or data, the goal of Bayesian analysis</a:t>
+              <a:t> of the</a:t>
+            </a:r>
+            <a:r>
+              <a:rPr lang="en-US" dirty="0"/>
+              <a:t> model</a:t>
+            </a:r>
+            <a:r>
+              <a:rPr dirty="0"/>
+              <a:t> parameters given the evidence or data, the goal of Bayesian analysis</a:t>
             </a:r>
           </a:p>
           <a:p>
@@ -7118,7 +7122,15 @@
             </a:r>
             <a:r>
               <a:rPr dirty="0"/>
-              <a:t> partial slopes, intercept, error distributions, lasso constants, </a:t>
+              <a:t> </a:t>
+            </a:r>
+            <a:r>
+              <a:rPr lang="en-US" dirty="0"/>
+              <a:t>a statistic, </a:t>
+            </a:r>
+            <a:r>
+              <a:rPr dirty="0"/>
+              <a:t>partial slopes, intercept, </a:t>
             </a:r>
             <a:r>
               <a:rPr dirty="0" err="1"/>
@@ -7177,8 +7189,8 @@
           </a:p>
         </p:txBody>
       </p:sp>
-      <mc:AlternateContent xmlns:mc="http://schemas.openxmlformats.org/markup-compatibility/2006">
-        <mc:Choice xmlns:a14="http://schemas.microsoft.com/office/drawing/2010/main" Requires="a14">
+      <mc:AlternateContent xmlns:mc="http://schemas.openxmlformats.org/markup-compatibility/2006" xmlns:a14="http://schemas.microsoft.com/office/drawing/2010/main">
+        <mc:Choice Requires="a14">
           <p:sp>
             <p:nvSpPr>
               <p:cNvPr id="3" name="Content Placeholder 2"/>
@@ -7810,7 +7822,7 @@
             </p:txBody>
           </p:sp>
         </mc:Choice>
-        <mc:Fallback>
+        <mc:Fallback xmlns="">
           <p:sp>
             <p:nvSpPr>
               <p:cNvPr id="3" name="Content Placeholder 2"/>
@@ -8538,10 +8550,11 @@
                 <a14:m>
                   <m:oMath xmlns:m="http://schemas.openxmlformats.org/officeDocument/2006/math">
                     <m:r>
-                      <a:rPr lang="en-US">
+                      <a:rPr lang="ar-AE" i="1">
                         <a:latin typeface="Cambria Math" panose="02040503050406030204" pitchFamily="18" charset="0"/>
+                        <a:ea typeface="Cambria Math" panose="02040503050406030204" pitchFamily="18" charset="0"/>
                       </a:rPr>
-                      <m:t>𝑘</m:t>
+                      <m:t>𝜅</m:t>
                     </m:r>
                   </m:oMath>
                 </a14:m>
@@ -8754,8 +8767,8 @@
           </a:p>
         </p:txBody>
       </p:sp>
-      <mc:AlternateContent xmlns:mc="http://schemas.openxmlformats.org/markup-compatibility/2006" xmlns:a14="http://schemas.microsoft.com/office/drawing/2010/main">
-        <mc:Choice Requires="a14">
+      <mc:AlternateContent xmlns:mc="http://schemas.openxmlformats.org/markup-compatibility/2006">
+        <mc:Choice xmlns:a14="http://schemas.microsoft.com/office/drawing/2010/main" Requires="a14">
           <p:sp>
             <p:nvSpPr>
               <p:cNvPr id="3" name="Content Placeholder 2"/>
@@ -9054,20 +9067,6 @@
                                   <a:ea typeface="Cambria Math" panose="02040503050406030204" pitchFamily="18" charset="0"/>
                                 </a:rPr>
                                 <m:t>∈</m:t>
-                              </m:r>
-                              <m:r>
-                                <a:rPr lang="en-US" sz="2000" b="0" i="1" smtClean="0">
-                                  <a:latin typeface="Cambria Math" panose="02040503050406030204" pitchFamily="18" charset="0"/>
-                                  <a:ea typeface="Cambria Math" panose="02040503050406030204" pitchFamily="18" charset="0"/>
-                                </a:rPr>
-                                <m:t> </m:t>
-                              </m:r>
-                              <m:r>
-                                <a:rPr lang="en-US" sz="2000" b="0" i="1" smtClean="0">
-                                  <a:latin typeface="Cambria Math" panose="02040503050406030204" pitchFamily="18" charset="0"/>
-                                  <a:ea typeface="Cambria Math" panose="02040503050406030204" pitchFamily="18" charset="0"/>
-                                </a:rPr>
-                                <m:t>𝑎𝑙𝑙</m:t>
                               </m:r>
                               <m:r>
                                 <a:rPr lang="en-US" sz="2000" b="0" i="1" smtClean="0">
@@ -9262,7 +9261,7 @@
             </p:txBody>
           </p:sp>
         </mc:Choice>
-        <mc:Fallback xmlns="">
+        <mc:Fallback>
           <p:sp>
             <p:nvSpPr>
               <p:cNvPr id="3" name="Content Placeholder 2"/>
@@ -9653,7 +9652,7 @@
                 </a:pPr>
                 <a:r>
                   <a:rPr lang="en-US" dirty="0"/>
-                  <a:t>We can find an un-normalized function proportional to the posterior distribution</a:t>
+                  <a:t>Compute un-normalized function proportional to the posterior distribution</a:t>
                 </a:r>
               </a:p>
               <a:p>
@@ -10053,8 +10052,28 @@
               <a:buAutoNum type="arabicPeriod"/>
             </a:pPr>
             <a:r>
-              <a:rPr dirty="0"/>
-              <a:t>Inference on the posterior can be performed; compute</a:t>
+              <a:rPr lang="en-US" dirty="0"/>
+              <a:t>Perform </a:t>
+            </a:r>
+            <a:r>
+              <a:rPr lang="en-US" b="1" dirty="0"/>
+              <a:t>i</a:t>
+            </a:r>
+            <a:r>
+              <a:rPr b="1" dirty="0"/>
+              <a:t>nference</a:t>
+            </a:r>
+            <a:r>
+              <a:rPr dirty="0"/>
+              <a:t> on the posterior; </a:t>
+            </a:r>
+            <a:r>
+              <a:rPr lang="en-US" dirty="0"/>
+              <a:t>e.g. </a:t>
+            </a:r>
+            <a:r>
+              <a:rPr dirty="0"/>
+              <a:t>compute</a:t>
             </a:r>
             <a:r>
               <a:rPr lang="en-US" dirty="0"/>
@@ -10495,7 +10514,15 @@
             </a:r>
             <a:r>
               <a:rPr dirty="0"/>
-              <a:t>nformation from prior work</a:t>
+              <a:t>nformation from </a:t>
+            </a:r>
+            <a:r>
+              <a:rPr lang="en-US" dirty="0"/>
+              <a:t>existing</a:t>
+            </a:r>
+            <a:r>
+              <a:rPr dirty="0"/>
+              <a:t> work</a:t>
             </a:r>
           </a:p>
           <a:p>
@@ -12039,7 +12066,15 @@
             </a:r>
             <a:r>
               <a:rPr b="1" dirty="0"/>
-              <a:t>no assumptions about population distribution!</a:t>
+              <a:t>no assumptions about</a:t>
+            </a:r>
+            <a:r>
+              <a:rPr lang="en-US" b="1" dirty="0"/>
+              <a:t> sampling</a:t>
+            </a:r>
+            <a:r>
+              <a:rPr b="1" dirty="0"/>
+              <a:t> distribution!</a:t>
             </a:r>
           </a:p>
           <a:p>
@@ -12148,8 +12183,8 @@
           </a:p>
         </p:txBody>
       </p:sp>
-      <mc:AlternateContent xmlns:mc="http://schemas.openxmlformats.org/markup-compatibility/2006">
-        <mc:Choice xmlns:a14="http://schemas.microsoft.com/office/drawing/2010/main" Requires="a14">
+      <mc:AlternateContent xmlns:mc="http://schemas.openxmlformats.org/markup-compatibility/2006" xmlns:a14="http://schemas.microsoft.com/office/drawing/2010/main">
+        <mc:Choice Requires="a14">
           <p:sp>
             <p:nvSpPr>
               <p:cNvPr id="3" name="Content Placeholder 2"/>
@@ -12512,7 +12547,7 @@
             </p:txBody>
           </p:sp>
         </mc:Choice>
-        <mc:Fallback>
+        <mc:Fallback xmlns="">
           <p:sp>
             <p:nvSpPr>
               <p:cNvPr id="3" name="Content Placeholder 2"/>
@@ -12613,8 +12648,8 @@
           </a:p>
         </p:txBody>
       </p:sp>
-      <mc:AlternateContent xmlns:mc="http://schemas.openxmlformats.org/markup-compatibility/2006">
-        <mc:Choice xmlns:a14="http://schemas.microsoft.com/office/drawing/2010/main" Requires="a14">
+      <mc:AlternateContent xmlns:mc="http://schemas.openxmlformats.org/markup-compatibility/2006" xmlns:a14="http://schemas.microsoft.com/office/drawing/2010/main">
+        <mc:Choice Requires="a14">
           <p:sp>
             <p:nvSpPr>
               <p:cNvPr id="3" name="Content Placeholder 2"/>
@@ -12766,7 +12801,7 @@
             </p:txBody>
           </p:sp>
         </mc:Choice>
-        <mc:Fallback>
+        <mc:Fallback xmlns="">
           <p:sp>
             <p:nvSpPr>
               <p:cNvPr id="3" name="Content Placeholder 2"/>
@@ -12896,8 +12931,8 @@
           </a:ln>
         </p:spPr>
       </p:pic>
-      <mc:AlternateContent xmlns:mc="http://schemas.openxmlformats.org/markup-compatibility/2006">
-        <mc:Choice xmlns:a14="http://schemas.microsoft.com/office/drawing/2010/main" Requires="a14">
+      <mc:AlternateContent xmlns:mc="http://schemas.openxmlformats.org/markup-compatibility/2006" xmlns:a14="http://schemas.microsoft.com/office/drawing/2010/main">
+        <mc:Choice Requires="a14">
           <p:sp>
             <p:nvSpPr>
               <p:cNvPr id="5" name="TextBox 3"/>
@@ -13033,7 +13068,7 @@
             </p:txBody>
           </p:sp>
         </mc:Choice>
-        <mc:Fallback>
+        <mc:Fallback xmlns="">
           <p:sp>
             <p:nvSpPr>
               <p:cNvPr id="5" name="TextBox 3"/>
@@ -13286,7 +13321,7 @@
                 </a14:m>
                 <a:r>
                   <a:rPr lang="en-US" dirty="0"/>
-                  <a:t>, or the vector </a:t>
+                  <a:t>, or the parameter vector </a:t>
                 </a:r>
                 <a14:m>
                   <m:oMath xmlns:m="http://schemas.openxmlformats.org/officeDocument/2006/math">
@@ -14529,8 +14564,8 @@
           </a:p>
         </p:txBody>
       </p:sp>
-      <mc:AlternateContent xmlns:mc="http://schemas.openxmlformats.org/markup-compatibility/2006">
-        <mc:Choice xmlns:a14="http://schemas.microsoft.com/office/drawing/2010/main" Requires="a14">
+      <mc:AlternateContent xmlns:mc="http://schemas.openxmlformats.org/markup-compatibility/2006" xmlns:a14="http://schemas.microsoft.com/office/drawing/2010/main">
+        <mc:Choice Requires="a14">
           <p:sp>
             <p:nvSpPr>
               <p:cNvPr id="3" name="Content Placeholder 2"/>
@@ -14779,7 +14814,7 @@
             </p:txBody>
           </p:sp>
         </mc:Choice>
-        <mc:Fallback>
+        <mc:Fallback xmlns="">
           <p:sp>
             <p:nvSpPr>
               <p:cNvPr id="3" name="Content Placeholder 2"/>
@@ -14881,8 +14916,8 @@
           </a:p>
         </p:txBody>
       </p:sp>
-      <mc:AlternateContent xmlns:mc="http://schemas.openxmlformats.org/markup-compatibility/2006">
-        <mc:Choice xmlns:a14="http://schemas.microsoft.com/office/drawing/2010/main" Requires="a14">
+      <mc:AlternateContent xmlns:mc="http://schemas.openxmlformats.org/markup-compatibility/2006" xmlns:a14="http://schemas.microsoft.com/office/drawing/2010/main">
+        <mc:Choice Requires="a14">
           <p:sp>
             <p:nvSpPr>
               <p:cNvPr id="3" name="Content Placeholder 2"/>
@@ -15239,7 +15274,7 @@
             </p:txBody>
           </p:sp>
         </mc:Choice>
-        <mc:Fallback>
+        <mc:Fallback xmlns="">
           <p:sp>
             <p:nvSpPr>
               <p:cNvPr id="3" name="Content Placeholder 2"/>
@@ -15435,7 +15470,7 @@
             </a:r>
             <a:r>
               <a:rPr lang="en-US" dirty="0"/>
-              <a:t>likelihood function </a:t>
+              <a:t>likelihood function and prior</a:t>
             </a:r>
           </a:p>
           <a:p>
@@ -15636,15 +15671,7 @@
             </a:r>
             <a:r>
               <a:rPr lang="en-US" dirty="0"/>
-              <a:t>grid </a:t>
-            </a:r>
-            <a:r>
-              <a:rPr lang="en-US" dirty="0" err="1"/>
-              <a:t>sampliung</a:t>
-            </a:r>
-            <a:r>
-              <a:rPr lang="en-US" dirty="0"/>
-              <a:t> </a:t>
+              <a:t>grid sampling </a:t>
             </a:r>
             <a:r>
               <a:rPr dirty="0"/>
@@ -16972,7 +16999,7 @@
                 <a:pPr lvl="0"/>
                 <a:r>
                   <a:rPr dirty="0"/>
-                  <a:t>For frequentist analysis we use confidence intervals, but not entirely appropriate</a:t>
+                  <a:t>For frequentist analysis we use confidence intervals</a:t>
                 </a:r>
               </a:p>
               <a:p>
@@ -16984,6 +17011,10 @@
                 <a:r>
                   <a:rPr b="1" dirty="0"/>
                   <a:t>sampling distribution</a:t>
+                </a:r>
+                <a:r>
+                  <a:rPr lang="en-US" dirty="0"/>
+                  <a:t>, not posterior distribution </a:t>
                 </a:r>
                 <a:endParaRPr dirty="0"/>
               </a:p>
@@ -17025,7 +17056,7 @@
                 <a:pPr lvl="1"/>
                 <a:r>
                   <a:rPr lang="en-US" dirty="0"/>
-                  <a:t>Bayesian analysis has no concept sampling distribution uses a prior distribution and likelihood</a:t>
+                  <a:t>Bayesian analysis has no concept sampling distribution</a:t>
                 </a:r>
               </a:p>
               <a:p>
@@ -17106,7 +17137,7 @@
               <a:blipFill>
                 <a:blip r:embed="rId2"/>
                 <a:stretch>
-                  <a:fillRect l="-741" t="-1827" r="-963"/>
+                  <a:fillRect l="-741" t="-1827"/>
                 </a:stretch>
               </a:blipFill>
             </p:spPr>
@@ -17230,7 +17261,11 @@
                 </a14:m>
                 <a:r>
                   <a:rPr dirty="0"/>
-                  <a:t> credible interval encompasses the 90% of the posterior distribution with the highest density</a:t>
+                  <a:t> credible interval encompasses the 90% of the posterior distribution with the </a:t>
+                </a:r>
+                <a:r>
+                  <a:rPr b="1" dirty="0"/>
+                  <a:t>highest density</a:t>
                 </a:r>
               </a:p>
               <a:p>
@@ -17639,7 +17674,7 @@
             </p:spPr>
             <p:txBody>
               <a:bodyPr>
-                <a:normAutofit fontScale="85000" lnSpcReduction="20000"/>
+                <a:normAutofit fontScale="92500"/>
               </a:bodyPr>
               <a:lstStyle/>
               <a:p>
@@ -17649,12 +17684,6 @@
                 <a:r>
                   <a:rPr lang="en-US" dirty="0"/>
                   <a:t>How are credible intervals different from the more familiar confidence intervals?</a:t>
-                </a:r>
-              </a:p>
-              <a:p>
-                <a:r>
-                  <a:rPr lang="en-US" dirty="0"/>
-                  <a:t>Confidence intervals and credible intervals are conceptually quite different</a:t>
                 </a:r>
               </a:p>
               <a:p>
@@ -17741,13 +17770,7 @@
                 <a:pPr lvl="1"/>
                 <a:r>
                   <a:rPr lang="en-US" dirty="0"/>
-                  <a:t>Credible interval is exactly what the misinterpretation of the confidence interval tries to be</a:t>
-                </a:r>
-              </a:p>
-              <a:p>
-                <a:r>
-                  <a:rPr lang="en-US" dirty="0"/>
-                  <a:t>For symmetric distributions the credible interval and confidence interval are identical</a:t>
+                  <a:t>Credible interval is exactly what would like the confidence interval to be</a:t>
                 </a:r>
               </a:p>
             </p:txBody>
@@ -17772,7 +17795,7 @@
               <a:blipFill>
                 <a:blip r:embed="rId2"/>
                 <a:stretch>
-                  <a:fillRect l="-741" t="-2074" r="-667"/>
+                  <a:fillRect l="-963" t="-1037" r="-593"/>
                 </a:stretch>
               </a:blipFill>
             </p:spPr>
@@ -17866,8 +17889,32 @@
               <a:buNone/>
             </a:pPr>
             <a:r>
-              <a:rPr dirty="0"/>
-              <a:t>Compare confidence interval and credible interval for the case of 10 observations</a:t>
+              <a:t>Compare </a:t>
+            </a:r>
+            <a:r>
+              <a:rPr lang="en-US"/>
+              <a:t>95% </a:t>
+            </a:r>
+            <a:r>
+              <a:t>confidence </a:t>
+            </a:r>
+            <a:r>
+              <a:rPr dirty="0"/>
+              <a:t>interval </a:t>
+            </a:r>
+            <a:r>
+              <a:t>and </a:t>
+            </a:r>
+            <a:r>
+              <a:rPr lang="en-US"/>
+              <a:t>95% </a:t>
+            </a:r>
+            <a:r>
+              <a:t>credible </a:t>
+            </a:r>
+            <a:r>
+              <a:rPr dirty="0"/>
+              <a:t>interval for the case of 10 observations</a:t>
             </a:r>
           </a:p>
           <a:p>
@@ -18850,7 +18897,15 @@
             <a:pPr lvl="0"/>
             <a:r>
               <a:rPr dirty="0"/>
-              <a:t>Limited use is a result of several difficulties</a:t>
+              <a:t>Limited use</a:t>
+            </a:r>
+            <a:r>
+              <a:rPr lang="en-US" dirty="0"/>
+              <a:t> of Bayesian methods</a:t>
+            </a:r>
+            <a:r>
+              <a:rPr dirty="0"/>
+              <a:t> is a result of several difficulties</a:t>
             </a:r>
           </a:p>
           <a:p>
@@ -18987,18 +19042,6 @@
             </a:r>
           </a:p>
           <a:p>
-            <a:pPr lvl="0"/>
-            <a:r>
-              <a:rPr dirty="0"/>
-              <a:t>The objective of Bayesian analysis is to compute a </a:t>
-            </a:r>
-            <a:r>
-              <a:rPr b="1" dirty="0"/>
-              <a:t>posterior distribution</a:t>
-            </a:r>
-          </a:p>
-          <a:p>
-            <a:pPr lvl="0"/>
             <a:r>
               <a:rPr lang="en-US" dirty="0"/>
               <a:t>F</a:t>
@@ -19018,6 +19061,55 @@
             <a:endParaRPr lang="en-US" dirty="0"/>
           </a:p>
           <a:p>
+            <a:r>
+              <a:rPr lang="en-US" dirty="0"/>
+              <a:t>The objective of Bayesian analysis is to compute a </a:t>
+            </a:r>
+            <a:r>
+              <a:rPr lang="en-US" b="1" dirty="0"/>
+              <a:t>posterior distribution</a:t>
+            </a:r>
+          </a:p>
+          <a:p>
+            <a:r>
+              <a:rPr lang="en-US" dirty="0"/>
+              <a:t>Inference can be performed on the posterior distribution by finding the </a:t>
+            </a:r>
+            <a:r>
+              <a:rPr lang="en-US" b="1" dirty="0"/>
+              <a:t>maximum a </a:t>
+            </a:r>
+            <a:r>
+              <a:rPr lang="en-US" b="1" dirty="0" err="1"/>
+              <a:t>postiori</a:t>
+            </a:r>
+            <a:r>
+              <a:rPr lang="en-US" b="1" dirty="0"/>
+              <a:t> (MAP)</a:t>
+            </a:r>
+            <a:r>
+              <a:rPr lang="en-US" dirty="0"/>
+              <a:t> value and a </a:t>
+            </a:r>
+            <a:r>
+              <a:rPr lang="en-US" b="1" dirty="0"/>
+              <a:t>credible interval</a:t>
+            </a:r>
+            <a:endParaRPr lang="en-US" dirty="0"/>
+          </a:p>
+          <a:p>
+            <a:pPr lvl="0"/>
+            <a:r>
+              <a:rPr dirty="0"/>
+              <a:t>The posterior distribution is said to quantify our current </a:t>
+            </a:r>
+            <a:r>
+              <a:rPr b="1" dirty="0"/>
+              <a:t>belief</a:t>
+            </a:r>
+            <a:endParaRPr lang="en-US" b="1" dirty="0"/>
+          </a:p>
+          <a:p>
             <a:pPr lvl="0"/>
             <a:r>
               <a:rPr lang="en-US" dirty="0"/>
@@ -19037,25 +19129,6 @@
             </a:r>
           </a:p>
           <a:p>
-            <a:pPr lvl="1"/>
-            <a:r>
-              <a:rPr dirty="0"/>
-              <a:t>Selection of prior distributions can be performed in a number of ways</a:t>
-            </a:r>
-          </a:p>
-          <a:p>
-            <a:pPr lvl="0"/>
-            <a:r>
-              <a:rPr dirty="0"/>
-              <a:t>The posterior distribution is said to quantify our current </a:t>
-            </a:r>
-            <a:r>
-              <a:rPr b="1" dirty="0"/>
-              <a:t>belief</a:t>
-            </a:r>
-            <a:endParaRPr dirty="0"/>
-          </a:p>
-          <a:p>
             <a:pPr lvl="0"/>
             <a:r>
               <a:rPr lang="en-US" dirty="0"/>
@@ -19076,47 +19149,11 @@
             <a:endParaRPr lang="en-US" dirty="0"/>
           </a:p>
           <a:p>
-            <a:pPr lvl="1"/>
             <a:r>
               <a:rPr lang="en-US" dirty="0"/>
-              <a:t>Frequentist models which must be computed from a complete sample</a:t>
+              <a:t>Frequentist models which must be recomputed from a complete sample</a:t>
             </a:r>
             <a:endParaRPr lang="en-US" b="1" dirty="0"/>
-          </a:p>
-          <a:p>
-            <a:pPr lvl="0"/>
-            <a:r>
-              <a:rPr dirty="0"/>
-              <a:t>Inference can be performed on the poster</a:t>
-            </a:r>
-            <a:r>
-              <a:rPr lang="en-US" dirty="0"/>
-              <a:t>io</a:t>
-            </a:r>
-            <a:r>
-              <a:rPr dirty="0"/>
-              <a:t>r distribution by finding the </a:t>
-            </a:r>
-            <a:r>
-              <a:rPr b="1" dirty="0"/>
-              <a:t>maximum a </a:t>
-            </a:r>
-            <a:r>
-              <a:rPr b="1" dirty="0" err="1"/>
-              <a:t>postiori</a:t>
-            </a:r>
-            <a:r>
-              <a:rPr b="1" dirty="0"/>
-              <a:t> (MAP)</a:t>
-            </a:r>
-            <a:r>
-              <a:rPr dirty="0"/>
-              <a:t> value and a </a:t>
-            </a:r>
-            <a:r>
-              <a:rPr b="1" dirty="0"/>
-              <a:t>credible interval</a:t>
-            </a:r>
           </a:p>
         </p:txBody>
       </p:sp>

</xml_diff>

<commit_message>
Corrected small typos from lecture
</commit_message>
<xml_diff>
--- a/LectureSlides/07_IntroductionToBayesModels.pptx
+++ b/LectureSlides/07_IntroductionToBayesModels.pptx
@@ -17889,32 +17889,24 @@
               <a:buNone/>
             </a:pPr>
             <a:r>
+              <a:rPr dirty="0"/>
               <a:t>Compare </a:t>
             </a:r>
             <a:r>
-              <a:rPr lang="en-US"/>
+              <a:rPr lang="en-US" dirty="0"/>
               <a:t>95% </a:t>
             </a:r>
             <a:r>
-              <a:t>confidence </a:t>
-            </a:r>
-            <a:r>
-              <a:rPr dirty="0"/>
-              <a:t>interval </a:t>
-            </a:r>
-            <a:r>
-              <a:t>and </a:t>
-            </a:r>
-            <a:r>
-              <a:rPr lang="en-US"/>
+              <a:rPr dirty="0"/>
+              <a:t>confidence interval and </a:t>
+            </a:r>
+            <a:r>
+              <a:rPr lang="en-US" dirty="0"/>
               <a:t>95% </a:t>
             </a:r>
             <a:r>
-              <a:t>credible </a:t>
-            </a:r>
-            <a:r>
-              <a:rPr dirty="0"/>
-              <a:t>interval for the case of 10 observations</a:t>
+              <a:rPr dirty="0"/>
+              <a:t>credible interval for the case of 10 observations</a:t>
             </a:r>
           </a:p>
           <a:p>
@@ -18080,25 +18072,17 @@
             </a:r>
             <a:r>
               <a:rPr dirty="0"/>
-              <a:t> Bayesian </a:t>
-            </a:r>
-            <a:r>
-              <a:t>posterior distribution?</a:t>
-            </a:r>
-            <a:endParaRPr dirty="0"/>
+              <a:t> Bayesian posterior distribution?</a:t>
+            </a:r>
           </a:p>
           <a:p>
             <a:pPr lvl="0"/>
             <a:r>
-              <a:rPr dirty="0"/>
-              <a:t>Perform simulations and make predictions</a:t>
-            </a:r>
-          </a:p>
-          <a:p>
-            <a:pPr lvl="0"/>
-            <a:r>
-              <a:rPr dirty="0"/>
-              <a:t>Predictions are computed by simulating from the posterior distribution</a:t>
+              <a:t>Predictions </a:t>
+            </a:r>
+            <a:r>
+              <a:rPr dirty="0"/>
+              <a:t>are computed by simulating from the posterior distribution</a:t>
             </a:r>
           </a:p>
           <a:p>
@@ -18564,7 +18548,7 @@
             <a:pPr lvl="0"/>
             <a:r>
               <a:rPr dirty="0"/>
-              <a:t>Predictions are made by simulating from the posterior distribution a</a:t>
+              <a:t>Predictions are made by simulating from the posterior distribution </a:t>
             </a:r>
           </a:p>
         </p:txBody>

</xml_diff>

<commit_message>
Corrected error of skewness on slide 32
</commit_message>
<xml_diff>
--- a/LectureSlides/07_IntroductionToBayesModels.pptx
+++ b/LectureSlides/07_IntroductionToBayesModels.pptx
@@ -254,7 +254,7 @@
           <a:p>
             <a:fld id="{13DDEE00-70AE-47E2-95E5-F1C95ECCE916}" type="datetimeFigureOut">
               <a:rPr lang="en-US" smtClean="0"/>
-              <a:t>10/2/2024</a:t>
+              <a:t>10/14/2024</a:t>
             </a:fld>
             <a:endParaRPr lang="en-US"/>
           </a:p>
@@ -784,7 +784,7 @@
           <a:p>
             <a:fld id="{241EB5C9-1307-BA42-ABA2-0BC069CD8E7F}" type="datetimeFigureOut">
               <a:rPr lang="en-US" smtClean="0"/>
-              <a:t>10/2/2024</a:t>
+              <a:t>10/14/2024</a:t>
             </a:fld>
             <a:endParaRPr lang="en-US"/>
           </a:p>
@@ -952,7 +952,7 @@
           <a:p>
             <a:fld id="{241EB5C9-1307-BA42-ABA2-0BC069CD8E7F}" type="datetimeFigureOut">
               <a:rPr lang="en-US" smtClean="0"/>
-              <a:t>10/2/2024</a:t>
+              <a:t>10/14/2024</a:t>
             </a:fld>
             <a:endParaRPr lang="en-US"/>
           </a:p>
@@ -1130,7 +1130,7 @@
           <a:p>
             <a:fld id="{241EB5C9-1307-BA42-ABA2-0BC069CD8E7F}" type="datetimeFigureOut">
               <a:rPr lang="en-US" smtClean="0"/>
-              <a:t>10/2/2024</a:t>
+              <a:t>10/14/2024</a:t>
             </a:fld>
             <a:endParaRPr lang="en-US"/>
           </a:p>
@@ -1298,7 +1298,7 @@
           <a:p>
             <a:fld id="{241EB5C9-1307-BA42-ABA2-0BC069CD8E7F}" type="datetimeFigureOut">
               <a:rPr lang="en-US" smtClean="0"/>
-              <a:t>10/2/2024</a:t>
+              <a:t>10/14/2024</a:t>
             </a:fld>
             <a:endParaRPr lang="en-US"/>
           </a:p>
@@ -1543,7 +1543,7 @@
           <a:p>
             <a:fld id="{241EB5C9-1307-BA42-ABA2-0BC069CD8E7F}" type="datetimeFigureOut">
               <a:rPr lang="en-US" smtClean="0"/>
-              <a:t>10/2/2024</a:t>
+              <a:t>10/14/2024</a:t>
             </a:fld>
             <a:endParaRPr lang="en-US"/>
           </a:p>
@@ -1828,7 +1828,7 @@
           <a:p>
             <a:fld id="{241EB5C9-1307-BA42-ABA2-0BC069CD8E7F}" type="datetimeFigureOut">
               <a:rPr lang="en-US" smtClean="0"/>
-              <a:t>10/2/2024</a:t>
+              <a:t>10/14/2024</a:t>
             </a:fld>
             <a:endParaRPr lang="en-US"/>
           </a:p>
@@ -2247,7 +2247,7 @@
           <a:p>
             <a:fld id="{241EB5C9-1307-BA42-ABA2-0BC069CD8E7F}" type="datetimeFigureOut">
               <a:rPr lang="en-US" smtClean="0"/>
-              <a:t>10/2/2024</a:t>
+              <a:t>10/14/2024</a:t>
             </a:fld>
             <a:endParaRPr lang="en-US"/>
           </a:p>
@@ -2364,7 +2364,7 @@
           <a:p>
             <a:fld id="{241EB5C9-1307-BA42-ABA2-0BC069CD8E7F}" type="datetimeFigureOut">
               <a:rPr lang="en-US" smtClean="0"/>
-              <a:t>10/2/2024</a:t>
+              <a:t>10/14/2024</a:t>
             </a:fld>
             <a:endParaRPr lang="en-US"/>
           </a:p>
@@ -2459,7 +2459,7 @@
           <a:p>
             <a:fld id="{241EB5C9-1307-BA42-ABA2-0BC069CD8E7F}" type="datetimeFigureOut">
               <a:rPr lang="en-US" smtClean="0"/>
-              <a:t>10/2/2024</a:t>
+              <a:t>10/14/2024</a:t>
             </a:fld>
             <a:endParaRPr lang="en-US"/>
           </a:p>
@@ -2734,7 +2734,7 @@
           <a:p>
             <a:fld id="{241EB5C9-1307-BA42-ABA2-0BC069CD8E7F}" type="datetimeFigureOut">
               <a:rPr lang="en-US" smtClean="0"/>
-              <a:t>10/2/2024</a:t>
+              <a:t>10/14/2024</a:t>
             </a:fld>
             <a:endParaRPr lang="en-US"/>
           </a:p>
@@ -2986,7 +2986,7 @@
           <a:p>
             <a:fld id="{241EB5C9-1307-BA42-ABA2-0BC069CD8E7F}" type="datetimeFigureOut">
               <a:rPr lang="en-US" smtClean="0"/>
-              <a:t>10/2/2024</a:t>
+              <a:t>10/14/2024</a:t>
             </a:fld>
             <a:endParaRPr lang="en-US"/>
           </a:p>
@@ -3197,7 +3197,7 @@
           <a:p>
             <a:fld id="{241EB5C9-1307-BA42-ABA2-0BC069CD8E7F}" type="datetimeFigureOut">
               <a:rPr lang="en-US" smtClean="0"/>
-              <a:t>10/2/2024</a:t>
+              <a:t>10/14/2024</a:t>
             </a:fld>
             <a:endParaRPr lang="en-US"/>
           </a:p>
@@ -5877,8 +5877,8 @@
           </a:p>
         </p:txBody>
       </p:sp>
-      <mc:AlternateContent xmlns:mc="http://schemas.openxmlformats.org/markup-compatibility/2006">
-        <mc:Choice xmlns:a14="http://schemas.microsoft.com/office/drawing/2010/main" Requires="a14">
+      <mc:AlternateContent xmlns:mc="http://schemas.openxmlformats.org/markup-compatibility/2006" xmlns:a14="http://schemas.microsoft.com/office/drawing/2010/main">
+        <mc:Choice Requires="a14">
           <p:sp>
             <p:nvSpPr>
               <p:cNvPr id="3" name="Content Placeholder 2"/>
@@ -6338,7 +6338,7 @@
             </p:txBody>
           </p:sp>
         </mc:Choice>
-        <mc:Fallback>
+        <mc:Fallback xmlns="">
           <p:sp>
             <p:nvSpPr>
               <p:cNvPr id="3" name="Content Placeholder 2"/>
@@ -8040,8 +8040,8 @@
           </a:p>
         </p:txBody>
       </p:sp>
-      <mc:AlternateContent xmlns:mc="http://schemas.openxmlformats.org/markup-compatibility/2006">
-        <mc:Choice xmlns:a14="http://schemas.microsoft.com/office/drawing/2010/main" Requires="a14">
+      <mc:AlternateContent xmlns:mc="http://schemas.openxmlformats.org/markup-compatibility/2006" xmlns:a14="http://schemas.microsoft.com/office/drawing/2010/main">
+        <mc:Choice Requires="a14">
           <p:sp>
             <p:nvSpPr>
               <p:cNvPr id="3" name="Content Placeholder 2"/>
@@ -8680,7 +8680,7 @@
             </p:txBody>
           </p:sp>
         </mc:Choice>
-        <mc:Fallback>
+        <mc:Fallback xmlns="">
           <p:sp>
             <p:nvSpPr>
               <p:cNvPr id="3" name="Content Placeholder 2"/>
@@ -8767,8 +8767,8 @@
           </a:p>
         </p:txBody>
       </p:sp>
-      <mc:AlternateContent xmlns:mc="http://schemas.openxmlformats.org/markup-compatibility/2006">
-        <mc:Choice xmlns:a14="http://schemas.microsoft.com/office/drawing/2010/main" Requires="a14">
+      <mc:AlternateContent xmlns:mc="http://schemas.openxmlformats.org/markup-compatibility/2006" xmlns:a14="http://schemas.microsoft.com/office/drawing/2010/main">
+        <mc:Choice Requires="a14">
           <p:sp>
             <p:nvSpPr>
               <p:cNvPr id="3" name="Content Placeholder 2"/>
@@ -9261,7 +9261,7 @@
             </p:txBody>
           </p:sp>
         </mc:Choice>
-        <mc:Fallback>
+        <mc:Fallback xmlns="">
           <p:sp>
             <p:nvSpPr>
               <p:cNvPr id="3" name="Content Placeholder 2"/>
@@ -9344,8 +9344,8 @@
           </a:p>
         </p:txBody>
       </p:sp>
-      <mc:AlternateContent xmlns:mc="http://schemas.openxmlformats.org/markup-compatibility/2006">
-        <mc:Choice xmlns:a14="http://schemas.microsoft.com/office/drawing/2010/main" Requires="a14">
+      <mc:AlternateContent xmlns:mc="http://schemas.openxmlformats.org/markup-compatibility/2006" xmlns:a14="http://schemas.microsoft.com/office/drawing/2010/main">
+        <mc:Choice Requires="a14">
           <p:sp>
             <p:nvSpPr>
               <p:cNvPr id="3" name="Content Placeholder 2"/>
@@ -9791,7 +9791,7 @@
             </p:txBody>
           </p:sp>
         </mc:Choice>
-        <mc:Fallback>
+        <mc:Fallback xmlns="">
           <p:sp>
             <p:nvSpPr>
               <p:cNvPr id="3" name="Content Placeholder 2"/>
@@ -12931,8 +12931,8 @@
           </a:ln>
         </p:spPr>
       </p:pic>
-      <mc:AlternateContent xmlns:mc="http://schemas.openxmlformats.org/markup-compatibility/2006" xmlns:a14="http://schemas.microsoft.com/office/drawing/2010/main">
-        <mc:Choice Requires="a14">
+      <mc:AlternateContent xmlns:mc="http://schemas.openxmlformats.org/markup-compatibility/2006">
+        <mc:Choice xmlns:a14="http://schemas.microsoft.com/office/drawing/2010/main" Requires="a14">
           <p:sp>
             <p:nvSpPr>
               <p:cNvPr id="5" name="TextBox 3"/>
@@ -13007,7 +13007,7 @@
                       <a:rPr lang="en-US" sz="2000" b="0" i="1" smtClean="0">
                         <a:latin typeface="Cambria Math" panose="02040503050406030204" pitchFamily="18" charset="0"/>
                       </a:rPr>
-                      <m:t>&gt;</m:t>
+                      <m:t>&lt;</m:t>
                     </m:r>
                     <m:r>
                       <a:rPr lang="en-US" sz="2000" b="0" i="1" smtClean="0">
@@ -13039,7 +13039,7 @@
                       <a:rPr lang="en-US" sz="2000" b="0" i="1" smtClean="0">
                         <a:latin typeface="Cambria Math" panose="02040503050406030204" pitchFamily="18" charset="0"/>
                       </a:rPr>
-                      <m:t>&lt;</m:t>
+                      <m:t>&gt;</m:t>
                     </m:r>
                     <m:r>
                       <a:rPr lang="en-US" sz="2000" b="0" i="1" smtClean="0">
@@ -13068,7 +13068,7 @@
             </p:txBody>
           </p:sp>
         </mc:Choice>
-        <mc:Fallback xmlns="">
+        <mc:Fallback>
           <p:sp>
             <p:nvSpPr>
               <p:cNvPr id="5" name="TextBox 3"/>
@@ -13166,8 +13166,8 @@
           </a:p>
         </p:txBody>
       </p:sp>
-      <mc:AlternateContent xmlns:mc="http://schemas.openxmlformats.org/markup-compatibility/2006">
-        <mc:Choice xmlns:a14="http://schemas.microsoft.com/office/drawing/2010/main" Requires="a14">
+      <mc:AlternateContent xmlns:mc="http://schemas.openxmlformats.org/markup-compatibility/2006" xmlns:a14="http://schemas.microsoft.com/office/drawing/2010/main">
+        <mc:Choice Requires="a14">
           <p:sp>
             <p:nvSpPr>
               <p:cNvPr id="3" name="Content Placeholder 2"/>
@@ -13952,7 +13952,7 @@
             </p:txBody>
           </p:sp>
         </mc:Choice>
-        <mc:Fallback>
+        <mc:Fallback xmlns="">
           <p:sp>
             <p:nvSpPr>
               <p:cNvPr id="3" name="Content Placeholder 2"/>
@@ -16963,8 +16963,8 @@
           </a:p>
         </p:txBody>
       </p:sp>
-      <mc:AlternateContent xmlns:mc="http://schemas.openxmlformats.org/markup-compatibility/2006">
-        <mc:Choice xmlns:a14="http://schemas.microsoft.com/office/drawing/2010/main" Requires="a14">
+      <mc:AlternateContent xmlns:mc="http://schemas.openxmlformats.org/markup-compatibility/2006" xmlns:a14="http://schemas.microsoft.com/office/drawing/2010/main">
+        <mc:Choice Requires="a14">
           <p:sp>
             <p:nvSpPr>
               <p:cNvPr id="3" name="Content Placeholder 2"/>
@@ -17118,7 +17118,7 @@
             </p:txBody>
           </p:sp>
         </mc:Choice>
-        <mc:Fallback>
+        <mc:Fallback xmlns="">
           <p:sp>
             <p:nvSpPr>
               <p:cNvPr id="3" name="Content Placeholder 2"/>
@@ -17205,8 +17205,8 @@
           </a:p>
         </p:txBody>
       </p:sp>
-      <mc:AlternateContent xmlns:mc="http://schemas.openxmlformats.org/markup-compatibility/2006">
-        <mc:Choice xmlns:a14="http://schemas.microsoft.com/office/drawing/2010/main" Requires="a14">
+      <mc:AlternateContent xmlns:mc="http://schemas.openxmlformats.org/markup-compatibility/2006" xmlns:a14="http://schemas.microsoft.com/office/drawing/2010/main">
+        <mc:Choice Requires="a14">
           <p:sp>
             <p:nvSpPr>
               <p:cNvPr id="3" name="Content Placeholder 2"/>
@@ -17354,7 +17354,7 @@
             </p:txBody>
           </p:sp>
         </mc:Choice>
-        <mc:Fallback>
+        <mc:Fallback xmlns="">
           <p:sp>
             <p:nvSpPr>
               <p:cNvPr id="3" name="Content Placeholder 2"/>
@@ -17654,8 +17654,8 @@
           </a:p>
         </p:txBody>
       </p:sp>
-      <mc:AlternateContent xmlns:mc="http://schemas.openxmlformats.org/markup-compatibility/2006">
-        <mc:Choice xmlns:a14="http://schemas.microsoft.com/office/drawing/2010/main" Requires="a14">
+      <mc:AlternateContent xmlns:mc="http://schemas.openxmlformats.org/markup-compatibility/2006" xmlns:a14="http://schemas.microsoft.com/office/drawing/2010/main">
+        <mc:Choice Requires="a14">
           <p:sp>
             <p:nvSpPr>
               <p:cNvPr id="3" name="Content Placeholder 2"/>
@@ -17776,7 +17776,7 @@
             </p:txBody>
           </p:sp>
         </mc:Choice>
-        <mc:Fallback>
+        <mc:Fallback xmlns="">
           <p:sp>
             <p:nvSpPr>
               <p:cNvPr id="3" name="Content Placeholder 2"/>

</xml_diff>